<commit_message>
Added coloring solution to ppt.
</commit_message>
<xml_diff>
--- a/GA_Group7_DotMap 20171021.pptx
+++ b/GA_Group7_DotMap 20171021.pptx
@@ -7,10 +7,10 @@
     <p:sldMasterId id="2147483653" r:id="rId3"/>
   </p:sldMasterIdLst>
   <p:notesMasterIdLst>
-    <p:notesMasterId r:id="rId24"/>
+    <p:notesMasterId r:id="rId25"/>
   </p:notesMasterIdLst>
   <p:handoutMasterIdLst>
-    <p:handoutMasterId r:id="rId25"/>
+    <p:handoutMasterId r:id="rId26"/>
   </p:handoutMasterIdLst>
   <p:sldIdLst>
     <p:sldId id="256" r:id="rId4"/>
@@ -22,17 +22,18 @@
     <p:sldId id="324" r:id="rId10"/>
     <p:sldId id="321" r:id="rId11"/>
     <p:sldId id="327" r:id="rId12"/>
-    <p:sldId id="330" r:id="rId13"/>
-    <p:sldId id="329" r:id="rId14"/>
-    <p:sldId id="331" r:id="rId15"/>
-    <p:sldId id="335" r:id="rId16"/>
-    <p:sldId id="332" r:id="rId17"/>
-    <p:sldId id="336" r:id="rId18"/>
-    <p:sldId id="337" r:id="rId19"/>
-    <p:sldId id="333" r:id="rId20"/>
-    <p:sldId id="318" r:id="rId21"/>
-    <p:sldId id="320" r:id="rId22"/>
-    <p:sldId id="334" r:id="rId23"/>
+    <p:sldId id="338" r:id="rId13"/>
+    <p:sldId id="330" r:id="rId14"/>
+    <p:sldId id="329" r:id="rId15"/>
+    <p:sldId id="331" r:id="rId16"/>
+    <p:sldId id="335" r:id="rId17"/>
+    <p:sldId id="332" r:id="rId18"/>
+    <p:sldId id="336" r:id="rId19"/>
+    <p:sldId id="337" r:id="rId20"/>
+    <p:sldId id="333" r:id="rId21"/>
+    <p:sldId id="318" r:id="rId22"/>
+    <p:sldId id="320" r:id="rId23"/>
+    <p:sldId id="334" r:id="rId24"/>
   </p:sldIdLst>
   <p:sldSz cx="9144000" cy="6858000" type="screen4x3"/>
   <p:notesSz cx="6797675" cy="9926638"/>
@@ -180,6 +181,10 @@
 </p:presentation>
 </file>
 
+<file path=ppt/revisionInfo.xml><?xml version="1.0" encoding="utf-8"?>
+<p1510:revInfo xmlns:a="http://schemas.openxmlformats.org/drawingml/2006/main" xmlns:r="http://schemas.openxmlformats.org/officeDocument/2006/relationships" xmlns:p1510="http://schemas.microsoft.com/office/powerpoint/2015/10/main"/>
+</file>
+
 <file path=ppt/handoutMasters/handoutMaster1.xml><?xml version="1.0" encoding="utf-8"?>
 <p:handoutMaster xmlns:a="http://schemas.openxmlformats.org/drawingml/2006/main" xmlns:r="http://schemas.openxmlformats.org/officeDocument/2006/relationships" xmlns:p="http://schemas.openxmlformats.org/presentationml/2006/main">
   <p:cSld>
@@ -262,7 +267,7 @@
           <a:p>
             <a:fld id="{0A05B349-3306-4835-8087-D2B91E6436B0}" type="datetimeFigureOut">
               <a:rPr lang="en-US" smtClean="0"/>
-              <a:t>10/21/2017</a:t>
+              <a:t>10/24/2017</a:t>
             </a:fld>
             <a:endParaRPr lang="en-US"/>
           </a:p>
@@ -541,35 +546,35 @@
           <a:p>
             <a:pPr lvl="0"/>
             <a:r>
-              <a:rPr lang="en-US" noProof="0" smtClean="0"/>
+              <a:rPr lang="en-US" noProof="0"/>
               <a:t>Click to edit Master text styles</a:t>
             </a:r>
           </a:p>
           <a:p>
             <a:pPr lvl="1"/>
             <a:r>
-              <a:rPr lang="en-US" noProof="0" smtClean="0"/>
+              <a:rPr lang="en-US" noProof="0"/>
               <a:t>Second level</a:t>
             </a:r>
           </a:p>
           <a:p>
             <a:pPr lvl="2"/>
             <a:r>
-              <a:rPr lang="en-US" noProof="0" smtClean="0"/>
+              <a:rPr lang="en-US" noProof="0"/>
               <a:t>Third level</a:t>
             </a:r>
           </a:p>
           <a:p>
             <a:pPr lvl="3"/>
             <a:r>
-              <a:rPr lang="en-US" noProof="0" smtClean="0"/>
+              <a:rPr lang="en-US" noProof="0"/>
               <a:t>Fourth level</a:t>
             </a:r>
           </a:p>
           <a:p>
             <a:pPr lvl="4"/>
             <a:r>
-              <a:rPr lang="en-US" noProof="0" smtClean="0"/>
+              <a:rPr lang="en-US" noProof="0"/>
               <a:t>Fifth level</a:t>
             </a:r>
           </a:p>
@@ -972,7 +977,7 @@
               <a:pPr>
                 <a:defRPr/>
               </a:pPr>
-              <a:t>19</a:t>
+              <a:t>20</a:t>
             </a:fld>
             <a:endParaRPr lang="en-US"/>
           </a:p>
@@ -1062,7 +1067,7 @@
               <a:pPr>
                 <a:defRPr/>
               </a:pPr>
-              <a:t>20</a:t>
+              <a:t>21</a:t>
             </a:fld>
             <a:endParaRPr lang="en-US"/>
           </a:p>
@@ -1224,10 +1229,9 @@
           <a:lstStyle/>
           <a:p>
             <a:r>
-              <a:rPr lang="en-US" smtClean="0"/>
+              <a:rPr lang="en-US"/>
               <a:t>Click to edit Master title style</a:t>
             </a:r>
-            <a:endParaRPr lang="en-US"/>
           </a:p>
         </p:txBody>
       </p:sp>
@@ -1248,38 +1252,37 @@
           <a:p>
             <a:pPr lvl="0"/>
             <a:r>
-              <a:rPr lang="en-US" smtClean="0"/>
+              <a:rPr lang="en-US"/>
               <a:t>Click to edit Master text styles</a:t>
             </a:r>
           </a:p>
           <a:p>
             <a:pPr lvl="1"/>
             <a:r>
-              <a:rPr lang="en-US" smtClean="0"/>
+              <a:rPr lang="en-US"/>
               <a:t>Second level</a:t>
             </a:r>
           </a:p>
           <a:p>
             <a:pPr lvl="2"/>
             <a:r>
-              <a:rPr lang="en-US" smtClean="0"/>
+              <a:rPr lang="en-US"/>
               <a:t>Third level</a:t>
             </a:r>
           </a:p>
           <a:p>
             <a:pPr lvl="3"/>
             <a:r>
-              <a:rPr lang="en-US" smtClean="0"/>
+              <a:rPr lang="en-US"/>
               <a:t>Fourth level</a:t>
             </a:r>
           </a:p>
           <a:p>
             <a:pPr lvl="4"/>
             <a:r>
-              <a:rPr lang="en-US" smtClean="0"/>
+              <a:rPr lang="en-US"/>
               <a:t>Fifth level</a:t>
             </a:r>
-            <a:endParaRPr lang="en-US"/>
           </a:p>
         </p:txBody>
       </p:sp>
@@ -1429,10 +1432,9 @@
           <a:lstStyle/>
           <a:p>
             <a:r>
-              <a:rPr lang="en-US" smtClean="0"/>
+              <a:rPr lang="en-US"/>
               <a:t>Click to edit Master title style</a:t>
             </a:r>
-            <a:endParaRPr lang="en-US"/>
           </a:p>
         </p:txBody>
       </p:sp>
@@ -1458,38 +1460,37 @@
           <a:p>
             <a:pPr lvl="0"/>
             <a:r>
-              <a:rPr lang="en-US" smtClean="0"/>
+              <a:rPr lang="en-US"/>
               <a:t>Click to edit Master text styles</a:t>
             </a:r>
           </a:p>
           <a:p>
             <a:pPr lvl="1"/>
             <a:r>
-              <a:rPr lang="en-US" smtClean="0"/>
+              <a:rPr lang="en-US"/>
               <a:t>Second level</a:t>
             </a:r>
           </a:p>
           <a:p>
             <a:pPr lvl="2"/>
             <a:r>
-              <a:rPr lang="en-US" smtClean="0"/>
+              <a:rPr lang="en-US"/>
               <a:t>Third level</a:t>
             </a:r>
           </a:p>
           <a:p>
             <a:pPr lvl="3"/>
             <a:r>
-              <a:rPr lang="en-US" smtClean="0"/>
+              <a:rPr lang="en-US"/>
               <a:t>Fourth level</a:t>
             </a:r>
           </a:p>
           <a:p>
             <a:pPr lvl="4"/>
             <a:r>
-              <a:rPr lang="en-US" smtClean="0"/>
+              <a:rPr lang="en-US"/>
               <a:t>Fifth level</a:t>
             </a:r>
-            <a:endParaRPr lang="en-US"/>
           </a:p>
         </p:txBody>
       </p:sp>
@@ -1840,10 +1841,9 @@
           <a:lstStyle/>
           <a:p>
             <a:r>
-              <a:rPr lang="en-US" smtClean="0"/>
+              <a:rPr lang="en-US"/>
               <a:t>Click to edit Master title style</a:t>
             </a:r>
-            <a:endParaRPr lang="en-US"/>
           </a:p>
         </p:txBody>
       </p:sp>
@@ -1864,38 +1864,37 @@
           <a:p>
             <a:pPr lvl="0"/>
             <a:r>
-              <a:rPr lang="en-US" smtClean="0"/>
+              <a:rPr lang="en-US"/>
               <a:t>Click to edit Master text styles</a:t>
             </a:r>
           </a:p>
           <a:p>
             <a:pPr lvl="1"/>
             <a:r>
-              <a:rPr lang="en-US" smtClean="0"/>
+              <a:rPr lang="en-US"/>
               <a:t>Second level</a:t>
             </a:r>
           </a:p>
           <a:p>
             <a:pPr lvl="2"/>
             <a:r>
-              <a:rPr lang="en-US" smtClean="0"/>
+              <a:rPr lang="en-US"/>
               <a:t>Third level</a:t>
             </a:r>
           </a:p>
           <a:p>
             <a:pPr lvl="3"/>
             <a:r>
-              <a:rPr lang="en-US" smtClean="0"/>
+              <a:rPr lang="en-US"/>
               <a:t>Fourth level</a:t>
             </a:r>
           </a:p>
           <a:p>
             <a:pPr lvl="4"/>
             <a:r>
-              <a:rPr lang="en-US" smtClean="0"/>
+              <a:rPr lang="en-US"/>
               <a:t>Fifth level</a:t>
             </a:r>
-            <a:endParaRPr lang="en-US"/>
           </a:p>
         </p:txBody>
       </p:sp>
@@ -2049,10 +2048,9 @@
           </a:lstStyle>
           <a:p>
             <a:r>
-              <a:rPr lang="en-US" smtClean="0"/>
+              <a:rPr lang="en-US"/>
               <a:t>Click to edit Master title style</a:t>
             </a:r>
-            <a:endParaRPr lang="en-US"/>
           </a:p>
         </p:txBody>
       </p:sp>
@@ -2115,7 +2113,7 @@
           <a:p>
             <a:pPr lvl="0"/>
             <a:r>
-              <a:rPr lang="en-US" smtClean="0"/>
+              <a:rPr lang="en-US"/>
               <a:t>Click to edit Master text styles</a:t>
             </a:r>
           </a:p>
@@ -2262,10 +2260,9 @@
           <a:lstStyle/>
           <a:p>
             <a:r>
-              <a:rPr lang="en-US" smtClean="0"/>
+              <a:rPr lang="en-US"/>
               <a:t>Click to edit Master title style</a:t>
             </a:r>
-            <a:endParaRPr lang="en-US"/>
           </a:p>
         </p:txBody>
       </p:sp>
@@ -2319,38 +2316,37 @@
           <a:p>
             <a:pPr lvl="0"/>
             <a:r>
-              <a:rPr lang="en-US" smtClean="0"/>
+              <a:rPr lang="en-US"/>
               <a:t>Click to edit Master text styles</a:t>
             </a:r>
           </a:p>
           <a:p>
             <a:pPr lvl="1"/>
             <a:r>
-              <a:rPr lang="en-US" smtClean="0"/>
+              <a:rPr lang="en-US"/>
               <a:t>Second level</a:t>
             </a:r>
           </a:p>
           <a:p>
             <a:pPr lvl="2"/>
             <a:r>
-              <a:rPr lang="en-US" smtClean="0"/>
+              <a:rPr lang="en-US"/>
               <a:t>Third level</a:t>
             </a:r>
           </a:p>
           <a:p>
             <a:pPr lvl="3"/>
             <a:r>
-              <a:rPr lang="en-US" smtClean="0"/>
+              <a:rPr lang="en-US"/>
               <a:t>Fourth level</a:t>
             </a:r>
           </a:p>
           <a:p>
             <a:pPr lvl="4"/>
             <a:r>
-              <a:rPr lang="en-US" smtClean="0"/>
+              <a:rPr lang="en-US"/>
               <a:t>Fifth level</a:t>
             </a:r>
-            <a:endParaRPr lang="en-US"/>
           </a:p>
         </p:txBody>
       </p:sp>
@@ -2404,38 +2400,37 @@
           <a:p>
             <a:pPr lvl="0"/>
             <a:r>
-              <a:rPr lang="en-US" smtClean="0"/>
+              <a:rPr lang="en-US"/>
               <a:t>Click to edit Master text styles</a:t>
             </a:r>
           </a:p>
           <a:p>
             <a:pPr lvl="1"/>
             <a:r>
-              <a:rPr lang="en-US" smtClean="0"/>
+              <a:rPr lang="en-US"/>
               <a:t>Second level</a:t>
             </a:r>
           </a:p>
           <a:p>
             <a:pPr lvl="2"/>
             <a:r>
-              <a:rPr lang="en-US" smtClean="0"/>
+              <a:rPr lang="en-US"/>
               <a:t>Third level</a:t>
             </a:r>
           </a:p>
           <a:p>
             <a:pPr lvl="3"/>
             <a:r>
-              <a:rPr lang="en-US" smtClean="0"/>
+              <a:rPr lang="en-US"/>
               <a:t>Fourth level</a:t>
             </a:r>
           </a:p>
           <a:p>
             <a:pPr lvl="4"/>
             <a:r>
-              <a:rPr lang="en-US" smtClean="0"/>
+              <a:rPr lang="en-US"/>
               <a:t>Fifth level</a:t>
             </a:r>
-            <a:endParaRPr lang="en-US"/>
           </a:p>
         </p:txBody>
       </p:sp>
@@ -2589,10 +2584,9 @@
           </a:lstStyle>
           <a:p>
             <a:r>
-              <a:rPr lang="en-US" smtClean="0"/>
+              <a:rPr lang="en-US"/>
               <a:t>Click to edit Master title style</a:t>
             </a:r>
-            <a:endParaRPr lang="en-US"/>
           </a:p>
         </p:txBody>
       </p:sp>
@@ -2655,7 +2649,7 @@
           <a:p>
             <a:pPr lvl="0"/>
             <a:r>
-              <a:rPr lang="en-US" smtClean="0"/>
+              <a:rPr lang="en-US"/>
               <a:t>Click to edit Master text styles</a:t>
             </a:r>
           </a:p>
@@ -2711,38 +2705,37 @@
           <a:p>
             <a:pPr lvl="0"/>
             <a:r>
-              <a:rPr lang="en-US" smtClean="0"/>
+              <a:rPr lang="en-US"/>
               <a:t>Click to edit Master text styles</a:t>
             </a:r>
           </a:p>
           <a:p>
             <a:pPr lvl="1"/>
             <a:r>
-              <a:rPr lang="en-US" smtClean="0"/>
+              <a:rPr lang="en-US"/>
               <a:t>Second level</a:t>
             </a:r>
           </a:p>
           <a:p>
             <a:pPr lvl="2"/>
             <a:r>
-              <a:rPr lang="en-US" smtClean="0"/>
+              <a:rPr lang="en-US"/>
               <a:t>Third level</a:t>
             </a:r>
           </a:p>
           <a:p>
             <a:pPr lvl="3"/>
             <a:r>
-              <a:rPr lang="en-US" smtClean="0"/>
+              <a:rPr lang="en-US"/>
               <a:t>Fourth level</a:t>
             </a:r>
           </a:p>
           <a:p>
             <a:pPr lvl="4"/>
             <a:r>
-              <a:rPr lang="en-US" smtClean="0"/>
+              <a:rPr lang="en-US"/>
               <a:t>Fifth level</a:t>
             </a:r>
-            <a:endParaRPr lang="en-US"/>
           </a:p>
         </p:txBody>
       </p:sp>
@@ -2805,7 +2798,7 @@
           <a:p>
             <a:pPr lvl="0"/>
             <a:r>
-              <a:rPr lang="en-US" smtClean="0"/>
+              <a:rPr lang="en-US"/>
               <a:t>Click to edit Master text styles</a:t>
             </a:r>
           </a:p>
@@ -2861,38 +2854,37 @@
           <a:p>
             <a:pPr lvl="0"/>
             <a:r>
-              <a:rPr lang="en-US" smtClean="0"/>
+              <a:rPr lang="en-US"/>
               <a:t>Click to edit Master text styles</a:t>
             </a:r>
           </a:p>
           <a:p>
             <a:pPr lvl="1"/>
             <a:r>
-              <a:rPr lang="en-US" smtClean="0"/>
+              <a:rPr lang="en-US"/>
               <a:t>Second level</a:t>
             </a:r>
           </a:p>
           <a:p>
             <a:pPr lvl="2"/>
             <a:r>
-              <a:rPr lang="en-US" smtClean="0"/>
+              <a:rPr lang="en-US"/>
               <a:t>Third level</a:t>
             </a:r>
           </a:p>
           <a:p>
             <a:pPr lvl="3"/>
             <a:r>
-              <a:rPr lang="en-US" smtClean="0"/>
+              <a:rPr lang="en-US"/>
               <a:t>Fourth level</a:t>
             </a:r>
           </a:p>
           <a:p>
             <a:pPr lvl="4"/>
             <a:r>
-              <a:rPr lang="en-US" smtClean="0"/>
+              <a:rPr lang="en-US"/>
               <a:t>Fifth level</a:t>
             </a:r>
-            <a:endParaRPr lang="en-US"/>
           </a:p>
         </p:txBody>
       </p:sp>
@@ -3037,10 +3029,9 @@
           <a:lstStyle/>
           <a:p>
             <a:r>
-              <a:rPr lang="en-US" smtClean="0"/>
+              <a:rPr lang="en-US"/>
               <a:t>Click to edit Master title style</a:t>
             </a:r>
-            <a:endParaRPr lang="en-US"/>
           </a:p>
         </p:txBody>
       </p:sp>
@@ -3319,10 +3310,9 @@
           </a:lstStyle>
           <a:p>
             <a:r>
-              <a:rPr lang="en-US" smtClean="0"/>
+              <a:rPr lang="en-US"/>
               <a:t>Click to edit Master title style</a:t>
             </a:r>
-            <a:endParaRPr lang="en-US"/>
           </a:p>
         </p:txBody>
       </p:sp>
@@ -3376,38 +3366,37 @@
           <a:p>
             <a:pPr lvl="0"/>
             <a:r>
-              <a:rPr lang="en-US" smtClean="0"/>
+              <a:rPr lang="en-US"/>
               <a:t>Click to edit Master text styles</a:t>
             </a:r>
           </a:p>
           <a:p>
             <a:pPr lvl="1"/>
             <a:r>
-              <a:rPr lang="en-US" smtClean="0"/>
+              <a:rPr lang="en-US"/>
               <a:t>Second level</a:t>
             </a:r>
           </a:p>
           <a:p>
             <a:pPr lvl="2"/>
             <a:r>
-              <a:rPr lang="en-US" smtClean="0"/>
+              <a:rPr lang="en-US"/>
               <a:t>Third level</a:t>
             </a:r>
           </a:p>
           <a:p>
             <a:pPr lvl="3"/>
             <a:r>
-              <a:rPr lang="en-US" smtClean="0"/>
+              <a:rPr lang="en-US"/>
               <a:t>Fourth level</a:t>
             </a:r>
           </a:p>
           <a:p>
             <a:pPr lvl="4"/>
             <a:r>
-              <a:rPr lang="en-US" smtClean="0"/>
+              <a:rPr lang="en-US"/>
               <a:t>Fifth level</a:t>
             </a:r>
-            <a:endParaRPr lang="en-US"/>
           </a:p>
         </p:txBody>
       </p:sp>
@@ -3470,7 +3459,7 @@
           <a:p>
             <a:pPr lvl="0"/>
             <a:r>
-              <a:rPr lang="en-US" smtClean="0"/>
+              <a:rPr lang="en-US"/>
               <a:t>Click to edit Master text styles</a:t>
             </a:r>
           </a:p>
@@ -3617,10 +3606,9 @@
           <a:lstStyle/>
           <a:p>
             <a:r>
-              <a:rPr lang="en-US" smtClean="0"/>
+              <a:rPr lang="en-US"/>
               <a:t>Click to edit Master title style</a:t>
             </a:r>
-            <a:endParaRPr lang="en-US"/>
           </a:p>
         </p:txBody>
       </p:sp>
@@ -3641,38 +3629,37 @@
           <a:p>
             <a:pPr lvl="0"/>
             <a:r>
-              <a:rPr lang="en-US" smtClean="0"/>
+              <a:rPr lang="en-US"/>
               <a:t>Click to edit Master text styles</a:t>
             </a:r>
           </a:p>
           <a:p>
             <a:pPr lvl="1"/>
             <a:r>
-              <a:rPr lang="en-US" smtClean="0"/>
+              <a:rPr lang="en-US"/>
               <a:t>Second level</a:t>
             </a:r>
           </a:p>
           <a:p>
             <a:pPr lvl="2"/>
             <a:r>
-              <a:rPr lang="en-US" smtClean="0"/>
+              <a:rPr lang="en-US"/>
               <a:t>Third level</a:t>
             </a:r>
           </a:p>
           <a:p>
             <a:pPr lvl="3"/>
             <a:r>
-              <a:rPr lang="en-US" smtClean="0"/>
+              <a:rPr lang="en-US"/>
               <a:t>Fourth level</a:t>
             </a:r>
           </a:p>
           <a:p>
             <a:pPr lvl="4"/>
             <a:r>
-              <a:rPr lang="en-US" smtClean="0"/>
+              <a:rPr lang="en-US"/>
               <a:t>Fifth level</a:t>
             </a:r>
-            <a:endParaRPr lang="en-US"/>
           </a:p>
         </p:txBody>
       </p:sp>
@@ -3826,10 +3813,9 @@
           </a:lstStyle>
           <a:p>
             <a:r>
-              <a:rPr lang="en-US" smtClean="0"/>
+              <a:rPr lang="en-US"/>
               <a:t>Click to edit Master title style</a:t>
             </a:r>
-            <a:endParaRPr lang="en-US"/>
           </a:p>
         </p:txBody>
       </p:sp>
@@ -3891,7 +3877,7 @@
           </a:lstStyle>
           <a:p>
             <a:pPr lvl="0"/>
-            <a:endParaRPr lang="en-US" noProof="0" smtClean="0"/>
+            <a:endParaRPr lang="en-US" noProof="0"/>
           </a:p>
         </p:txBody>
       </p:sp>
@@ -3954,7 +3940,7 @@
           <a:p>
             <a:pPr lvl="0"/>
             <a:r>
-              <a:rPr lang="en-US" smtClean="0"/>
+              <a:rPr lang="en-US"/>
               <a:t>Click to edit Master text styles</a:t>
             </a:r>
           </a:p>
@@ -4101,10 +4087,9 @@
           <a:lstStyle/>
           <a:p>
             <a:r>
-              <a:rPr lang="en-US" smtClean="0"/>
+              <a:rPr lang="en-US"/>
               <a:t>Click to edit Master title style</a:t>
             </a:r>
-            <a:endParaRPr lang="en-US"/>
           </a:p>
         </p:txBody>
       </p:sp>
@@ -4125,38 +4110,37 @@
           <a:p>
             <a:pPr lvl="0"/>
             <a:r>
-              <a:rPr lang="en-US" smtClean="0"/>
+              <a:rPr lang="en-US"/>
               <a:t>Click to edit Master text styles</a:t>
             </a:r>
           </a:p>
           <a:p>
             <a:pPr lvl="1"/>
             <a:r>
-              <a:rPr lang="en-US" smtClean="0"/>
+              <a:rPr lang="en-US"/>
               <a:t>Second level</a:t>
             </a:r>
           </a:p>
           <a:p>
             <a:pPr lvl="2"/>
             <a:r>
-              <a:rPr lang="en-US" smtClean="0"/>
+              <a:rPr lang="en-US"/>
               <a:t>Third level</a:t>
             </a:r>
           </a:p>
           <a:p>
             <a:pPr lvl="3"/>
             <a:r>
-              <a:rPr lang="en-US" smtClean="0"/>
+              <a:rPr lang="en-US"/>
               <a:t>Fourth level</a:t>
             </a:r>
           </a:p>
           <a:p>
             <a:pPr lvl="4"/>
             <a:r>
-              <a:rPr lang="en-US" smtClean="0"/>
+              <a:rPr lang="en-US"/>
               <a:t>Fifth level</a:t>
             </a:r>
-            <a:endParaRPr lang="en-US"/>
           </a:p>
         </p:txBody>
       </p:sp>
@@ -4306,10 +4290,9 @@
           <a:lstStyle/>
           <a:p>
             <a:r>
-              <a:rPr lang="en-US" smtClean="0"/>
+              <a:rPr lang="en-US"/>
               <a:t>Click to edit Master title style</a:t>
             </a:r>
-            <a:endParaRPr lang="en-US"/>
           </a:p>
         </p:txBody>
       </p:sp>
@@ -4335,38 +4318,37 @@
           <a:p>
             <a:pPr lvl="0"/>
             <a:r>
-              <a:rPr lang="en-US" smtClean="0"/>
+              <a:rPr lang="en-US"/>
               <a:t>Click to edit Master text styles</a:t>
             </a:r>
           </a:p>
           <a:p>
             <a:pPr lvl="1"/>
             <a:r>
-              <a:rPr lang="en-US" smtClean="0"/>
+              <a:rPr lang="en-US"/>
               <a:t>Second level</a:t>
             </a:r>
           </a:p>
           <a:p>
             <a:pPr lvl="2"/>
             <a:r>
-              <a:rPr lang="en-US" smtClean="0"/>
+              <a:rPr lang="en-US"/>
               <a:t>Third level</a:t>
             </a:r>
           </a:p>
           <a:p>
             <a:pPr lvl="3"/>
             <a:r>
-              <a:rPr lang="en-US" smtClean="0"/>
+              <a:rPr lang="en-US"/>
               <a:t>Fourth level</a:t>
             </a:r>
           </a:p>
           <a:p>
             <a:pPr lvl="4"/>
             <a:r>
-              <a:rPr lang="en-US" smtClean="0"/>
+              <a:rPr lang="en-US"/>
               <a:t>Fifth level</a:t>
             </a:r>
-            <a:endParaRPr lang="en-US"/>
           </a:p>
         </p:txBody>
       </p:sp>
@@ -4621,10 +4603,9 @@
           <a:lstStyle/>
           <a:p>
             <a:r>
-              <a:rPr lang="en-US" smtClean="0"/>
+              <a:rPr lang="en-US"/>
               <a:t>Click to edit Master title style</a:t>
             </a:r>
-            <a:endParaRPr lang="en-US"/>
           </a:p>
         </p:txBody>
       </p:sp>
@@ -4645,38 +4626,37 @@
           <a:p>
             <a:pPr lvl="0"/>
             <a:r>
-              <a:rPr lang="en-US" smtClean="0"/>
+              <a:rPr lang="en-US"/>
               <a:t>Click to edit Master text styles</a:t>
             </a:r>
           </a:p>
           <a:p>
             <a:pPr lvl="1"/>
             <a:r>
-              <a:rPr lang="en-US" smtClean="0"/>
+              <a:rPr lang="en-US"/>
               <a:t>Second level</a:t>
             </a:r>
           </a:p>
           <a:p>
             <a:pPr lvl="2"/>
             <a:r>
-              <a:rPr lang="en-US" smtClean="0"/>
+              <a:rPr lang="en-US"/>
               <a:t>Third level</a:t>
             </a:r>
           </a:p>
           <a:p>
             <a:pPr lvl="3"/>
             <a:r>
-              <a:rPr lang="en-US" smtClean="0"/>
+              <a:rPr lang="en-US"/>
               <a:t>Fourth level</a:t>
             </a:r>
           </a:p>
           <a:p>
             <a:pPr lvl="4"/>
             <a:r>
-              <a:rPr lang="en-US" smtClean="0"/>
+              <a:rPr lang="en-US"/>
               <a:t>Fifth level</a:t>
             </a:r>
-            <a:endParaRPr lang="en-US"/>
           </a:p>
         </p:txBody>
       </p:sp>
@@ -4830,10 +4810,9 @@
           </a:lstStyle>
           <a:p>
             <a:r>
-              <a:rPr lang="en-US" smtClean="0"/>
+              <a:rPr lang="en-US"/>
               <a:t>Click to edit Master title style</a:t>
             </a:r>
-            <a:endParaRPr lang="en-US"/>
           </a:p>
         </p:txBody>
       </p:sp>
@@ -4896,7 +4875,7 @@
           <a:p>
             <a:pPr lvl="0"/>
             <a:r>
-              <a:rPr lang="en-US" smtClean="0"/>
+              <a:rPr lang="en-US"/>
               <a:t>Click to edit Master text styles</a:t>
             </a:r>
           </a:p>
@@ -5043,10 +5022,9 @@
           <a:lstStyle/>
           <a:p>
             <a:r>
-              <a:rPr lang="en-US" smtClean="0"/>
+              <a:rPr lang="en-US"/>
               <a:t>Click to edit Master title style</a:t>
             </a:r>
-            <a:endParaRPr lang="en-US"/>
           </a:p>
         </p:txBody>
       </p:sp>
@@ -5100,38 +5078,37 @@
           <a:p>
             <a:pPr lvl="0"/>
             <a:r>
-              <a:rPr lang="en-US" smtClean="0"/>
+              <a:rPr lang="en-US"/>
               <a:t>Click to edit Master text styles</a:t>
             </a:r>
           </a:p>
           <a:p>
             <a:pPr lvl="1"/>
             <a:r>
-              <a:rPr lang="en-US" smtClean="0"/>
+              <a:rPr lang="en-US"/>
               <a:t>Second level</a:t>
             </a:r>
           </a:p>
           <a:p>
             <a:pPr lvl="2"/>
             <a:r>
-              <a:rPr lang="en-US" smtClean="0"/>
+              <a:rPr lang="en-US"/>
               <a:t>Third level</a:t>
             </a:r>
           </a:p>
           <a:p>
             <a:pPr lvl="3"/>
             <a:r>
-              <a:rPr lang="en-US" smtClean="0"/>
+              <a:rPr lang="en-US"/>
               <a:t>Fourth level</a:t>
             </a:r>
           </a:p>
           <a:p>
             <a:pPr lvl="4"/>
             <a:r>
-              <a:rPr lang="en-US" smtClean="0"/>
+              <a:rPr lang="en-US"/>
               <a:t>Fifth level</a:t>
             </a:r>
-            <a:endParaRPr lang="en-US"/>
           </a:p>
         </p:txBody>
       </p:sp>
@@ -5185,38 +5162,37 @@
           <a:p>
             <a:pPr lvl="0"/>
             <a:r>
-              <a:rPr lang="en-US" smtClean="0"/>
+              <a:rPr lang="en-US"/>
               <a:t>Click to edit Master text styles</a:t>
             </a:r>
           </a:p>
           <a:p>
             <a:pPr lvl="1"/>
             <a:r>
-              <a:rPr lang="en-US" smtClean="0"/>
+              <a:rPr lang="en-US"/>
               <a:t>Second level</a:t>
             </a:r>
           </a:p>
           <a:p>
             <a:pPr lvl="2"/>
             <a:r>
-              <a:rPr lang="en-US" smtClean="0"/>
+              <a:rPr lang="en-US"/>
               <a:t>Third level</a:t>
             </a:r>
           </a:p>
           <a:p>
             <a:pPr lvl="3"/>
             <a:r>
-              <a:rPr lang="en-US" smtClean="0"/>
+              <a:rPr lang="en-US"/>
               <a:t>Fourth level</a:t>
             </a:r>
           </a:p>
           <a:p>
             <a:pPr lvl="4"/>
             <a:r>
-              <a:rPr lang="en-US" smtClean="0"/>
+              <a:rPr lang="en-US"/>
               <a:t>Fifth level</a:t>
             </a:r>
-            <a:endParaRPr lang="en-US"/>
           </a:p>
         </p:txBody>
       </p:sp>
@@ -5370,10 +5346,9 @@
           </a:lstStyle>
           <a:p>
             <a:r>
-              <a:rPr lang="en-US" smtClean="0"/>
+              <a:rPr lang="en-US"/>
               <a:t>Click to edit Master title style</a:t>
             </a:r>
-            <a:endParaRPr lang="en-US"/>
           </a:p>
         </p:txBody>
       </p:sp>
@@ -5436,7 +5411,7 @@
           <a:p>
             <a:pPr lvl="0"/>
             <a:r>
-              <a:rPr lang="en-US" smtClean="0"/>
+              <a:rPr lang="en-US"/>
               <a:t>Click to edit Master text styles</a:t>
             </a:r>
           </a:p>
@@ -5492,38 +5467,37 @@
           <a:p>
             <a:pPr lvl="0"/>
             <a:r>
-              <a:rPr lang="en-US" smtClean="0"/>
+              <a:rPr lang="en-US"/>
               <a:t>Click to edit Master text styles</a:t>
             </a:r>
           </a:p>
           <a:p>
             <a:pPr lvl="1"/>
             <a:r>
-              <a:rPr lang="en-US" smtClean="0"/>
+              <a:rPr lang="en-US"/>
               <a:t>Second level</a:t>
             </a:r>
           </a:p>
           <a:p>
             <a:pPr lvl="2"/>
             <a:r>
-              <a:rPr lang="en-US" smtClean="0"/>
+              <a:rPr lang="en-US"/>
               <a:t>Third level</a:t>
             </a:r>
           </a:p>
           <a:p>
             <a:pPr lvl="3"/>
             <a:r>
-              <a:rPr lang="en-US" smtClean="0"/>
+              <a:rPr lang="en-US"/>
               <a:t>Fourth level</a:t>
             </a:r>
           </a:p>
           <a:p>
             <a:pPr lvl="4"/>
             <a:r>
-              <a:rPr lang="en-US" smtClean="0"/>
+              <a:rPr lang="en-US"/>
               <a:t>Fifth level</a:t>
             </a:r>
-            <a:endParaRPr lang="en-US"/>
           </a:p>
         </p:txBody>
       </p:sp>
@@ -5586,7 +5560,7 @@
           <a:p>
             <a:pPr lvl="0"/>
             <a:r>
-              <a:rPr lang="en-US" smtClean="0"/>
+              <a:rPr lang="en-US"/>
               <a:t>Click to edit Master text styles</a:t>
             </a:r>
           </a:p>
@@ -5642,38 +5616,37 @@
           <a:p>
             <a:pPr lvl="0"/>
             <a:r>
-              <a:rPr lang="en-US" smtClean="0"/>
+              <a:rPr lang="en-US"/>
               <a:t>Click to edit Master text styles</a:t>
             </a:r>
           </a:p>
           <a:p>
             <a:pPr lvl="1"/>
             <a:r>
-              <a:rPr lang="en-US" smtClean="0"/>
+              <a:rPr lang="en-US"/>
               <a:t>Second level</a:t>
             </a:r>
           </a:p>
           <a:p>
             <a:pPr lvl="2"/>
             <a:r>
-              <a:rPr lang="en-US" smtClean="0"/>
+              <a:rPr lang="en-US"/>
               <a:t>Third level</a:t>
             </a:r>
           </a:p>
           <a:p>
             <a:pPr lvl="3"/>
             <a:r>
-              <a:rPr lang="en-US" smtClean="0"/>
+              <a:rPr lang="en-US"/>
               <a:t>Fourth level</a:t>
             </a:r>
           </a:p>
           <a:p>
             <a:pPr lvl="4"/>
             <a:r>
-              <a:rPr lang="en-US" smtClean="0"/>
+              <a:rPr lang="en-US"/>
               <a:t>Fifth level</a:t>
             </a:r>
-            <a:endParaRPr lang="en-US"/>
           </a:p>
         </p:txBody>
       </p:sp>
@@ -5818,10 +5791,9 @@
           <a:lstStyle/>
           <a:p>
             <a:r>
-              <a:rPr lang="en-US" smtClean="0"/>
+              <a:rPr lang="en-US"/>
               <a:t>Click to edit Master title style</a:t>
             </a:r>
-            <a:endParaRPr lang="en-US"/>
           </a:p>
         </p:txBody>
       </p:sp>
@@ -6100,10 +6072,9 @@
           </a:lstStyle>
           <a:p>
             <a:r>
-              <a:rPr lang="en-US" smtClean="0"/>
+              <a:rPr lang="en-US"/>
               <a:t>Click to edit Master title style</a:t>
             </a:r>
-            <a:endParaRPr lang="en-US"/>
           </a:p>
         </p:txBody>
       </p:sp>
@@ -6166,7 +6137,7 @@
           <a:p>
             <a:pPr lvl="0"/>
             <a:r>
-              <a:rPr lang="en-US" smtClean="0"/>
+              <a:rPr lang="en-US"/>
               <a:t>Click to edit Master text styles</a:t>
             </a:r>
           </a:p>
@@ -6322,10 +6293,9 @@
           </a:lstStyle>
           <a:p>
             <a:r>
-              <a:rPr lang="en-US" smtClean="0"/>
+              <a:rPr lang="en-US"/>
               <a:t>Click to edit Master title style</a:t>
             </a:r>
-            <a:endParaRPr lang="en-US"/>
           </a:p>
         </p:txBody>
       </p:sp>
@@ -6379,38 +6349,37 @@
           <a:p>
             <a:pPr lvl="0"/>
             <a:r>
-              <a:rPr lang="en-US" smtClean="0"/>
+              <a:rPr lang="en-US"/>
               <a:t>Click to edit Master text styles</a:t>
             </a:r>
           </a:p>
           <a:p>
             <a:pPr lvl="1"/>
             <a:r>
-              <a:rPr lang="en-US" smtClean="0"/>
+              <a:rPr lang="en-US"/>
               <a:t>Second level</a:t>
             </a:r>
           </a:p>
           <a:p>
             <a:pPr lvl="2"/>
             <a:r>
-              <a:rPr lang="en-US" smtClean="0"/>
+              <a:rPr lang="en-US"/>
               <a:t>Third level</a:t>
             </a:r>
           </a:p>
           <a:p>
             <a:pPr lvl="3"/>
             <a:r>
-              <a:rPr lang="en-US" smtClean="0"/>
+              <a:rPr lang="en-US"/>
               <a:t>Fourth level</a:t>
             </a:r>
           </a:p>
           <a:p>
             <a:pPr lvl="4"/>
             <a:r>
-              <a:rPr lang="en-US" smtClean="0"/>
+              <a:rPr lang="en-US"/>
               <a:t>Fifth level</a:t>
             </a:r>
-            <a:endParaRPr lang="en-US"/>
           </a:p>
         </p:txBody>
       </p:sp>
@@ -6473,7 +6442,7 @@
           <a:p>
             <a:pPr lvl="0"/>
             <a:r>
-              <a:rPr lang="en-US" smtClean="0"/>
+              <a:rPr lang="en-US"/>
               <a:t>Click to edit Master text styles</a:t>
             </a:r>
           </a:p>
@@ -6629,10 +6598,9 @@
           </a:lstStyle>
           <a:p>
             <a:r>
-              <a:rPr lang="en-US" smtClean="0"/>
+              <a:rPr lang="en-US"/>
               <a:t>Click to edit Master title style</a:t>
             </a:r>
-            <a:endParaRPr lang="en-US"/>
           </a:p>
         </p:txBody>
       </p:sp>
@@ -6694,7 +6662,7 @@
           </a:lstStyle>
           <a:p>
             <a:pPr lvl="0"/>
-            <a:endParaRPr lang="en-US" noProof="0" smtClean="0"/>
+            <a:endParaRPr lang="en-US" noProof="0"/>
           </a:p>
         </p:txBody>
       </p:sp>
@@ -6757,7 +6725,7 @@
           <a:p>
             <a:pPr lvl="0"/>
             <a:r>
-              <a:rPr lang="en-US" smtClean="0"/>
+              <a:rPr lang="en-US"/>
               <a:t>Click to edit Master text styles</a:t>
             </a:r>
           </a:p>
@@ -6904,10 +6872,9 @@
           <a:lstStyle/>
           <a:p>
             <a:r>
-              <a:rPr lang="en-US" smtClean="0"/>
+              <a:rPr lang="en-US"/>
               <a:t>Click to edit Master title style</a:t>
             </a:r>
-            <a:endParaRPr lang="en-US"/>
           </a:p>
         </p:txBody>
       </p:sp>
@@ -6928,38 +6895,37 @@
           <a:p>
             <a:pPr lvl="0"/>
             <a:r>
-              <a:rPr lang="en-US" smtClean="0"/>
+              <a:rPr lang="en-US"/>
               <a:t>Click to edit Master text styles</a:t>
             </a:r>
           </a:p>
           <a:p>
             <a:pPr lvl="1"/>
             <a:r>
-              <a:rPr lang="en-US" smtClean="0"/>
+              <a:rPr lang="en-US"/>
               <a:t>Second level</a:t>
             </a:r>
           </a:p>
           <a:p>
             <a:pPr lvl="2"/>
             <a:r>
-              <a:rPr lang="en-US" smtClean="0"/>
+              <a:rPr lang="en-US"/>
               <a:t>Third level</a:t>
             </a:r>
           </a:p>
           <a:p>
             <a:pPr lvl="3"/>
             <a:r>
-              <a:rPr lang="en-US" smtClean="0"/>
+              <a:rPr lang="en-US"/>
               <a:t>Fourth level</a:t>
             </a:r>
           </a:p>
           <a:p>
             <a:pPr lvl="4"/>
             <a:r>
-              <a:rPr lang="en-US" smtClean="0"/>
+              <a:rPr lang="en-US"/>
               <a:t>Fifth level</a:t>
             </a:r>
-            <a:endParaRPr lang="en-US"/>
           </a:p>
         </p:txBody>
       </p:sp>
@@ -7109,10 +7075,9 @@
           <a:lstStyle/>
           <a:p>
             <a:r>
-              <a:rPr lang="en-US" smtClean="0"/>
+              <a:rPr lang="en-US"/>
               <a:t>Click to edit Master title style</a:t>
             </a:r>
-            <a:endParaRPr lang="en-US"/>
           </a:p>
         </p:txBody>
       </p:sp>
@@ -7138,38 +7103,37 @@
           <a:p>
             <a:pPr lvl="0"/>
             <a:r>
-              <a:rPr lang="en-US" smtClean="0"/>
+              <a:rPr lang="en-US"/>
               <a:t>Click to edit Master text styles</a:t>
             </a:r>
           </a:p>
           <a:p>
             <a:pPr lvl="1"/>
             <a:r>
-              <a:rPr lang="en-US" smtClean="0"/>
+              <a:rPr lang="en-US"/>
               <a:t>Second level</a:t>
             </a:r>
           </a:p>
           <a:p>
             <a:pPr lvl="2"/>
             <a:r>
-              <a:rPr lang="en-US" smtClean="0"/>
+              <a:rPr lang="en-US"/>
               <a:t>Third level</a:t>
             </a:r>
           </a:p>
           <a:p>
             <a:pPr lvl="3"/>
             <a:r>
-              <a:rPr lang="en-US" smtClean="0"/>
+              <a:rPr lang="en-US"/>
               <a:t>Fourth level</a:t>
             </a:r>
           </a:p>
           <a:p>
             <a:pPr lvl="4"/>
             <a:r>
-              <a:rPr lang="en-US" smtClean="0"/>
+              <a:rPr lang="en-US"/>
               <a:t>Fifth level</a:t>
             </a:r>
-            <a:endParaRPr lang="en-US"/>
           </a:p>
         </p:txBody>
       </p:sp>
@@ -7314,10 +7278,9 @@
           <a:lstStyle/>
           <a:p>
             <a:r>
-              <a:rPr lang="en-US" smtClean="0"/>
+              <a:rPr lang="en-US"/>
               <a:t>Click to edit Master title style</a:t>
             </a:r>
-            <a:endParaRPr lang="en-US"/>
           </a:p>
         </p:txBody>
       </p:sp>
@@ -7371,38 +7334,37 @@
           <a:p>
             <a:pPr lvl="0"/>
             <a:r>
-              <a:rPr lang="en-US" smtClean="0"/>
+              <a:rPr lang="en-US"/>
               <a:t>Click to edit Master text styles</a:t>
             </a:r>
           </a:p>
           <a:p>
             <a:pPr lvl="1"/>
             <a:r>
-              <a:rPr lang="en-US" smtClean="0"/>
+              <a:rPr lang="en-US"/>
               <a:t>Second level</a:t>
             </a:r>
           </a:p>
           <a:p>
             <a:pPr lvl="2"/>
             <a:r>
-              <a:rPr lang="en-US" smtClean="0"/>
+              <a:rPr lang="en-US"/>
               <a:t>Third level</a:t>
             </a:r>
           </a:p>
           <a:p>
             <a:pPr lvl="3"/>
             <a:r>
-              <a:rPr lang="en-US" smtClean="0"/>
+              <a:rPr lang="en-US"/>
               <a:t>Fourth level</a:t>
             </a:r>
           </a:p>
           <a:p>
             <a:pPr lvl="4"/>
             <a:r>
-              <a:rPr lang="en-US" smtClean="0"/>
+              <a:rPr lang="en-US"/>
               <a:t>Fifth level</a:t>
             </a:r>
-            <a:endParaRPr lang="en-US"/>
           </a:p>
         </p:txBody>
       </p:sp>
@@ -7456,38 +7418,37 @@
           <a:p>
             <a:pPr lvl="0"/>
             <a:r>
-              <a:rPr lang="en-US" smtClean="0"/>
+              <a:rPr lang="en-US"/>
               <a:t>Click to edit Master text styles</a:t>
             </a:r>
           </a:p>
           <a:p>
             <a:pPr lvl="1"/>
             <a:r>
-              <a:rPr lang="en-US" smtClean="0"/>
+              <a:rPr lang="en-US"/>
               <a:t>Second level</a:t>
             </a:r>
           </a:p>
           <a:p>
             <a:pPr lvl="2"/>
             <a:r>
-              <a:rPr lang="en-US" smtClean="0"/>
+              <a:rPr lang="en-US"/>
               <a:t>Third level</a:t>
             </a:r>
           </a:p>
           <a:p>
             <a:pPr lvl="3"/>
             <a:r>
-              <a:rPr lang="en-US" smtClean="0"/>
+              <a:rPr lang="en-US"/>
               <a:t>Fourth level</a:t>
             </a:r>
           </a:p>
           <a:p>
             <a:pPr lvl="4"/>
             <a:r>
-              <a:rPr lang="en-US" smtClean="0"/>
+              <a:rPr lang="en-US"/>
               <a:t>Fifth level</a:t>
             </a:r>
-            <a:endParaRPr lang="en-US"/>
           </a:p>
         </p:txBody>
       </p:sp>
@@ -7641,10 +7602,9 @@
           </a:lstStyle>
           <a:p>
             <a:r>
-              <a:rPr lang="en-US" smtClean="0"/>
+              <a:rPr lang="en-US"/>
               <a:t>Click to edit Master title style</a:t>
             </a:r>
-            <a:endParaRPr lang="en-US"/>
           </a:p>
         </p:txBody>
       </p:sp>
@@ -7707,7 +7667,7 @@
           <a:p>
             <a:pPr lvl="0"/>
             <a:r>
-              <a:rPr lang="en-US" smtClean="0"/>
+              <a:rPr lang="en-US"/>
               <a:t>Click to edit Master text styles</a:t>
             </a:r>
           </a:p>
@@ -7763,38 +7723,37 @@
           <a:p>
             <a:pPr lvl="0"/>
             <a:r>
-              <a:rPr lang="en-US" smtClean="0"/>
+              <a:rPr lang="en-US"/>
               <a:t>Click to edit Master text styles</a:t>
             </a:r>
           </a:p>
           <a:p>
             <a:pPr lvl="1"/>
             <a:r>
-              <a:rPr lang="en-US" smtClean="0"/>
+              <a:rPr lang="en-US"/>
               <a:t>Second level</a:t>
             </a:r>
           </a:p>
           <a:p>
             <a:pPr lvl="2"/>
             <a:r>
-              <a:rPr lang="en-US" smtClean="0"/>
+              <a:rPr lang="en-US"/>
               <a:t>Third level</a:t>
             </a:r>
           </a:p>
           <a:p>
             <a:pPr lvl="3"/>
             <a:r>
-              <a:rPr lang="en-US" smtClean="0"/>
+              <a:rPr lang="en-US"/>
               <a:t>Fourth level</a:t>
             </a:r>
           </a:p>
           <a:p>
             <a:pPr lvl="4"/>
             <a:r>
-              <a:rPr lang="en-US" smtClean="0"/>
+              <a:rPr lang="en-US"/>
               <a:t>Fifth level</a:t>
             </a:r>
-            <a:endParaRPr lang="en-US"/>
           </a:p>
         </p:txBody>
       </p:sp>
@@ -7857,7 +7816,7 @@
           <a:p>
             <a:pPr lvl="0"/>
             <a:r>
-              <a:rPr lang="en-US" smtClean="0"/>
+              <a:rPr lang="en-US"/>
               <a:t>Click to edit Master text styles</a:t>
             </a:r>
           </a:p>
@@ -7913,38 +7872,37 @@
           <a:p>
             <a:pPr lvl="0"/>
             <a:r>
-              <a:rPr lang="en-US" smtClean="0"/>
+              <a:rPr lang="en-US"/>
               <a:t>Click to edit Master text styles</a:t>
             </a:r>
           </a:p>
           <a:p>
             <a:pPr lvl="1"/>
             <a:r>
-              <a:rPr lang="en-US" smtClean="0"/>
+              <a:rPr lang="en-US"/>
               <a:t>Second level</a:t>
             </a:r>
           </a:p>
           <a:p>
             <a:pPr lvl="2"/>
             <a:r>
-              <a:rPr lang="en-US" smtClean="0"/>
+              <a:rPr lang="en-US"/>
               <a:t>Third level</a:t>
             </a:r>
           </a:p>
           <a:p>
             <a:pPr lvl="3"/>
             <a:r>
-              <a:rPr lang="en-US" smtClean="0"/>
+              <a:rPr lang="en-US"/>
               <a:t>Fourth level</a:t>
             </a:r>
           </a:p>
           <a:p>
             <a:pPr lvl="4"/>
             <a:r>
-              <a:rPr lang="en-US" smtClean="0"/>
+              <a:rPr lang="en-US"/>
               <a:t>Fifth level</a:t>
             </a:r>
-            <a:endParaRPr lang="en-US"/>
           </a:p>
         </p:txBody>
       </p:sp>
@@ -8089,10 +8047,9 @@
           <a:lstStyle/>
           <a:p>
             <a:r>
-              <a:rPr lang="en-US" smtClean="0"/>
+              <a:rPr lang="en-US"/>
               <a:t>Click to edit Master title style</a:t>
             </a:r>
-            <a:endParaRPr lang="en-US"/>
           </a:p>
         </p:txBody>
       </p:sp>
@@ -8371,10 +8328,9 @@
           </a:lstStyle>
           <a:p>
             <a:r>
-              <a:rPr lang="en-US" smtClean="0"/>
+              <a:rPr lang="en-US"/>
               <a:t>Click to edit Master title style</a:t>
             </a:r>
-            <a:endParaRPr lang="en-US"/>
           </a:p>
         </p:txBody>
       </p:sp>
@@ -8428,38 +8384,37 @@
           <a:p>
             <a:pPr lvl="0"/>
             <a:r>
-              <a:rPr lang="en-US" smtClean="0"/>
+              <a:rPr lang="en-US"/>
               <a:t>Click to edit Master text styles</a:t>
             </a:r>
           </a:p>
           <a:p>
             <a:pPr lvl="1"/>
             <a:r>
-              <a:rPr lang="en-US" smtClean="0"/>
+              <a:rPr lang="en-US"/>
               <a:t>Second level</a:t>
             </a:r>
           </a:p>
           <a:p>
             <a:pPr lvl="2"/>
             <a:r>
-              <a:rPr lang="en-US" smtClean="0"/>
+              <a:rPr lang="en-US"/>
               <a:t>Third level</a:t>
             </a:r>
           </a:p>
           <a:p>
             <a:pPr lvl="3"/>
             <a:r>
-              <a:rPr lang="en-US" smtClean="0"/>
+              <a:rPr lang="en-US"/>
               <a:t>Fourth level</a:t>
             </a:r>
           </a:p>
           <a:p>
             <a:pPr lvl="4"/>
             <a:r>
-              <a:rPr lang="en-US" smtClean="0"/>
+              <a:rPr lang="en-US"/>
               <a:t>Fifth level</a:t>
             </a:r>
-            <a:endParaRPr lang="en-US"/>
           </a:p>
         </p:txBody>
       </p:sp>
@@ -8522,7 +8477,7 @@
           <a:p>
             <a:pPr lvl="0"/>
             <a:r>
-              <a:rPr lang="en-US" smtClean="0"/>
+              <a:rPr lang="en-US"/>
               <a:t>Click to edit Master text styles</a:t>
             </a:r>
           </a:p>
@@ -8678,10 +8633,9 @@
           </a:lstStyle>
           <a:p>
             <a:r>
-              <a:rPr lang="en-US" smtClean="0"/>
+              <a:rPr lang="en-US"/>
               <a:t>Click to edit Master title style</a:t>
             </a:r>
-            <a:endParaRPr lang="en-US"/>
           </a:p>
         </p:txBody>
       </p:sp>
@@ -8743,7 +8697,7 @@
           </a:lstStyle>
           <a:p>
             <a:pPr lvl="0"/>
-            <a:endParaRPr lang="en-US" noProof="0" smtClean="0"/>
+            <a:endParaRPr lang="en-US" noProof="0"/>
           </a:p>
         </p:txBody>
       </p:sp>
@@ -8806,7 +8760,7 @@
           <a:p>
             <a:pPr lvl="0"/>
             <a:r>
-              <a:rPr lang="en-US" smtClean="0"/>
+              <a:rPr lang="en-US"/>
               <a:t>Click to edit Master text styles</a:t>
             </a:r>
           </a:p>
@@ -9051,7 +9005,7 @@
           <a:p>
             <a:pPr lvl="0"/>
             <a:r>
-              <a:rPr lang="nl-NL" smtClean="0"/>
+              <a:rPr lang="nl-NL"/>
               <a:t>Click to edit Master title style</a:t>
             </a:r>
           </a:p>
@@ -9378,35 +9332,35 @@
           <a:p>
             <a:pPr lvl="0"/>
             <a:r>
-              <a:rPr lang="nl-NL" smtClean="0"/>
+              <a:rPr lang="nl-NL"/>
               <a:t>Click to edit Master text styles</a:t>
             </a:r>
           </a:p>
           <a:p>
             <a:pPr lvl="1"/>
             <a:r>
-              <a:rPr lang="nl-NL" smtClean="0"/>
+              <a:rPr lang="nl-NL"/>
               <a:t>Second level</a:t>
             </a:r>
           </a:p>
           <a:p>
             <a:pPr lvl="2"/>
             <a:r>
-              <a:rPr lang="nl-NL" smtClean="0"/>
+              <a:rPr lang="nl-NL"/>
               <a:t>Third level</a:t>
             </a:r>
           </a:p>
           <a:p>
             <a:pPr lvl="3"/>
             <a:r>
-              <a:rPr lang="nl-NL" smtClean="0"/>
+              <a:rPr lang="nl-NL"/>
               <a:t>Fourth level</a:t>
             </a:r>
           </a:p>
           <a:p>
             <a:pPr lvl="4"/>
             <a:r>
-              <a:rPr lang="nl-NL" smtClean="0"/>
+              <a:rPr lang="nl-NL"/>
               <a:t>Fifth level</a:t>
             </a:r>
           </a:p>
@@ -10016,7 +9970,7 @@
           <a:p>
             <a:pPr lvl="0"/>
             <a:r>
-              <a:rPr lang="nl-NL" smtClean="0"/>
+              <a:rPr lang="nl-NL"/>
               <a:t>Click to edit Master title style</a:t>
             </a:r>
           </a:p>
@@ -10289,35 +10243,35 @@
           <a:p>
             <a:pPr lvl="0"/>
             <a:r>
-              <a:rPr lang="nl-NL" smtClean="0"/>
+              <a:rPr lang="nl-NL"/>
               <a:t>Click to edit Master text styles</a:t>
             </a:r>
           </a:p>
           <a:p>
             <a:pPr lvl="1"/>
             <a:r>
-              <a:rPr lang="nl-NL" smtClean="0"/>
+              <a:rPr lang="nl-NL"/>
               <a:t>Second level</a:t>
             </a:r>
           </a:p>
           <a:p>
             <a:pPr lvl="2"/>
             <a:r>
-              <a:rPr lang="nl-NL" smtClean="0"/>
+              <a:rPr lang="nl-NL"/>
               <a:t>Third level</a:t>
             </a:r>
           </a:p>
           <a:p>
             <a:pPr lvl="3"/>
             <a:r>
-              <a:rPr lang="nl-NL" smtClean="0"/>
+              <a:rPr lang="nl-NL"/>
               <a:t>Fourth level</a:t>
             </a:r>
           </a:p>
           <a:p>
             <a:pPr lvl="4"/>
             <a:r>
-              <a:rPr lang="nl-NL" smtClean="0"/>
+              <a:rPr lang="nl-NL"/>
               <a:t>Fifth level</a:t>
             </a:r>
           </a:p>
@@ -10927,7 +10881,7 @@
           <a:p>
             <a:pPr lvl="0"/>
             <a:r>
-              <a:rPr lang="nl-NL" smtClean="0"/>
+              <a:rPr lang="nl-NL"/>
               <a:t>Click to edit Master title style</a:t>
             </a:r>
           </a:p>
@@ -11200,35 +11154,35 @@
           <a:p>
             <a:pPr lvl="0"/>
             <a:r>
-              <a:rPr lang="nl-NL" smtClean="0"/>
+              <a:rPr lang="nl-NL"/>
               <a:t>Click to edit Master text styles</a:t>
             </a:r>
           </a:p>
           <a:p>
             <a:pPr lvl="1"/>
             <a:r>
-              <a:rPr lang="nl-NL" smtClean="0"/>
+              <a:rPr lang="nl-NL"/>
               <a:t>Second level</a:t>
             </a:r>
           </a:p>
           <a:p>
             <a:pPr lvl="2"/>
             <a:r>
-              <a:rPr lang="nl-NL" smtClean="0"/>
+              <a:rPr lang="nl-NL"/>
               <a:t>Third level</a:t>
             </a:r>
           </a:p>
           <a:p>
             <a:pPr lvl="3"/>
             <a:r>
-              <a:rPr lang="nl-NL" smtClean="0"/>
+              <a:rPr lang="nl-NL"/>
               <a:t>Fourth level</a:t>
             </a:r>
           </a:p>
           <a:p>
             <a:pPr lvl="4"/>
             <a:r>
-              <a:rPr lang="nl-NL" smtClean="0"/>
+              <a:rPr lang="nl-NL"/>
               <a:t>Fifth level</a:t>
             </a:r>
           </a:p>
@@ -11692,7 +11646,7 @@
           <a:p>
             <a:pPr eaLnBrk="1" hangingPunct="1"/>
             <a:r>
-              <a:rPr lang="en-US" dirty="0" smtClean="0"/>
+              <a:rPr lang="en-US" dirty="0"/>
               <a:t>Aggregation on Dot map</a:t>
             </a:r>
           </a:p>
@@ -11720,45 +11674,45 @@
           <a:p>
             <a:pPr eaLnBrk="1" hangingPunct="1"/>
             <a:r>
-              <a:rPr lang="en-US" dirty="0" smtClean="0"/>
+              <a:rPr lang="en-US" dirty="0"/>
               <a:t>Group 7</a:t>
             </a:r>
           </a:p>
           <a:p>
             <a:pPr eaLnBrk="1" hangingPunct="1"/>
             <a:r>
-              <a:rPr lang="en-US" dirty="0" err="1" smtClean="0"/>
+              <a:rPr lang="en-US" dirty="0" err="1"/>
               <a:t>Jiaqi</a:t>
             </a:r>
             <a:r>
-              <a:rPr lang="en-US" dirty="0" smtClean="0"/>
+              <a:rPr lang="en-US" dirty="0"/>
               <a:t> Ni</a:t>
             </a:r>
           </a:p>
           <a:p>
             <a:pPr eaLnBrk="1" hangingPunct="1"/>
             <a:r>
-              <a:rPr lang="en-US" dirty="0" err="1" smtClean="0"/>
+              <a:rPr lang="en-US" dirty="0" err="1"/>
               <a:t>Kalina</a:t>
             </a:r>
             <a:r>
-              <a:rPr lang="en-US" dirty="0" smtClean="0"/>
+              <a:rPr lang="en-US" dirty="0"/>
               <a:t> </a:t>
             </a:r>
             <a:r>
-              <a:rPr lang="en-US" dirty="0" err="1" smtClean="0"/>
+              <a:rPr lang="en-US" dirty="0" err="1"/>
               <a:t>Petreva</a:t>
             </a:r>
-            <a:endParaRPr lang="en-US" dirty="0" smtClean="0"/>
+            <a:endParaRPr lang="en-US" dirty="0"/>
           </a:p>
           <a:p>
             <a:pPr eaLnBrk="1" hangingPunct="1"/>
             <a:r>
-              <a:rPr lang="en-US" dirty="0" err="1" smtClean="0"/>
+              <a:rPr lang="en-US" dirty="0" err="1"/>
               <a:t>Radu</a:t>
             </a:r>
             <a:r>
-              <a:rPr lang="en-US" dirty="0" smtClean="0"/>
+              <a:rPr lang="en-US" dirty="0"/>
               <a:t> Alex</a:t>
             </a:r>
           </a:p>
@@ -11769,13 +11723,6 @@
   <p:clrMapOvr>
     <a:masterClrMapping/>
   </p:clrMapOvr>
-  <p:timing>
-    <p:tnLst>
-      <p:par>
-        <p:cTn id="1" dur="indefinite" restart="never" nodeType="tmRoot"/>
-      </p:par>
-    </p:tnLst>
-  </p:timing>
 </p:sld>
 </file>
 
@@ -11812,7 +11759,7 @@
           <a:lstStyle/>
           <a:p>
             <a:r>
-              <a:rPr lang="en-US" altLang="nl-NL" dirty="0" smtClean="0"/>
+              <a:rPr lang="en-US" altLang="nl-NL" dirty="0"/>
               <a:t>Problems </a:t>
             </a:r>
           </a:p>
@@ -11841,76 +11788,93 @@
             <a:pPr lvl="1"/>
             <a:r>
               <a:rPr lang="en-US" altLang="nl-NL" sz="2800" dirty="0"/>
-              <a:t>Color of the </a:t>
-            </a:r>
-            <a:r>
-              <a:rPr lang="en-US" altLang="nl-NL" sz="2800" dirty="0" smtClean="0"/>
-              <a:t>dot – solution 1</a:t>
+              <a:t>Color of the dot</a:t>
+            </a:r>
+            <a:r>
+              <a:rPr lang="ro-RO" altLang="nl-NL" sz="2800" dirty="0"/>
+              <a:t> – Solution</a:t>
             </a:r>
           </a:p>
           <a:p>
             <a:pPr lvl="2"/>
             <a:r>
-              <a:rPr lang="en-US" altLang="nl-NL" sz="1800" dirty="0" smtClean="0">
-                <a:solidFill>
-                  <a:srgbClr val="FF0000"/>
-                </a:solidFill>
-              </a:rPr>
-              <a:t>50% green</a:t>
-            </a:r>
-            <a:r>
-              <a:rPr lang="en-US" altLang="nl-NL" sz="1800" dirty="0" smtClean="0"/>
-              <a:t>	</a:t>
+              <a:rPr lang="ro-RO" altLang="nl-NL" sz="2800" dirty="0"/>
+              <a:t>Use a rainbow palette</a:t>
             </a:r>
           </a:p>
           <a:p>
             <a:pPr lvl="2"/>
             <a:r>
-              <a:rPr lang="en-US" altLang="nl-NL" sz="1800" dirty="0" smtClean="0"/>
-              <a:t>20% blue		</a:t>
+              <a:rPr lang="ro-RO" altLang="nl-NL" sz="2800" dirty="0"/>
+              <a:t>Nr of categories = k</a:t>
             </a:r>
           </a:p>
           <a:p>
             <a:pPr lvl="2"/>
             <a:r>
-              <a:rPr lang="en-US" altLang="nl-NL" sz="1800" dirty="0" smtClean="0"/>
-              <a:t>10% red		</a:t>
+              <a:rPr lang="ro-RO" altLang="nl-NL" sz="2800" dirty="0"/>
+              <a:t>For each k = 1 color =&gt; k different colors.</a:t>
             </a:r>
           </a:p>
           <a:p>
             <a:pPr lvl="2"/>
             <a:r>
-              <a:rPr lang="en-US" altLang="nl-NL" sz="1800" dirty="0" smtClean="0"/>
-              <a:t>10% yellow	</a:t>
+              <a:rPr lang="ro-RO" altLang="nl-NL" sz="2800" dirty="0"/>
+              <a:t>Calculate ratio = 1/k.</a:t>
             </a:r>
           </a:p>
           <a:p>
             <a:pPr lvl="2"/>
             <a:r>
-              <a:rPr lang="en-US" altLang="nl-NL" sz="1800" dirty="0" smtClean="0"/>
-              <a:t>10% black	</a:t>
-            </a:r>
+              <a:rPr lang="ro-RO" altLang="nl-NL" sz="2800" dirty="0"/>
+              <a:t>For category i the color = ratio * i, </a:t>
+            </a:r>
+          </a:p>
+          <a:p>
+            <a:pPr marL="1549400" lvl="5" indent="0">
+              <a:buNone/>
+            </a:pPr>
+            <a:r>
+              <a:rPr lang="ro-RO" altLang="nl-NL" sz="2800" dirty="0"/>
+              <a:t>			where 0 &lt; ratio * i &lt;= 1</a:t>
+            </a:r>
+          </a:p>
+          <a:p>
+            <a:pPr lvl="2"/>
+            <a:endParaRPr lang="en-US" altLang="nl-NL" sz="2800" dirty="0"/>
           </a:p>
         </p:txBody>
       </p:sp>
       <p:pic>
         <p:nvPicPr>
-          <p:cNvPr id="3" name="Picture 2"/>
+          <p:cNvPr id="4" name="Picture 3">
+            <a:extLst>
+              <a:ext uri="{FF2B5EF4-FFF2-40B4-BE49-F238E27FC236}">
+                <a16:creationId xmlns:a16="http://schemas.microsoft.com/office/drawing/2014/main" id="{FD054822-F023-4BCD-A593-E1581C64B41C}"/>
+              </a:ext>
+            </a:extLst>
+          </p:cNvPr>
           <p:cNvPicPr>
             <a:picLocks noChangeAspect="1"/>
           </p:cNvPicPr>
           <p:nvPr/>
         </p:nvPicPr>
         <p:blipFill>
-          <a:blip r:embed="rId2"/>
+          <a:blip r:embed="rId2" cstate="print">
+            <a:extLst>
+              <a:ext uri="{28A0092B-C50C-407E-A947-70E740481C1C}">
+                <a14:useLocalDpi xmlns:a14="http://schemas.microsoft.com/office/drawing/2010/main" val="0"/>
+              </a:ext>
+            </a:extLst>
+          </a:blip>
           <a:stretch>
             <a:fillRect/>
           </a:stretch>
         </p:blipFill>
         <p:spPr>
           <a:xfrm>
-            <a:off x="1079612" y="4113076"/>
-            <a:ext cx="3312368" cy="2204559"/>
+            <a:off x="6084168" y="1808820"/>
+            <a:ext cx="1383815" cy="778396"/>
           </a:xfrm>
           <a:prstGeom prst="rect">
             <a:avLst/>
@@ -11920,25 +11884,18 @@
     </p:spTree>
     <p:extLst>
       <p:ext uri="{BB962C8B-B14F-4D97-AF65-F5344CB8AC3E}">
-        <p14:creationId xmlns:p14="http://schemas.microsoft.com/office/powerpoint/2010/main" val="570575025"/>
+        <p14:creationId xmlns:p14="http://schemas.microsoft.com/office/powerpoint/2010/main" val="2566748092"/>
       </p:ext>
     </p:extLst>
   </p:cSld>
   <p:clrMapOvr>
     <a:masterClrMapping/>
   </p:clrMapOvr>
-  <p:timing>
-    <p:tnLst>
-      <p:par>
-        <p:cTn id="1" dur="indefinite" restart="never" nodeType="tmRoot"/>
-      </p:par>
-    </p:tnLst>
-  </p:timing>
 </p:sld>
 </file>
 
 <file path=ppt/slides/slide11.xml><?xml version="1.0" encoding="utf-8"?>
-<p:sld xmlns:a="http://schemas.openxmlformats.org/drawingml/2006/main" xmlns:r="http://schemas.openxmlformats.org/officeDocument/2006/relationships" xmlns:p="http://schemas.openxmlformats.org/presentationml/2006/main">
+<p:sld xmlns:a="http://schemas.openxmlformats.org/drawingml/2006/main" xmlns:r="http://schemas.openxmlformats.org/officeDocument/2006/relationships" xmlns:p="http://schemas.openxmlformats.org/presentationml/2006/main" show="0">
   <p:cSld>
     <p:spTree>
       <p:nvGrpSpPr>
@@ -11970,7 +11927,7 @@
           <a:lstStyle/>
           <a:p>
             <a:r>
-              <a:rPr lang="en-US" altLang="nl-NL" dirty="0" smtClean="0"/>
+              <a:rPr lang="en-US" altLang="nl-NL" dirty="0"/>
               <a:t>Problems </a:t>
             </a:r>
           </a:p>
@@ -11999,50 +11956,50 @@
             <a:pPr lvl="1"/>
             <a:r>
               <a:rPr lang="en-US" altLang="nl-NL" sz="2800" dirty="0"/>
-              <a:t>Color of the </a:t>
-            </a:r>
-            <a:r>
-              <a:rPr lang="en-US" altLang="nl-NL" sz="2800" dirty="0" smtClean="0"/>
-              <a:t>dot – solution 2</a:t>
+              <a:t>Color of the dot – solution 1</a:t>
             </a:r>
           </a:p>
           <a:p>
             <a:pPr lvl="2"/>
             <a:r>
-              <a:rPr lang="en-US" altLang="nl-NL" sz="1800" dirty="0" smtClean="0"/>
-              <a:t>50% green	/ 60% green</a:t>
-            </a:r>
-          </a:p>
-          <a:p>
-            <a:pPr lvl="2"/>
-            <a:r>
-              <a:rPr lang="en-US" altLang="nl-NL" sz="1800" dirty="0" smtClean="0"/>
-              <a:t>20% blue		/15% blue</a:t>
-            </a:r>
-          </a:p>
-          <a:p>
-            <a:pPr lvl="2"/>
-            <a:r>
-              <a:rPr lang="en-US" altLang="nl-NL" sz="1800" dirty="0" smtClean="0"/>
-              <a:t>10% red		/10% red</a:t>
-            </a:r>
-          </a:p>
-          <a:p>
-            <a:pPr lvl="2"/>
-            <a:r>
-              <a:rPr lang="en-US" altLang="nl-NL" sz="1800" dirty="0" smtClean="0"/>
-              <a:t>10% yellow	/10% yellow</a:t>
-            </a:r>
-          </a:p>
-          <a:p>
-            <a:pPr lvl="2"/>
-            <a:r>
-              <a:rPr lang="en-US" altLang="nl-NL" sz="1800" dirty="0" smtClean="0">
+              <a:rPr lang="en-US" altLang="nl-NL" sz="1800" dirty="0">
                 <a:solidFill>
                   <a:srgbClr val="FF0000"/>
                 </a:solidFill>
               </a:rPr>
-              <a:t>10% black	/5%black</a:t>
+              <a:t>50% green</a:t>
+            </a:r>
+            <a:r>
+              <a:rPr lang="en-US" altLang="nl-NL" sz="1800" dirty="0"/>
+              <a:t>	</a:t>
+            </a:r>
+          </a:p>
+          <a:p>
+            <a:pPr lvl="2"/>
+            <a:r>
+              <a:rPr lang="en-US" altLang="nl-NL" sz="1800" dirty="0"/>
+              <a:t>20% blue		</a:t>
+            </a:r>
+          </a:p>
+          <a:p>
+            <a:pPr lvl="2"/>
+            <a:r>
+              <a:rPr lang="en-US" altLang="nl-NL" sz="1800" dirty="0"/>
+              <a:t>10% red		</a:t>
+            </a:r>
+          </a:p>
+          <a:p>
+            <a:pPr lvl="2"/>
+            <a:r>
+              <a:rPr lang="en-US" altLang="nl-NL" sz="1800" dirty="0"/>
+              <a:t>10% yellow	</a:t>
+            </a:r>
+          </a:p>
+          <a:p>
+            <a:pPr lvl="2"/>
+            <a:r>
+              <a:rPr lang="en-US" altLang="nl-NL" sz="1800" dirty="0"/>
+              <a:t>10% black	</a:t>
             </a:r>
           </a:p>
         </p:txBody>
@@ -12074,25 +12031,18 @@
     </p:spTree>
     <p:extLst>
       <p:ext uri="{BB962C8B-B14F-4D97-AF65-F5344CB8AC3E}">
-        <p14:creationId xmlns:p14="http://schemas.microsoft.com/office/powerpoint/2010/main" val="1325705847"/>
+        <p14:creationId xmlns:p14="http://schemas.microsoft.com/office/powerpoint/2010/main" val="570575025"/>
       </p:ext>
     </p:extLst>
   </p:cSld>
   <p:clrMapOvr>
     <a:masterClrMapping/>
   </p:clrMapOvr>
-  <p:timing>
-    <p:tnLst>
-      <p:par>
-        <p:cTn id="1" dur="indefinite" restart="never" nodeType="tmRoot"/>
-      </p:par>
-    </p:tnLst>
-  </p:timing>
 </p:sld>
 </file>
 
 <file path=ppt/slides/slide12.xml><?xml version="1.0" encoding="utf-8"?>
-<p:sld xmlns:a="http://schemas.openxmlformats.org/drawingml/2006/main" xmlns:r="http://schemas.openxmlformats.org/officeDocument/2006/relationships" xmlns:p="http://schemas.openxmlformats.org/presentationml/2006/main">
+<p:sld xmlns:a="http://schemas.openxmlformats.org/drawingml/2006/main" xmlns:r="http://schemas.openxmlformats.org/officeDocument/2006/relationships" xmlns:p="http://schemas.openxmlformats.org/presentationml/2006/main" show="0">
   <p:cSld>
     <p:spTree>
       <p:nvGrpSpPr>
@@ -12124,7 +12074,7 @@
           <a:lstStyle/>
           <a:p>
             <a:r>
-              <a:rPr lang="en-US" altLang="nl-NL" dirty="0" smtClean="0"/>
+              <a:rPr lang="en-US" altLang="nl-NL" dirty="0"/>
               <a:t>Problems </a:t>
             </a:r>
           </a:p>
@@ -12153,82 +12103,46 @@
             <a:pPr lvl="1"/>
             <a:r>
               <a:rPr lang="en-US" altLang="nl-NL" sz="2800" dirty="0"/>
-              <a:t>Color of the </a:t>
-            </a:r>
-            <a:r>
-              <a:rPr lang="en-US" altLang="nl-NL" sz="2800" dirty="0" smtClean="0"/>
-              <a:t>dot – solution 3 (implemented)</a:t>
+              <a:t>Color of the dot – solution 2</a:t>
             </a:r>
           </a:p>
           <a:p>
             <a:pPr lvl="2"/>
             <a:r>
-              <a:rPr lang="en-US" altLang="nl-NL" sz="1800" dirty="0" smtClean="0">
+              <a:rPr lang="en-US" altLang="nl-NL" sz="1800" dirty="0"/>
+              <a:t>50% green	/ 60% green</a:t>
+            </a:r>
+          </a:p>
+          <a:p>
+            <a:pPr lvl="2"/>
+            <a:r>
+              <a:rPr lang="en-US" altLang="nl-NL" sz="1800" dirty="0"/>
+              <a:t>20% blue		/15% blue</a:t>
+            </a:r>
+          </a:p>
+          <a:p>
+            <a:pPr lvl="2"/>
+            <a:r>
+              <a:rPr lang="en-US" altLang="nl-NL" sz="1800" dirty="0"/>
+              <a:t>10% red		/10% red</a:t>
+            </a:r>
+          </a:p>
+          <a:p>
+            <a:pPr lvl="2"/>
+            <a:r>
+              <a:rPr lang="en-US" altLang="nl-NL" sz="1800" dirty="0"/>
+              <a:t>10% yellow	/10% yellow</a:t>
+            </a:r>
+          </a:p>
+          <a:p>
+            <a:pPr lvl="2"/>
+            <a:r>
+              <a:rPr lang="en-US" altLang="nl-NL" sz="1800" dirty="0">
                 <a:solidFill>
                   <a:srgbClr val="FF0000"/>
                 </a:solidFill>
               </a:rPr>
-              <a:t>50% green	/ root 60% green</a:t>
-            </a:r>
-          </a:p>
-          <a:p>
-            <a:pPr lvl="2"/>
-            <a:r>
-              <a:rPr lang="en-US" altLang="nl-NL" sz="1800" dirty="0" smtClean="0"/>
-              <a:t>20% blue		/ </a:t>
-            </a:r>
-            <a:r>
-              <a:rPr lang="en-US" altLang="nl-NL" sz="1800" dirty="0"/>
-              <a:t>root </a:t>
-            </a:r>
-            <a:r>
-              <a:rPr lang="en-US" altLang="nl-NL" sz="1800" dirty="0" smtClean="0"/>
-              <a:t>15% blue</a:t>
-            </a:r>
-          </a:p>
-          <a:p>
-            <a:pPr lvl="2"/>
-            <a:r>
-              <a:rPr lang="en-US" altLang="nl-NL" sz="1800" dirty="0" smtClean="0"/>
-              <a:t>10% red		/</a:t>
-            </a:r>
-            <a:r>
-              <a:rPr lang="en-US" altLang="nl-NL" sz="1800" dirty="0"/>
-              <a:t> root </a:t>
-            </a:r>
-            <a:r>
-              <a:rPr lang="en-US" altLang="nl-NL" sz="1800" dirty="0" smtClean="0"/>
-              <a:t>10% red</a:t>
-            </a:r>
-          </a:p>
-          <a:p>
-            <a:pPr lvl="2"/>
-            <a:r>
-              <a:rPr lang="en-US" altLang="nl-NL" sz="1800" dirty="0" smtClean="0"/>
-              <a:t>10% yellow	/</a:t>
-            </a:r>
-            <a:r>
-              <a:rPr lang="en-US" altLang="nl-NL" sz="1800" dirty="0"/>
-              <a:t> root </a:t>
-            </a:r>
-            <a:r>
-              <a:rPr lang="en-US" altLang="nl-NL" sz="1800" dirty="0" smtClean="0"/>
-              <a:t>10% yellow</a:t>
-            </a:r>
-          </a:p>
-          <a:p>
-            <a:pPr lvl="2"/>
-            <a:r>
-              <a:rPr lang="en-US" altLang="nl-NL" sz="1800" dirty="0" smtClean="0"/>
-              <a:t>10% black	/</a:t>
-            </a:r>
-            <a:r>
-              <a:rPr lang="en-US" altLang="nl-NL" sz="1800" dirty="0"/>
-              <a:t> root </a:t>
-            </a:r>
-            <a:r>
-              <a:rPr lang="en-US" altLang="nl-NL" sz="1800" dirty="0" smtClean="0"/>
-              <a:t>5%black</a:t>
+              <a:t>10% black	/5%black</a:t>
             </a:r>
           </a:p>
         </p:txBody>
@@ -12260,25 +12174,18 @@
     </p:spTree>
     <p:extLst>
       <p:ext uri="{BB962C8B-B14F-4D97-AF65-F5344CB8AC3E}">
-        <p14:creationId xmlns:p14="http://schemas.microsoft.com/office/powerpoint/2010/main" val="3318231435"/>
+        <p14:creationId xmlns:p14="http://schemas.microsoft.com/office/powerpoint/2010/main" val="1325705847"/>
       </p:ext>
     </p:extLst>
   </p:cSld>
   <p:clrMapOvr>
     <a:masterClrMapping/>
   </p:clrMapOvr>
-  <p:timing>
-    <p:tnLst>
-      <p:par>
-        <p:cTn id="1" dur="indefinite" restart="never" nodeType="tmRoot"/>
-      </p:par>
-    </p:tnLst>
-  </p:timing>
 </p:sld>
 </file>
 
 <file path=ppt/slides/slide13.xml><?xml version="1.0" encoding="utf-8"?>
-<p:sld xmlns:a="http://schemas.openxmlformats.org/drawingml/2006/main" xmlns:r="http://schemas.openxmlformats.org/officeDocument/2006/relationships" xmlns:p="http://schemas.openxmlformats.org/presentationml/2006/main">
+<p:sld xmlns:a="http://schemas.openxmlformats.org/drawingml/2006/main" xmlns:r="http://schemas.openxmlformats.org/officeDocument/2006/relationships" xmlns:p="http://schemas.openxmlformats.org/presentationml/2006/main" show="0">
   <p:cSld>
     <p:spTree>
       <p:nvGrpSpPr>
@@ -12310,7 +12217,7 @@
           <a:lstStyle/>
           <a:p>
             <a:r>
-              <a:rPr lang="en-US" altLang="nl-NL" dirty="0" smtClean="0"/>
+              <a:rPr lang="en-US" altLang="nl-NL" dirty="0"/>
               <a:t>Problems </a:t>
             </a:r>
           </a:p>
@@ -12339,17 +12246,13 @@
             <a:pPr lvl="1"/>
             <a:r>
               <a:rPr lang="en-US" altLang="nl-NL" sz="2800" dirty="0"/>
-              <a:t>Color of the </a:t>
-            </a:r>
-            <a:r>
-              <a:rPr lang="en-US" altLang="nl-NL" sz="2800" dirty="0" smtClean="0"/>
-              <a:t>dot – solution 4</a:t>
+              <a:t>Color of the dot – solution 3 (implemented)</a:t>
             </a:r>
           </a:p>
           <a:p>
             <a:pPr lvl="2"/>
             <a:r>
-              <a:rPr lang="en-US" altLang="nl-NL" sz="1800" dirty="0" smtClean="0">
+              <a:rPr lang="en-US" altLang="nl-NL" sz="1800" dirty="0">
                 <a:solidFill>
                   <a:srgbClr val="FF0000"/>
                 </a:solidFill>
@@ -12360,73 +12263,29 @@
           <a:p>
             <a:pPr lvl="2"/>
             <a:r>
-              <a:rPr lang="en-US" altLang="nl-NL" sz="1800" dirty="0" smtClean="0"/>
-              <a:t>20% blue		/ </a:t>
-            </a:r>
-            <a:r>
               <a:rPr lang="en-US" altLang="nl-NL" sz="1800" dirty="0"/>
-              <a:t>root </a:t>
-            </a:r>
-            <a:r>
-              <a:rPr lang="en-US" altLang="nl-NL" sz="1800" dirty="0" smtClean="0"/>
-              <a:t>15% blue</a:t>
+              <a:t>20% blue		/ root 15% blue</a:t>
             </a:r>
           </a:p>
           <a:p>
             <a:pPr lvl="2"/>
             <a:r>
-              <a:rPr lang="en-US" altLang="nl-NL" sz="1800" dirty="0" smtClean="0"/>
-              <a:t>10% red		/</a:t>
-            </a:r>
-            <a:r>
               <a:rPr lang="en-US" altLang="nl-NL" sz="1800" dirty="0"/>
-              <a:t> root </a:t>
-            </a:r>
-            <a:r>
-              <a:rPr lang="en-US" altLang="nl-NL" sz="1800" dirty="0" smtClean="0"/>
-              <a:t>10% red</a:t>
+              <a:t>10% red		/ root 10% red</a:t>
             </a:r>
           </a:p>
           <a:p>
             <a:pPr lvl="2"/>
             <a:r>
-              <a:rPr lang="en-US" altLang="nl-NL" sz="1800" dirty="0" smtClean="0"/>
-              <a:t>10% yellow	/</a:t>
-            </a:r>
-            <a:r>
               <a:rPr lang="en-US" altLang="nl-NL" sz="1800" dirty="0"/>
-              <a:t> root </a:t>
-            </a:r>
-            <a:r>
-              <a:rPr lang="en-US" altLang="nl-NL" sz="1800" dirty="0" smtClean="0"/>
-              <a:t>10% yellow</a:t>
+              <a:t>10% yellow	/ root 10% yellow</a:t>
             </a:r>
           </a:p>
           <a:p>
             <a:pPr lvl="2"/>
             <a:r>
-              <a:rPr lang="en-US" altLang="nl-NL" sz="1800" dirty="0" smtClean="0">
-                <a:solidFill>
-                  <a:srgbClr val="FF0000"/>
-                </a:solidFill>
-              </a:rPr>
-              <a:t>10% black	/</a:t>
-            </a:r>
-            <a:r>
-              <a:rPr lang="en-US" altLang="nl-NL" sz="1800" dirty="0">
-                <a:solidFill>
-                  <a:srgbClr val="FF0000"/>
-                </a:solidFill>
-              </a:rPr>
-              <a:t> root </a:t>
-            </a:r>
-            <a:r>
-              <a:rPr lang="en-US" altLang="nl-NL" sz="1800" dirty="0" smtClean="0">
-                <a:solidFill>
-                  <a:srgbClr val="FF0000"/>
-                </a:solidFill>
-              </a:rPr>
-              <a:t>5%black</a:t>
+              <a:rPr lang="en-US" altLang="nl-NL" sz="1800" dirty="0"/>
+              <a:t>10% black	/ root 5%black</a:t>
             </a:r>
           </a:p>
         </p:txBody>
@@ -12458,25 +12317,18 @@
     </p:spTree>
     <p:extLst>
       <p:ext uri="{BB962C8B-B14F-4D97-AF65-F5344CB8AC3E}">
-        <p14:creationId xmlns:p14="http://schemas.microsoft.com/office/powerpoint/2010/main" val="3143489279"/>
+        <p14:creationId xmlns:p14="http://schemas.microsoft.com/office/powerpoint/2010/main" val="3318231435"/>
       </p:ext>
     </p:extLst>
   </p:cSld>
   <p:clrMapOvr>
     <a:masterClrMapping/>
   </p:clrMapOvr>
-  <p:timing>
-    <p:tnLst>
-      <p:par>
-        <p:cTn id="1" dur="indefinite" restart="never" nodeType="tmRoot"/>
-      </p:par>
-    </p:tnLst>
-  </p:timing>
 </p:sld>
 </file>
 
 <file path=ppt/slides/slide14.xml><?xml version="1.0" encoding="utf-8"?>
-<p:sld xmlns:a="http://schemas.openxmlformats.org/drawingml/2006/main" xmlns:r="http://schemas.openxmlformats.org/officeDocument/2006/relationships" xmlns:p="http://schemas.openxmlformats.org/presentationml/2006/main">
+<p:sld xmlns:a="http://schemas.openxmlformats.org/drawingml/2006/main" xmlns:r="http://schemas.openxmlformats.org/officeDocument/2006/relationships" xmlns:p="http://schemas.openxmlformats.org/presentationml/2006/main" show="0">
   <p:cSld>
     <p:spTree>
       <p:nvGrpSpPr>
@@ -12508,7 +12360,7 @@
           <a:lstStyle/>
           <a:p>
             <a:r>
-              <a:rPr lang="en-US" altLang="nl-NL" dirty="0" smtClean="0"/>
+              <a:rPr lang="en-US" altLang="nl-NL" dirty="0"/>
               <a:t>Problems </a:t>
             </a:r>
           </a:p>
@@ -12536,58 +12388,89 @@
           <a:p>
             <a:pPr lvl="1"/>
             <a:r>
-              <a:rPr lang="en-US" altLang="nl-NL" sz="2800" dirty="0" smtClean="0"/>
-              <a:t>Where to place the dot (2).</a:t>
+              <a:rPr lang="en-US" altLang="nl-NL" sz="2800" dirty="0"/>
+              <a:t>Color of the dot – solution 4</a:t>
             </a:r>
           </a:p>
           <a:p>
             <a:pPr lvl="2"/>
             <a:r>
-              <a:rPr lang="en-US" altLang="nl-NL" sz="2800" dirty="0" smtClean="0">
+              <a:rPr lang="en-US" altLang="nl-NL" sz="1800" dirty="0">
                 <a:solidFill>
-                  <a:schemeClr val="accent6"/>
+                  <a:srgbClr val="FF0000"/>
                 </a:solidFill>
               </a:rPr>
-              <a:t>Choose the middle dot’s position</a:t>
-            </a:r>
-          </a:p>
-          <a:p>
-            <a:pPr lvl="3"/>
-            <a:r>
-              <a:rPr lang="en-US" altLang="nl-NL" sz="1800" dirty="0" smtClean="0">
+              <a:t>50% green	/ root 60% green</a:t>
+            </a:r>
+          </a:p>
+          <a:p>
+            <a:pPr lvl="2"/>
+            <a:r>
+              <a:rPr lang="en-US" altLang="nl-NL" sz="1800" dirty="0"/>
+              <a:t>20% blue		/ root 15% blue</a:t>
+            </a:r>
+          </a:p>
+          <a:p>
+            <a:pPr lvl="2"/>
+            <a:r>
+              <a:rPr lang="en-US" altLang="nl-NL" sz="1800" dirty="0"/>
+              <a:t>10% red		/ root 10% red</a:t>
+            </a:r>
+          </a:p>
+          <a:p>
+            <a:pPr lvl="2"/>
+            <a:r>
+              <a:rPr lang="en-US" altLang="nl-NL" sz="1800" dirty="0"/>
+              <a:t>10% yellow	/ root 10% yellow</a:t>
+            </a:r>
+          </a:p>
+          <a:p>
+            <a:pPr lvl="2"/>
+            <a:r>
+              <a:rPr lang="en-US" altLang="nl-NL" sz="1800" dirty="0">
                 <a:solidFill>
-                  <a:schemeClr val="accent6"/>
+                  <a:srgbClr val="FF0000"/>
                 </a:solidFill>
               </a:rPr>
-              <a:t>Dots are stored in a list</a:t>
-            </a:r>
-          </a:p>
-          <a:p>
-            <a:pPr lvl="2"/>
-            <a:r>
-              <a:rPr lang="en-US" altLang="nl-NL" sz="2800" dirty="0" smtClean="0"/>
-              <a:t>Average of all chosen dots’ positions</a:t>
-            </a:r>
-          </a:p>
-        </p:txBody>
-      </p:sp>
+              <a:t>10% black	/ root 5%black</a:t>
+            </a:r>
+          </a:p>
+        </p:txBody>
+      </p:sp>
+      <p:pic>
+        <p:nvPicPr>
+          <p:cNvPr id="3" name="Picture 2"/>
+          <p:cNvPicPr>
+            <a:picLocks noChangeAspect="1"/>
+          </p:cNvPicPr>
+          <p:nvPr/>
+        </p:nvPicPr>
+        <p:blipFill>
+          <a:blip r:embed="rId2"/>
+          <a:stretch>
+            <a:fillRect/>
+          </a:stretch>
+        </p:blipFill>
+        <p:spPr>
+          <a:xfrm>
+            <a:off x="1079612" y="4113076"/>
+            <a:ext cx="3312368" cy="2204559"/>
+          </a:xfrm>
+          <a:prstGeom prst="rect">
+            <a:avLst/>
+          </a:prstGeom>
+        </p:spPr>
+      </p:pic>
     </p:spTree>
     <p:extLst>
       <p:ext uri="{BB962C8B-B14F-4D97-AF65-F5344CB8AC3E}">
-        <p14:creationId xmlns:p14="http://schemas.microsoft.com/office/powerpoint/2010/main" val="1181847411"/>
+        <p14:creationId xmlns:p14="http://schemas.microsoft.com/office/powerpoint/2010/main" val="3143489279"/>
       </p:ext>
     </p:extLst>
   </p:cSld>
   <p:clrMapOvr>
     <a:masterClrMapping/>
   </p:clrMapOvr>
-  <p:timing>
-    <p:tnLst>
-      <p:par>
-        <p:cTn id="1" dur="indefinite" restart="never" nodeType="tmRoot"/>
-      </p:par>
-    </p:tnLst>
-  </p:timing>
 </p:sld>
 </file>
 
@@ -12624,7 +12507,7 @@
           <a:lstStyle/>
           <a:p>
             <a:r>
-              <a:rPr lang="en-US" altLang="nl-NL" dirty="0" smtClean="0"/>
+              <a:rPr lang="en-US" altLang="nl-NL" dirty="0"/>
               <a:t>Problems </a:t>
             </a:r>
           </a:p>
@@ -12652,61 +12535,51 @@
           <a:p>
             <a:pPr lvl="1"/>
             <a:r>
-              <a:rPr lang="en-US" altLang="nl-NL" sz="2800" dirty="0" smtClean="0"/>
-              <a:t>Where to place the dot (3).</a:t>
+              <a:rPr lang="en-US" altLang="nl-NL" sz="2800" dirty="0"/>
+              <a:t>Where to place the dot (2).</a:t>
             </a:r>
           </a:p>
           <a:p>
             <a:pPr lvl="2"/>
             <a:r>
-              <a:rPr lang="en-US" altLang="zh-CN" sz="2800" dirty="0" smtClean="0"/>
-              <a:t>Solve the overlapping</a:t>
-            </a:r>
-            <a:endParaRPr lang="en-US" altLang="nl-NL" sz="2800" dirty="0" smtClean="0"/>
-          </a:p>
-        </p:txBody>
-      </p:sp>
-      <p:pic>
-        <p:nvPicPr>
-          <p:cNvPr id="3" name="Picture 2"/>
-          <p:cNvPicPr>
-            <a:picLocks noChangeAspect="1"/>
-          </p:cNvPicPr>
-          <p:nvPr/>
-        </p:nvPicPr>
-        <p:blipFill>
-          <a:blip r:embed="rId2"/>
-          <a:stretch>
-            <a:fillRect/>
-          </a:stretch>
-        </p:blipFill>
-        <p:spPr>
-          <a:xfrm>
-            <a:off x="1238013" y="3032956"/>
-            <a:ext cx="6741000" cy="2036800"/>
-          </a:xfrm>
-          <a:prstGeom prst="rect">
-            <a:avLst/>
-          </a:prstGeom>
-        </p:spPr>
-      </p:pic>
+              <a:rPr lang="en-US" altLang="nl-NL" sz="2800" dirty="0">
+                <a:solidFill>
+                  <a:schemeClr val="accent6"/>
+                </a:solidFill>
+              </a:rPr>
+              <a:t>Choose the middle dot’s position</a:t>
+            </a:r>
+          </a:p>
+          <a:p>
+            <a:pPr lvl="3"/>
+            <a:r>
+              <a:rPr lang="en-US" altLang="nl-NL" sz="1800" dirty="0">
+                <a:solidFill>
+                  <a:schemeClr val="accent6"/>
+                </a:solidFill>
+              </a:rPr>
+              <a:t>Dots are stored in a list</a:t>
+            </a:r>
+          </a:p>
+          <a:p>
+            <a:pPr lvl="2"/>
+            <a:r>
+              <a:rPr lang="en-US" altLang="nl-NL" sz="2800" dirty="0"/>
+              <a:t>Average of all chosen dots’ positions</a:t>
+            </a:r>
+          </a:p>
+        </p:txBody>
+      </p:sp>
     </p:spTree>
     <p:extLst>
       <p:ext uri="{BB962C8B-B14F-4D97-AF65-F5344CB8AC3E}">
-        <p14:creationId xmlns:p14="http://schemas.microsoft.com/office/powerpoint/2010/main" val="4172768736"/>
+        <p14:creationId xmlns:p14="http://schemas.microsoft.com/office/powerpoint/2010/main" val="1181847411"/>
       </p:ext>
     </p:extLst>
   </p:cSld>
   <p:clrMapOvr>
     <a:masterClrMapping/>
   </p:clrMapOvr>
-  <p:timing>
-    <p:tnLst>
-      <p:par>
-        <p:cTn id="1" dur="indefinite" restart="never" nodeType="tmRoot"/>
-      </p:par>
-    </p:tnLst>
-  </p:timing>
 </p:sld>
 </file>
 
@@ -12743,8 +12616,8 @@
           <a:lstStyle/>
           <a:p>
             <a:r>
-              <a:rPr lang="en-US" altLang="nl-NL" dirty="0" smtClean="0"/>
-              <a:t>Running time</a:t>
+              <a:rPr lang="en-US" altLang="nl-NL" dirty="0"/>
+              <a:t>Problems </a:t>
             </a:r>
           </a:p>
         </p:txBody>
@@ -12762,7 +12635,7 @@
         <p:spPr>
           <a:xfrm>
             <a:off x="611188" y="1600201"/>
-            <a:ext cx="7994650" cy="4025044"/>
+            <a:ext cx="7994650" cy="2332855"/>
           </a:xfrm>
         </p:spPr>
         <p:txBody>
@@ -12771,177 +12644,54 @@
           <a:p>
             <a:pPr lvl="1"/>
             <a:r>
-              <a:rPr lang="en-US" altLang="nl-NL" sz="2800" dirty="0" smtClean="0"/>
-              <a:t>Radius of the dot  = O(1)</a:t>
-            </a:r>
-          </a:p>
-          <a:p>
-            <a:pPr lvl="1"/>
-            <a:r>
               <a:rPr lang="en-US" altLang="nl-NL" sz="2800" dirty="0"/>
-              <a:t>How many people = 1 </a:t>
-            </a:r>
-            <a:r>
-              <a:rPr lang="en-US" altLang="nl-NL" sz="2800" dirty="0" smtClean="0"/>
-              <a:t>dot</a:t>
-            </a:r>
-            <a:r>
-              <a:rPr lang="en-US" altLang="nl-NL" sz="2800" dirty="0"/>
-              <a:t> </a:t>
-            </a:r>
-            <a:r>
-              <a:rPr lang="en-US" altLang="nl-NL" sz="2800" dirty="0" smtClean="0"/>
-              <a:t>= O(1)</a:t>
-            </a:r>
-          </a:p>
-          <a:p>
-            <a:pPr lvl="1"/>
-            <a:r>
-              <a:rPr lang="en-US" altLang="nl-NL" sz="2800" dirty="0" smtClean="0"/>
-              <a:t>Where </a:t>
-            </a:r>
-            <a:r>
-              <a:rPr lang="en-US" altLang="nl-NL" sz="2800" dirty="0"/>
-              <a:t>to place the </a:t>
-            </a:r>
-            <a:r>
-              <a:rPr lang="en-US" altLang="nl-NL" sz="2800" dirty="0" smtClean="0"/>
-              <a:t>dot</a:t>
-            </a:r>
-            <a:r>
-              <a:rPr lang="en-US" altLang="nl-NL" sz="2800" dirty="0"/>
-              <a:t> </a:t>
-            </a:r>
-            <a:r>
-              <a:rPr lang="en-US" altLang="nl-NL" sz="2800" dirty="0" smtClean="0"/>
-              <a:t>= </a:t>
-            </a:r>
-            <a:r>
-              <a:rPr lang="en-US" altLang="nl-NL" sz="2800" dirty="0" smtClean="0"/>
-              <a:t>O(n)</a:t>
-            </a:r>
-            <a:endParaRPr lang="en-US" altLang="nl-NL" sz="2800" dirty="0" smtClean="0"/>
+              <a:t>Where to place the dot (3).</a:t>
+            </a:r>
           </a:p>
           <a:p>
             <a:pPr lvl="2"/>
             <a:r>
-              <a:rPr lang="en-US" altLang="nl-NL" sz="1800" dirty="0" smtClean="0"/>
-              <a:t>Choose the middle point (O(1) </a:t>
-            </a:r>
-            <a:r>
-              <a:rPr lang="zh-CN" altLang="en-US" sz="1800" dirty="0" smtClean="0"/>
-              <a:t>* </a:t>
-            </a:r>
-            <a:r>
-              <a:rPr lang="en-US" altLang="zh-CN" sz="1800" dirty="0" smtClean="0"/>
-              <a:t>n</a:t>
-            </a:r>
-            <a:r>
-              <a:rPr lang="en-US" altLang="nl-NL" sz="1800" dirty="0" smtClean="0"/>
-              <a:t>)</a:t>
-            </a:r>
-          </a:p>
-          <a:p>
-            <a:pPr lvl="2"/>
-            <a:r>
-              <a:rPr lang="en-US" altLang="nl-NL" sz="1800" dirty="0" smtClean="0"/>
-              <a:t>Solve the overlap (</a:t>
-            </a:r>
-            <a:r>
-              <a:rPr lang="en-US" altLang="nl-NL" sz="1800" dirty="0" smtClean="0"/>
-              <a:t>O(n))</a:t>
-            </a:r>
-            <a:endParaRPr lang="en-US" altLang="nl-NL" sz="1800" dirty="0" smtClean="0">
-              <a:solidFill>
-                <a:srgbClr val="FF0000"/>
-              </a:solidFill>
-            </a:endParaRPr>
-          </a:p>
-          <a:p>
-            <a:pPr lvl="1"/>
-            <a:r>
-              <a:rPr lang="en-US" altLang="nl-NL" sz="2800" dirty="0" smtClean="0"/>
-              <a:t>Color </a:t>
-            </a:r>
-            <a:r>
-              <a:rPr lang="en-US" altLang="nl-NL" sz="2800" dirty="0"/>
-              <a:t>of the </a:t>
-            </a:r>
-            <a:r>
-              <a:rPr lang="en-US" altLang="nl-NL" sz="2800" dirty="0" smtClean="0"/>
-              <a:t>dot</a:t>
-            </a:r>
-            <a:r>
-              <a:rPr lang="en-US" altLang="nl-NL" sz="2800" dirty="0"/>
-              <a:t> </a:t>
-            </a:r>
-            <a:r>
-              <a:rPr lang="en-US" altLang="nl-NL" sz="2800" dirty="0" smtClean="0"/>
-              <a:t>= O(n)</a:t>
-            </a:r>
-          </a:p>
-          <a:p>
-            <a:pPr lvl="2"/>
-            <a:r>
-              <a:rPr lang="en-US" altLang="nl-NL" sz="1800" dirty="0" smtClean="0"/>
-              <a:t>Solution 3 (O(n))</a:t>
-            </a:r>
-          </a:p>
-          <a:p>
-            <a:pPr lvl="1"/>
-            <a:r>
-              <a:rPr lang="en-US" altLang="nl-NL" sz="2800" dirty="0" smtClean="0"/>
-              <a:t>Total running time = </a:t>
-            </a:r>
-            <a:r>
-              <a:rPr lang="en-US" altLang="nl-NL" sz="2800" dirty="0" smtClean="0"/>
-              <a:t>O(n^</a:t>
-            </a:r>
-            <a:r>
-              <a:rPr lang="en-US" altLang="zh-CN" sz="2800" dirty="0" smtClean="0"/>
-              <a:t>2</a:t>
-            </a:r>
-            <a:r>
-              <a:rPr lang="en-US" altLang="nl-NL" sz="2800" dirty="0" smtClean="0"/>
-              <a:t>)</a:t>
-            </a:r>
-            <a:endParaRPr lang="en-US" altLang="nl-NL" sz="2800" dirty="0" smtClean="0"/>
-          </a:p>
-          <a:p>
-            <a:pPr lvl="2"/>
-            <a:r>
-              <a:rPr lang="en-US" altLang="nl-NL" sz="1800" dirty="0"/>
-              <a:t>n</a:t>
-            </a:r>
-            <a:r>
-              <a:rPr lang="en-US" altLang="nl-NL" sz="1800" dirty="0" smtClean="0"/>
-              <a:t> = total number of people</a:t>
-            </a:r>
-            <a:endParaRPr lang="en-US" altLang="nl-NL" sz="1800" dirty="0"/>
-          </a:p>
-          <a:p>
-            <a:pPr lvl="2"/>
-            <a:endParaRPr lang="en-US" altLang="nl-NL" sz="1800" dirty="0" smtClean="0"/>
-          </a:p>
-        </p:txBody>
-      </p:sp>
+              <a:rPr lang="en-US" altLang="zh-CN" sz="2800" dirty="0"/>
+              <a:t>Solve the overlapping</a:t>
+            </a:r>
+            <a:endParaRPr lang="en-US" altLang="nl-NL" sz="2800" dirty="0"/>
+          </a:p>
+        </p:txBody>
+      </p:sp>
+      <p:pic>
+        <p:nvPicPr>
+          <p:cNvPr id="3" name="Picture 2"/>
+          <p:cNvPicPr>
+            <a:picLocks noChangeAspect="1"/>
+          </p:cNvPicPr>
+          <p:nvPr/>
+        </p:nvPicPr>
+        <p:blipFill>
+          <a:blip r:embed="rId2"/>
+          <a:stretch>
+            <a:fillRect/>
+          </a:stretch>
+        </p:blipFill>
+        <p:spPr>
+          <a:xfrm>
+            <a:off x="1238013" y="3032956"/>
+            <a:ext cx="6741000" cy="2036800"/>
+          </a:xfrm>
+          <a:prstGeom prst="rect">
+            <a:avLst/>
+          </a:prstGeom>
+        </p:spPr>
+      </p:pic>
     </p:spTree>
     <p:extLst>
       <p:ext uri="{BB962C8B-B14F-4D97-AF65-F5344CB8AC3E}">
-        <p14:creationId xmlns:p14="http://schemas.microsoft.com/office/powerpoint/2010/main" val="1868917812"/>
+        <p14:creationId xmlns:p14="http://schemas.microsoft.com/office/powerpoint/2010/main" val="4172768736"/>
       </p:ext>
     </p:extLst>
   </p:cSld>
   <p:clrMapOvr>
     <a:masterClrMapping/>
   </p:clrMapOvr>
-  <p:timing>
-    <p:tnLst>
-      <p:par>
-        <p:cTn id="1" dur="indefinite" restart="never" nodeType="tmRoot"/>
-      </p:par>
-    </p:tnLst>
-  </p:timing>
 </p:sld>
 </file>
 
@@ -12978,29 +12728,135 @@
           <a:lstStyle/>
           <a:p>
             <a:r>
-              <a:rPr lang="en-US" altLang="nl-NL" dirty="0" smtClean="0"/>
-              <a:t>Demo</a:t>
-            </a:r>
+              <a:rPr lang="en-US" altLang="nl-NL" dirty="0"/>
+              <a:t>Running time</a:t>
+            </a:r>
+          </a:p>
+        </p:txBody>
+      </p:sp>
+      <p:sp>
+        <p:nvSpPr>
+          <p:cNvPr id="66563" name="Content Placeholder 2"/>
+          <p:cNvSpPr>
+            <a:spLocks noGrp="1"/>
+          </p:cNvSpPr>
+          <p:nvPr>
+            <p:ph idx="1"/>
+          </p:nvPr>
+        </p:nvSpPr>
+        <p:spPr>
+          <a:xfrm>
+            <a:off x="611188" y="1600201"/>
+            <a:ext cx="7994650" cy="4025044"/>
+          </a:xfrm>
+        </p:spPr>
+        <p:txBody>
+          <a:bodyPr/>
+          <a:lstStyle/>
+          <a:p>
+            <a:pPr lvl="1"/>
+            <a:r>
+              <a:rPr lang="en-US" altLang="nl-NL" sz="2800" dirty="0"/>
+              <a:t>Radius of the dot  = O(1)</a:t>
+            </a:r>
+          </a:p>
+          <a:p>
+            <a:pPr lvl="1"/>
+            <a:r>
+              <a:rPr lang="en-US" altLang="nl-NL" sz="2800" dirty="0"/>
+              <a:t>How many people = 1 dot = O(1)</a:t>
+            </a:r>
+          </a:p>
+          <a:p>
+            <a:pPr lvl="1"/>
+            <a:r>
+              <a:rPr lang="en-US" altLang="nl-NL" sz="2800" dirty="0"/>
+              <a:t>Where to place the dot = O(n)</a:t>
+            </a:r>
+          </a:p>
+          <a:p>
+            <a:pPr lvl="2"/>
+            <a:r>
+              <a:rPr lang="en-US" altLang="nl-NL" sz="1800" dirty="0"/>
+              <a:t>Choose the middle point (O(1) </a:t>
+            </a:r>
+            <a:r>
+              <a:rPr lang="zh-CN" altLang="en-US" sz="1800" dirty="0"/>
+              <a:t>* </a:t>
+            </a:r>
+            <a:r>
+              <a:rPr lang="en-US" altLang="zh-CN" sz="1800" dirty="0"/>
+              <a:t>n</a:t>
+            </a:r>
+            <a:r>
+              <a:rPr lang="en-US" altLang="nl-NL" sz="1800" dirty="0"/>
+              <a:t>)</a:t>
+            </a:r>
+          </a:p>
+          <a:p>
+            <a:pPr lvl="2"/>
+            <a:r>
+              <a:rPr lang="en-US" altLang="nl-NL" sz="1800" dirty="0"/>
+              <a:t>Solve the overlap (O(n))</a:t>
+            </a:r>
+            <a:endParaRPr lang="en-US" altLang="nl-NL" sz="1800" dirty="0">
+              <a:solidFill>
+                <a:srgbClr val="FF0000"/>
+              </a:solidFill>
+            </a:endParaRPr>
+          </a:p>
+          <a:p>
+            <a:pPr lvl="1"/>
+            <a:r>
+              <a:rPr lang="en-US" altLang="nl-NL" sz="2800" dirty="0"/>
+              <a:t>Color of the dot = O(n)</a:t>
+            </a:r>
+          </a:p>
+          <a:p>
+            <a:pPr lvl="2"/>
+            <a:r>
+              <a:rPr lang="en-US" altLang="nl-NL" sz="1800" dirty="0"/>
+              <a:t>Solution 3 (O(n))</a:t>
+            </a:r>
+          </a:p>
+          <a:p>
+            <a:pPr lvl="1"/>
+            <a:r>
+              <a:rPr lang="en-US" altLang="nl-NL" sz="2800" dirty="0"/>
+              <a:t>Total running time = O(n^</a:t>
+            </a:r>
+            <a:r>
+              <a:rPr lang="en-US" altLang="zh-CN" sz="2800" dirty="0"/>
+              <a:t>2</a:t>
+            </a:r>
+            <a:r>
+              <a:rPr lang="en-US" altLang="nl-NL" sz="2800" dirty="0"/>
+              <a:t>)</a:t>
+            </a:r>
+          </a:p>
+          <a:p>
+            <a:pPr lvl="2"/>
+            <a:r>
+              <a:rPr lang="en-US" altLang="nl-NL" sz="1800" dirty="0"/>
+              <a:t>n = total number of people</a:t>
+            </a:r>
+          </a:p>
+          <a:p>
+            <a:pPr lvl="2"/>
+            <a:endParaRPr lang="en-US" altLang="nl-NL" sz="1800" dirty="0"/>
           </a:p>
         </p:txBody>
       </p:sp>
     </p:spTree>
     <p:extLst>
       <p:ext uri="{BB962C8B-B14F-4D97-AF65-F5344CB8AC3E}">
-        <p14:creationId xmlns:p14="http://schemas.microsoft.com/office/powerpoint/2010/main" val="491528343"/>
+        <p14:creationId xmlns:p14="http://schemas.microsoft.com/office/powerpoint/2010/main" val="1868917812"/>
       </p:ext>
     </p:extLst>
   </p:cSld>
   <p:clrMapOvr>
     <a:masterClrMapping/>
   </p:clrMapOvr>
-  <p:timing>
-    <p:tnLst>
-      <p:par>
-        <p:cTn id="1" dur="indefinite" restart="never" nodeType="tmRoot"/>
-      </p:par>
-    </p:tnLst>
-  </p:timing>
 </p:sld>
 </file>
 
@@ -13037,67 +12893,8 @@
           <a:lstStyle/>
           <a:p>
             <a:r>
-              <a:rPr lang="en-US" altLang="nl-NL" dirty="0" smtClean="0"/>
-              <a:t>Constraints</a:t>
-            </a:r>
-          </a:p>
-        </p:txBody>
-      </p:sp>
-      <p:sp>
-        <p:nvSpPr>
-          <p:cNvPr id="66563" name="Content Placeholder 2"/>
-          <p:cNvSpPr>
-            <a:spLocks noGrp="1"/>
-          </p:cNvSpPr>
-          <p:nvPr>
-            <p:ph idx="1"/>
-          </p:nvPr>
-        </p:nvSpPr>
-        <p:spPr>
-          <a:xfrm>
-            <a:off x="611188" y="1600200"/>
-            <a:ext cx="7994650" cy="4349079"/>
-          </a:xfrm>
-        </p:spPr>
-        <p:txBody>
-          <a:bodyPr/>
-          <a:lstStyle/>
-          <a:p>
-            <a:r>
-              <a:rPr lang="en-US" altLang="nl-NL" sz="2000" dirty="0" smtClean="0"/>
-              <a:t>Data generation is slow O(N), </a:t>
-            </a:r>
-            <a:r>
-              <a:rPr lang="en-US" altLang="nl-NL" sz="2000" dirty="0"/>
-              <a:t>where N = total number of </a:t>
-            </a:r>
-            <a:r>
-              <a:rPr lang="en-US" altLang="nl-NL" sz="2000" dirty="0" smtClean="0"/>
-              <a:t>people.</a:t>
-            </a:r>
-          </a:p>
-          <a:p>
-            <a:pPr lvl="1"/>
-            <a:r>
-              <a:rPr lang="en-US" altLang="nl-NL" sz="1800" dirty="0"/>
-              <a:t>O</a:t>
-            </a:r>
-            <a:r>
-              <a:rPr lang="en-US" altLang="nl-NL" sz="1800" dirty="0" smtClean="0"/>
-              <a:t>ne time only, as long as the data.txt is not deleted.</a:t>
-            </a:r>
-          </a:p>
-          <a:p>
-            <a:r>
-              <a:rPr lang="en-US" altLang="nl-NL" sz="2000" dirty="0" smtClean="0"/>
-              <a:t>Aggregation algorithm’s worst case Running time is O(N^3), where N = total number of people.</a:t>
-            </a:r>
-          </a:p>
-          <a:p>
-            <a:pPr lvl="1"/>
-            <a:r>
-              <a:rPr lang="en-US" altLang="nl-NL" sz="1800" dirty="0" smtClean="0"/>
-              <a:t>Each time when the proposition (number of people to 1 dot) changes.</a:t>
+              <a:rPr lang="en-US" altLang="nl-NL" dirty="0"/>
+              <a:t>Demo</a:t>
             </a:r>
           </a:p>
         </p:txBody>
@@ -13105,20 +12902,13 @@
     </p:spTree>
     <p:extLst>
       <p:ext uri="{BB962C8B-B14F-4D97-AF65-F5344CB8AC3E}">
-        <p14:creationId xmlns:p14="http://schemas.microsoft.com/office/powerpoint/2010/main" val="216843196"/>
+        <p14:creationId xmlns:p14="http://schemas.microsoft.com/office/powerpoint/2010/main" val="491528343"/>
       </p:ext>
     </p:extLst>
   </p:cSld>
   <p:clrMapOvr>
     <a:masterClrMapping/>
   </p:clrMapOvr>
-  <p:timing>
-    <p:tnLst>
-      <p:par>
-        <p:cTn id="1" dur="indefinite" restart="never" nodeType="tmRoot"/>
-      </p:par>
-    </p:tnLst>
-  </p:timing>
 </p:sld>
 </file>
 
@@ -13155,7 +12945,7 @@
           <a:lstStyle/>
           <a:p>
             <a:r>
-              <a:rPr lang="en-US" altLang="nl-NL" dirty="0" smtClean="0"/>
+              <a:rPr lang="en-US" altLang="nl-NL" dirty="0"/>
               <a:t>Constraints</a:t>
             </a:r>
           </a:p>
@@ -13173,8 +12963,8 @@
         </p:nvSpPr>
         <p:spPr>
           <a:xfrm>
-            <a:off x="611188" y="1376772"/>
-            <a:ext cx="7994650" cy="5481228"/>
+            <a:off x="611188" y="1600200"/>
+            <a:ext cx="7994650" cy="4349079"/>
           </a:xfrm>
         </p:spPr>
         <p:txBody>
@@ -13182,139 +12972,42 @@
           <a:lstStyle/>
           <a:p>
             <a:r>
-              <a:rPr lang="en-US" altLang="nl-NL" sz="2000" dirty="0" smtClean="0"/>
-              <a:t>Special case 1</a:t>
+              <a:rPr lang="en-US" altLang="nl-NL" sz="2000" dirty="0"/>
+              <a:t>Data generation is slow O(N), where N = total number of people.</a:t>
             </a:r>
           </a:p>
           <a:p>
             <a:pPr lvl="1"/>
             <a:r>
-              <a:rPr lang="en-US" altLang="nl-NL" sz="1800" dirty="0" smtClean="0"/>
-              <a:t>West EU (20%, Green) </a:t>
+              <a:rPr lang="en-US" altLang="nl-NL" sz="1800" dirty="0"/>
+              <a:t>One time only, as long as the data.txt is not deleted.</a:t>
+            </a:r>
+          </a:p>
+          <a:p>
+            <a:r>
+              <a:rPr lang="en-US" altLang="nl-NL" sz="2000" dirty="0"/>
+              <a:t>Aggregation algorithm’s worst case Running time is O(N^3), where N = total number of people.</a:t>
             </a:r>
           </a:p>
           <a:p>
             <a:pPr lvl="1"/>
             <a:r>
-              <a:rPr lang="en-US" altLang="nl-NL" sz="1800" dirty="0" smtClean="0"/>
-              <a:t>North EU(20%, Blue) </a:t>
-            </a:r>
-          </a:p>
-          <a:p>
-            <a:pPr lvl="1"/>
-            <a:r>
-              <a:rPr lang="en-US" altLang="nl-NL" sz="1800" dirty="0" smtClean="0"/>
-              <a:t>East EU (20%, Red)</a:t>
-            </a:r>
-          </a:p>
-          <a:p>
-            <a:pPr lvl="1"/>
-            <a:r>
-              <a:rPr lang="en-US" altLang="nl-NL" sz="1800" dirty="0" smtClean="0"/>
-              <a:t>South EU (20%, Yellow)</a:t>
-            </a:r>
-          </a:p>
-          <a:p>
-            <a:pPr lvl="1"/>
-            <a:r>
-              <a:rPr lang="en-US" altLang="nl-NL" sz="1800" dirty="0" smtClean="0"/>
-              <a:t>Non EU (20%, Black</a:t>
-            </a:r>
-            <a:r>
-              <a:rPr lang="en-US" altLang="nl-NL" sz="1800" dirty="0" smtClean="0"/>
-              <a:t>)</a:t>
-            </a:r>
-          </a:p>
-          <a:p>
-            <a:pPr lvl="2"/>
-            <a:r>
               <a:rPr lang="en-US" altLang="nl-NL" sz="1800" dirty="0"/>
-              <a:t>people are distributed like this:</a:t>
-            </a:r>
-          </a:p>
-          <a:p>
-            <a:pPr lvl="2"/>
-            <a:r>
-              <a:rPr lang="en-US" altLang="nl-NL" sz="1800" dirty="0"/>
-              <a:t>r1,r2,r3,r4,r5,r1,r2,r3,r4,r5 </a:t>
-            </a:r>
-            <a:r>
-              <a:rPr lang="en-US" altLang="nl-NL" sz="1800" dirty="0" smtClean="0"/>
-              <a:t>….</a:t>
-            </a:r>
-            <a:endParaRPr lang="en-US" altLang="nl-NL" sz="1800" dirty="0" smtClean="0"/>
-          </a:p>
-          <a:p>
-            <a:r>
-              <a:rPr lang="en-US" altLang="nl-NL" sz="2000" dirty="0" smtClean="0"/>
-              <a:t>Special case 2</a:t>
-            </a:r>
-          </a:p>
-          <a:p>
-            <a:pPr lvl="1"/>
-            <a:r>
-              <a:rPr lang="en-US" altLang="nl-NL" sz="1800" dirty="0" smtClean="0"/>
-              <a:t>West EU (96%, Green) </a:t>
-            </a:r>
-          </a:p>
-          <a:p>
-            <a:pPr lvl="1"/>
-            <a:r>
-              <a:rPr lang="en-US" altLang="nl-NL" sz="1800" dirty="0" smtClean="0"/>
-              <a:t>North EU(1%, Blue) </a:t>
-            </a:r>
-          </a:p>
-          <a:p>
-            <a:pPr lvl="1"/>
-            <a:r>
-              <a:rPr lang="en-US" altLang="nl-NL" sz="1800" dirty="0" smtClean="0"/>
-              <a:t>East EU (1%, Red)</a:t>
-            </a:r>
-          </a:p>
-          <a:p>
-            <a:pPr lvl="1"/>
-            <a:r>
-              <a:rPr lang="en-US" altLang="nl-NL" sz="1800" dirty="0" smtClean="0"/>
-              <a:t>South EU (1%, Yellow)</a:t>
-            </a:r>
-          </a:p>
-          <a:p>
-            <a:pPr lvl="1"/>
-            <a:r>
-              <a:rPr lang="en-US" altLang="nl-NL" sz="1800" dirty="0" smtClean="0"/>
-              <a:t>Non EU (1%, Black</a:t>
-            </a:r>
-            <a:r>
-              <a:rPr lang="en-US" altLang="nl-NL" sz="1800" dirty="0" smtClean="0"/>
-              <a:t>)</a:t>
-            </a:r>
-          </a:p>
-          <a:p>
-            <a:r>
-              <a:rPr lang="en-US" altLang="nl-NL" sz="2000" dirty="0" smtClean="0"/>
-              <a:t>Special case …</a:t>
-            </a:r>
-            <a:endParaRPr lang="en-US" altLang="nl-NL" sz="1800" dirty="0" smtClean="0"/>
+              <a:t>Each time when the proposition (number of people to 1 dot) changes.</a:t>
+            </a:r>
           </a:p>
         </p:txBody>
       </p:sp>
     </p:spTree>
     <p:extLst>
       <p:ext uri="{BB962C8B-B14F-4D97-AF65-F5344CB8AC3E}">
-        <p14:creationId xmlns:p14="http://schemas.microsoft.com/office/powerpoint/2010/main" val="3000599760"/>
+        <p14:creationId xmlns:p14="http://schemas.microsoft.com/office/powerpoint/2010/main" val="216843196"/>
       </p:ext>
     </p:extLst>
   </p:cSld>
   <p:clrMapOvr>
     <a:masterClrMapping/>
   </p:clrMapOvr>
-  <p:timing>
-    <p:tnLst>
-      <p:par>
-        <p:cTn id="1" dur="indefinite" restart="never" nodeType="tmRoot"/>
-      </p:par>
-    </p:tnLst>
-  </p:timing>
 </p:sld>
 </file>
 
@@ -13351,7 +13044,7 @@
           <a:lstStyle/>
           <a:p>
             <a:r>
-              <a:rPr lang="en-US" altLang="nl-NL" dirty="0" smtClean="0"/>
+              <a:rPr lang="en-US" altLang="nl-NL" dirty="0"/>
               <a:t>content</a:t>
             </a:r>
           </a:p>
@@ -13378,27 +13071,27 @@
           <a:lstStyle/>
           <a:p>
             <a:r>
-              <a:rPr lang="en-US" altLang="nl-NL" sz="2000" dirty="0" smtClean="0"/>
+              <a:rPr lang="en-US" altLang="nl-NL" sz="2000" dirty="0"/>
               <a:t>Introduction</a:t>
             </a:r>
           </a:p>
           <a:p>
             <a:pPr lvl="1"/>
             <a:r>
-              <a:rPr lang="en-US" altLang="nl-NL" sz="1800" dirty="0" smtClean="0"/>
+              <a:rPr lang="en-US" altLang="nl-NL" sz="1800" dirty="0"/>
               <a:t>Dot map of people from different region in Eindhoven.</a:t>
             </a:r>
           </a:p>
           <a:p>
             <a:r>
-              <a:rPr lang="en-US" altLang="nl-NL" sz="2000" dirty="0" smtClean="0"/>
+              <a:rPr lang="en-US" altLang="nl-NL" sz="2000" dirty="0"/>
               <a:t>Problem encountered</a:t>
             </a:r>
           </a:p>
           <a:p>
             <a:pPr lvl="1"/>
             <a:r>
-              <a:rPr lang="en-US" altLang="nl-NL" sz="1800" dirty="0" smtClean="0"/>
+              <a:rPr lang="en-US" altLang="nl-NL" sz="1800" dirty="0"/>
               <a:t>Radius of the dot.</a:t>
             </a:r>
           </a:p>
@@ -13406,82 +13099,53 @@
             <a:pPr lvl="1"/>
             <a:r>
               <a:rPr lang="en-US" altLang="nl-NL" sz="1800" dirty="0"/>
-              <a:t>How many people = 1 dot</a:t>
-            </a:r>
-            <a:r>
-              <a:rPr lang="en-US" altLang="nl-NL" sz="1800" dirty="0" smtClean="0"/>
-              <a:t>.</a:t>
+              <a:t>How many people = 1 dot.</a:t>
             </a:r>
           </a:p>
           <a:p>
             <a:pPr lvl="1"/>
             <a:r>
-              <a:rPr lang="en-US" altLang="nl-NL" sz="1800" dirty="0" smtClean="0"/>
-              <a:t>Where </a:t>
-            </a:r>
-            <a:r>
               <a:rPr lang="en-US" altLang="nl-NL" sz="1800" dirty="0"/>
-              <a:t>to place the dot</a:t>
-            </a:r>
-            <a:r>
-              <a:rPr lang="en-US" altLang="nl-NL" sz="1800" dirty="0" smtClean="0"/>
-              <a:t>.</a:t>
-            </a:r>
+              <a:t>Where to place the dot. </a:t>
+            </a:r>
+          </a:p>
+          <a:p>
+            <a:pPr lvl="1"/>
             <a:r>
               <a:rPr lang="en-US" altLang="nl-NL" sz="1800" dirty="0"/>
-              <a:t> </a:t>
-            </a:r>
-            <a:endParaRPr lang="en-US" altLang="nl-NL" sz="1800" dirty="0" smtClean="0"/>
+              <a:t>Color of the dot.</a:t>
+            </a:r>
+          </a:p>
+          <a:p>
+            <a:r>
+              <a:rPr lang="en-US" altLang="nl-NL" sz="2000" dirty="0"/>
+              <a:t>Proposal solutions</a:t>
+            </a:r>
           </a:p>
           <a:p>
             <a:pPr lvl="1"/>
             <a:r>
-              <a:rPr lang="en-US" altLang="nl-NL" sz="1800" dirty="0" smtClean="0"/>
-              <a:t>Color </a:t>
-            </a:r>
+              <a:rPr lang="en-US" altLang="nl-NL" sz="1600" dirty="0"/>
+              <a:t>Apply aggregation algorithm to show more readable results.</a:t>
+            </a:r>
+          </a:p>
+          <a:p>
+            <a:pPr lvl="1"/>
+            <a:r>
+              <a:rPr lang="en-US" altLang="nl-NL" sz="1600" dirty="0"/>
+              <a:t>Demo</a:t>
+            </a:r>
+          </a:p>
+          <a:p>
+            <a:r>
+              <a:rPr lang="en-US" altLang="nl-NL" sz="2000" dirty="0"/>
+              <a:t>Constraints</a:t>
+            </a:r>
+          </a:p>
+          <a:p>
+            <a:pPr lvl="1"/>
             <a:r>
               <a:rPr lang="en-US" altLang="nl-NL" sz="1800" dirty="0"/>
-              <a:t>of the dot</a:t>
-            </a:r>
-            <a:r>
-              <a:rPr lang="en-US" altLang="nl-NL" sz="1800" dirty="0" smtClean="0"/>
-              <a:t>.</a:t>
-            </a:r>
-          </a:p>
-          <a:p>
-            <a:r>
-              <a:rPr lang="en-US" altLang="nl-NL" sz="2000" dirty="0" smtClean="0"/>
-              <a:t>Proposal solutions</a:t>
-            </a:r>
-          </a:p>
-          <a:p>
-            <a:pPr lvl="1"/>
-            <a:r>
-              <a:rPr lang="en-US" altLang="nl-NL" sz="1600" dirty="0"/>
-              <a:t>Apply aggregation algorithm to show more readable results</a:t>
-            </a:r>
-            <a:r>
-              <a:rPr lang="en-US" altLang="nl-NL" sz="1600" dirty="0" smtClean="0"/>
-              <a:t>.</a:t>
-            </a:r>
-          </a:p>
-          <a:p>
-            <a:pPr lvl="1"/>
-            <a:r>
-              <a:rPr lang="en-US" altLang="nl-NL" sz="1600" dirty="0" smtClean="0"/>
-              <a:t>Demo</a:t>
-            </a:r>
-          </a:p>
-          <a:p>
-            <a:r>
-              <a:rPr lang="en-US" altLang="nl-NL" sz="2000" dirty="0" smtClean="0"/>
-              <a:t>Constraints</a:t>
-            </a:r>
-          </a:p>
-          <a:p>
-            <a:pPr lvl="1"/>
-            <a:r>
-              <a:rPr lang="en-US" altLang="nl-NL" sz="1800" dirty="0" smtClean="0"/>
               <a:t>Some special cases which cannot be properly handled.</a:t>
             </a:r>
           </a:p>
@@ -13497,13 +13161,6 @@
   <p:clrMapOvr>
     <a:masterClrMapping/>
   </p:clrMapOvr>
-  <p:timing>
-    <p:tnLst>
-      <p:par>
-        <p:cTn id="1" dur="indefinite" restart="never" nodeType="tmRoot"/>
-      </p:par>
-    </p:tnLst>
-  </p:timing>
 </p:sld>
 </file>
 
@@ -13540,7 +13197,183 @@
           <a:lstStyle/>
           <a:p>
             <a:r>
-              <a:rPr lang="en-US" altLang="nl-NL" dirty="0" smtClean="0"/>
+              <a:rPr lang="en-US" altLang="nl-NL" dirty="0"/>
+              <a:t>Constraints</a:t>
+            </a:r>
+          </a:p>
+        </p:txBody>
+      </p:sp>
+      <p:sp>
+        <p:nvSpPr>
+          <p:cNvPr id="66563" name="Content Placeholder 2"/>
+          <p:cNvSpPr>
+            <a:spLocks noGrp="1"/>
+          </p:cNvSpPr>
+          <p:nvPr>
+            <p:ph idx="1"/>
+          </p:nvPr>
+        </p:nvSpPr>
+        <p:spPr>
+          <a:xfrm>
+            <a:off x="611188" y="1376772"/>
+            <a:ext cx="7994650" cy="5481228"/>
+          </a:xfrm>
+        </p:spPr>
+        <p:txBody>
+          <a:bodyPr/>
+          <a:lstStyle/>
+          <a:p>
+            <a:r>
+              <a:rPr lang="en-US" altLang="nl-NL" sz="2000" dirty="0"/>
+              <a:t>Special case 1</a:t>
+            </a:r>
+          </a:p>
+          <a:p>
+            <a:pPr lvl="1"/>
+            <a:r>
+              <a:rPr lang="en-US" altLang="nl-NL" sz="1800" dirty="0"/>
+              <a:t>West EU (20%, Green) </a:t>
+            </a:r>
+          </a:p>
+          <a:p>
+            <a:pPr lvl="1"/>
+            <a:r>
+              <a:rPr lang="en-US" altLang="nl-NL" sz="1800" dirty="0"/>
+              <a:t>North EU(20%, Blue) </a:t>
+            </a:r>
+          </a:p>
+          <a:p>
+            <a:pPr lvl="1"/>
+            <a:r>
+              <a:rPr lang="en-US" altLang="nl-NL" sz="1800" dirty="0"/>
+              <a:t>East EU (20%, Red)</a:t>
+            </a:r>
+          </a:p>
+          <a:p>
+            <a:pPr lvl="1"/>
+            <a:r>
+              <a:rPr lang="en-US" altLang="nl-NL" sz="1800" dirty="0"/>
+              <a:t>South EU (20%, Yellow)</a:t>
+            </a:r>
+          </a:p>
+          <a:p>
+            <a:pPr lvl="1"/>
+            <a:r>
+              <a:rPr lang="en-US" altLang="nl-NL" sz="1800" dirty="0"/>
+              <a:t>Non EU (20%, Black)</a:t>
+            </a:r>
+          </a:p>
+          <a:p>
+            <a:pPr lvl="2"/>
+            <a:r>
+              <a:rPr lang="en-US" altLang="nl-NL" sz="1800" dirty="0"/>
+              <a:t>people are distributed like this:</a:t>
+            </a:r>
+          </a:p>
+          <a:p>
+            <a:pPr lvl="2"/>
+            <a:r>
+              <a:rPr lang="en-US" altLang="nl-NL" sz="1800" dirty="0"/>
+              <a:t>r1,r2,r3,r4,r5,r1,r2,r3,r4,r5 ….</a:t>
+            </a:r>
+          </a:p>
+          <a:p>
+            <a:r>
+              <a:rPr lang="en-US" altLang="nl-NL" sz="2000" dirty="0"/>
+              <a:t>Special case 2</a:t>
+            </a:r>
+          </a:p>
+          <a:p>
+            <a:pPr lvl="1"/>
+            <a:r>
+              <a:rPr lang="en-US" altLang="nl-NL" sz="1800" dirty="0"/>
+              <a:t>West EU (96%, Green) </a:t>
+            </a:r>
+          </a:p>
+          <a:p>
+            <a:pPr lvl="1"/>
+            <a:r>
+              <a:rPr lang="en-US" altLang="nl-NL" sz="1800" dirty="0"/>
+              <a:t>North EU(1%, Blue) </a:t>
+            </a:r>
+          </a:p>
+          <a:p>
+            <a:pPr lvl="1"/>
+            <a:r>
+              <a:rPr lang="en-US" altLang="nl-NL" sz="1800" dirty="0"/>
+              <a:t>East EU (1%, Red)</a:t>
+            </a:r>
+          </a:p>
+          <a:p>
+            <a:pPr lvl="1"/>
+            <a:r>
+              <a:rPr lang="en-US" altLang="nl-NL" sz="1800" dirty="0"/>
+              <a:t>South EU (1%, Yellow)</a:t>
+            </a:r>
+          </a:p>
+          <a:p>
+            <a:pPr lvl="1"/>
+            <a:r>
+              <a:rPr lang="en-US" altLang="nl-NL" sz="1800" dirty="0"/>
+              <a:t>Non EU (1%, Black)</a:t>
+            </a:r>
+          </a:p>
+          <a:p>
+            <a:r>
+              <a:rPr lang="en-US" altLang="nl-NL" sz="2000" dirty="0"/>
+              <a:t>Special case …</a:t>
+            </a:r>
+            <a:endParaRPr lang="en-US" altLang="nl-NL" sz="1800" dirty="0"/>
+          </a:p>
+        </p:txBody>
+      </p:sp>
+    </p:spTree>
+    <p:extLst>
+      <p:ext uri="{BB962C8B-B14F-4D97-AF65-F5344CB8AC3E}">
+        <p14:creationId xmlns:p14="http://schemas.microsoft.com/office/powerpoint/2010/main" val="3000599760"/>
+      </p:ext>
+    </p:extLst>
+  </p:cSld>
+  <p:clrMapOvr>
+    <a:masterClrMapping/>
+  </p:clrMapOvr>
+</p:sld>
+</file>
+
+<file path=ppt/slides/slide21.xml><?xml version="1.0" encoding="utf-8"?>
+<p:sld xmlns:a="http://schemas.openxmlformats.org/drawingml/2006/main" xmlns:r="http://schemas.openxmlformats.org/officeDocument/2006/relationships" xmlns:p="http://schemas.openxmlformats.org/presentationml/2006/main">
+  <p:cSld>
+    <p:spTree>
+      <p:nvGrpSpPr>
+        <p:cNvPr id="1" name=""/>
+        <p:cNvGrpSpPr/>
+        <p:nvPr/>
+      </p:nvGrpSpPr>
+      <p:grpSpPr>
+        <a:xfrm>
+          <a:off x="0" y="0"/>
+          <a:ext cx="0" cy="0"/>
+          <a:chOff x="0" y="0"/>
+          <a:chExt cx="0" cy="0"/>
+        </a:xfrm>
+      </p:grpSpPr>
+      <p:sp>
+        <p:nvSpPr>
+          <p:cNvPr id="66562" name="Title 1"/>
+          <p:cNvSpPr>
+            <a:spLocks noGrp="1"/>
+          </p:cNvSpPr>
+          <p:nvPr>
+            <p:ph type="title"/>
+          </p:nvPr>
+        </p:nvSpPr>
+        <p:spPr/>
+        <p:txBody>
+          <a:bodyPr/>
+          <a:lstStyle/>
+          <a:p>
+            <a:r>
+              <a:rPr lang="en-US" altLang="nl-NL" dirty="0"/>
               <a:t>Questions</a:t>
             </a:r>
           </a:p>
@@ -13597,13 +13430,6 @@
   <p:clrMapOvr>
     <a:masterClrMapping/>
   </p:clrMapOvr>
-  <p:timing>
-    <p:tnLst>
-      <p:par>
-        <p:cTn id="1" dur="indefinite" restart="never" nodeType="tmRoot"/>
-      </p:par>
-    </p:tnLst>
-  </p:timing>
 </p:sld>
 </file>
 
@@ -13643,7 +13469,6 @@
               <a:rPr lang="en-US" altLang="nl-NL" dirty="0"/>
               <a:t>About the program</a:t>
             </a:r>
-            <a:endParaRPr lang="en-US" altLang="nl-NL" dirty="0" smtClean="0"/>
           </a:p>
         </p:txBody>
       </p:sp>
@@ -13668,85 +13493,84 @@
           <a:lstStyle/>
           <a:p>
             <a:r>
-              <a:rPr lang="en-US" altLang="nl-NL" sz="2000" dirty="0" smtClean="0"/>
+              <a:rPr lang="en-US" altLang="nl-NL" sz="2000" dirty="0"/>
               <a:t>The data (people distribution) is generated by the system.</a:t>
             </a:r>
           </a:p>
           <a:p>
             <a:pPr lvl="1"/>
             <a:r>
-              <a:rPr lang="en-US" altLang="nl-NL" sz="1800" dirty="0" smtClean="0"/>
+              <a:rPr lang="en-US" altLang="nl-NL" sz="1800" dirty="0"/>
               <a:t>Total amount </a:t>
             </a:r>
           </a:p>
           <a:p>
             <a:pPr lvl="1"/>
             <a:r>
-              <a:rPr lang="en-US" altLang="nl-NL" sz="1800" dirty="0" smtClean="0"/>
+              <a:rPr lang="en-US" altLang="nl-NL" sz="1800" dirty="0"/>
               <a:t>Percentage of people from different regions</a:t>
             </a:r>
           </a:p>
           <a:p>
             <a:pPr lvl="1"/>
             <a:r>
-              <a:rPr lang="en-US" altLang="nl-NL" sz="1800" dirty="0" smtClean="0"/>
+              <a:rPr lang="en-US" altLang="nl-NL" sz="1800" dirty="0"/>
               <a:t>The data is generated and stored in a txt file</a:t>
             </a:r>
           </a:p>
           <a:p>
             <a:pPr lvl="1"/>
             <a:r>
-              <a:rPr lang="en-US" altLang="nl-NL" sz="1800" dirty="0" smtClean="0"/>
+              <a:rPr lang="en-US" altLang="nl-NL" sz="1800" dirty="0"/>
               <a:t>Generating the data for large amount of people may take long time</a:t>
             </a:r>
           </a:p>
           <a:p>
             <a:r>
-              <a:rPr lang="en-US" altLang="nl-NL" sz="2000" dirty="0" smtClean="0"/>
+              <a:rPr lang="en-US" altLang="nl-NL" sz="2000" dirty="0"/>
               <a:t>In this program, we set the total amount of people to 1,000,000 but the actual number is only like 300,000 because of some random choices made by the program.</a:t>
             </a:r>
           </a:p>
           <a:p>
             <a:r>
-              <a:rPr lang="en-US" altLang="nl-NL" sz="2000" dirty="0" smtClean="0"/>
+              <a:rPr lang="en-US" altLang="nl-NL" sz="2000" dirty="0"/>
               <a:t>There are 5 regions in this program</a:t>
             </a:r>
           </a:p>
           <a:p>
             <a:pPr lvl="1"/>
             <a:r>
-              <a:rPr lang="en-US" altLang="nl-NL" sz="1800" dirty="0" smtClean="0"/>
+              <a:rPr lang="en-US" altLang="nl-NL" sz="1800" dirty="0"/>
               <a:t>West EU (60%, Green) </a:t>
             </a:r>
           </a:p>
           <a:p>
             <a:pPr lvl="1"/>
             <a:r>
-              <a:rPr lang="en-US" altLang="nl-NL" sz="1800" dirty="0" smtClean="0"/>
+              <a:rPr lang="en-US" altLang="nl-NL" sz="1800" dirty="0"/>
               <a:t>North EU(15%, Blue) </a:t>
             </a:r>
           </a:p>
           <a:p>
             <a:pPr lvl="1"/>
             <a:r>
-              <a:rPr lang="en-US" altLang="nl-NL" sz="1800" dirty="0" smtClean="0"/>
+              <a:rPr lang="en-US" altLang="nl-NL" sz="1800" dirty="0"/>
               <a:t>East EU (10%, Red)</a:t>
             </a:r>
           </a:p>
           <a:p>
             <a:pPr lvl="1"/>
             <a:r>
-              <a:rPr lang="en-US" altLang="nl-NL" sz="1800" dirty="0" smtClean="0"/>
+              <a:rPr lang="en-US" altLang="nl-NL" sz="1800" dirty="0"/>
               <a:t>South EU (10%, Yellow)</a:t>
             </a:r>
           </a:p>
           <a:p>
             <a:pPr lvl="1"/>
             <a:r>
-              <a:rPr lang="en-US" altLang="nl-NL" sz="1800" dirty="0" smtClean="0"/>
+              <a:rPr lang="en-US" altLang="nl-NL" sz="1800" dirty="0"/>
               <a:t>Non EU (5%, Black)</a:t>
             </a:r>
-            <a:endParaRPr lang="en-US" altLang="nl-NL" sz="1800" dirty="0"/>
           </a:p>
         </p:txBody>
       </p:sp>
@@ -13760,13 +13584,6 @@
   <p:clrMapOvr>
     <a:masterClrMapping/>
   </p:clrMapOvr>
-  <p:timing>
-    <p:tnLst>
-      <p:par>
-        <p:cTn id="1" dur="indefinite" restart="never" nodeType="tmRoot"/>
-      </p:par>
-    </p:tnLst>
-  </p:timing>
 </p:sld>
 </file>
 
@@ -13803,7 +13620,7 @@
           <a:lstStyle/>
           <a:p>
             <a:r>
-              <a:rPr lang="en-US" altLang="nl-NL" dirty="0" smtClean="0"/>
+              <a:rPr lang="en-US" altLang="nl-NL" dirty="0"/>
               <a:t>Eindhoven</a:t>
             </a:r>
           </a:p>
@@ -13843,13 +13660,6 @@
   <p:clrMapOvr>
     <a:masterClrMapping/>
   </p:clrMapOvr>
-  <p:timing>
-    <p:tnLst>
-      <p:par>
-        <p:cTn id="1" dur="indefinite" restart="never" nodeType="tmRoot"/>
-      </p:par>
-    </p:tnLst>
-  </p:timing>
 </p:sld>
 </file>
 
@@ -13886,7 +13696,7 @@
           <a:lstStyle/>
           <a:p>
             <a:r>
-              <a:rPr lang="en-US" altLang="nl-NL" dirty="0" smtClean="0"/>
+              <a:rPr lang="en-US" altLang="nl-NL" dirty="0"/>
               <a:t>With proper aggregation</a:t>
             </a:r>
           </a:p>
@@ -13926,13 +13736,6 @@
   <p:clrMapOvr>
     <a:masterClrMapping/>
   </p:clrMapOvr>
-  <p:timing>
-    <p:tnLst>
-      <p:par>
-        <p:cTn id="1" dur="indefinite" restart="never" nodeType="tmRoot"/>
-      </p:par>
-    </p:tnLst>
-  </p:timing>
 </p:sld>
 </file>
 
@@ -13969,7 +13772,7 @@
           <a:lstStyle/>
           <a:p>
             <a:r>
-              <a:rPr lang="en-US" altLang="nl-NL" dirty="0" smtClean="0"/>
+              <a:rPr lang="en-US" altLang="nl-NL" dirty="0"/>
               <a:t>Problems </a:t>
             </a:r>
           </a:p>
@@ -13997,7 +13800,7 @@
           <a:p>
             <a:pPr lvl="1"/>
             <a:r>
-              <a:rPr lang="en-US" altLang="nl-NL" sz="2800" dirty="0" smtClean="0"/>
+              <a:rPr lang="en-US" altLang="nl-NL" sz="2800" dirty="0"/>
               <a:t>Radius of the dot</a:t>
             </a:r>
           </a:p>
@@ -14005,95 +13808,54 @@
             <a:pPr marL="269875" lvl="1" indent="0">
               <a:buNone/>
             </a:pPr>
-            <a:endParaRPr lang="en-US" altLang="nl-NL" sz="2800" dirty="0" smtClean="0"/>
+            <a:endParaRPr lang="en-US" altLang="nl-NL" sz="2800" dirty="0"/>
           </a:p>
           <a:p>
             <a:pPr lvl="2"/>
             <a:r>
-              <a:rPr lang="en-US" altLang="nl-NL" sz="1800" dirty="0" smtClean="0"/>
-              <a:t>For </a:t>
-            </a:r>
-            <a:r>
               <a:rPr lang="en-US" altLang="nl-NL" sz="1800" dirty="0"/>
-              <a:t>better display, </a:t>
-            </a:r>
-            <a:r>
-              <a:rPr lang="en-US" altLang="nl-NL" sz="1800" dirty="0" smtClean="0"/>
-              <a:t>we </a:t>
-            </a:r>
+              <a:t>For better display, we want the distance between each dot is at least, say 70 pixels.</a:t>
+            </a:r>
+          </a:p>
+          <a:p>
+            <a:pPr lvl="2"/>
             <a:r>
               <a:rPr lang="en-US" altLang="nl-NL" sz="1800" dirty="0"/>
-              <a:t>want </a:t>
-            </a:r>
-            <a:r>
-              <a:rPr lang="en-US" altLang="nl-NL" sz="1800" dirty="0" smtClean="0"/>
-              <a:t>the distance between each dot is at least, say 70 pixels.</a:t>
+              <a:t>Then we would have the radius of the dot = </a:t>
+            </a:r>
+          </a:p>
+          <a:p>
+            <a:pPr marL="544512" lvl="2" indent="0">
+              <a:buNone/>
+            </a:pPr>
+            <a:r>
+              <a:rPr lang="en-US" altLang="nl-NL" sz="1800" dirty="0"/>
+              <a:t>	min(window width, window height) / 70 / zoom in level / 5 </a:t>
+            </a:r>
+          </a:p>
+          <a:p>
+            <a:pPr marL="544512" lvl="2" indent="0">
+              <a:buNone/>
+            </a:pPr>
+            <a:r>
+              <a:rPr lang="en-US" altLang="nl-NL" sz="1800" dirty="0"/>
+              <a:t>	5 is here for some distance between other dots.</a:t>
             </a:r>
           </a:p>
           <a:p>
             <a:pPr lvl="2"/>
             <a:r>
-              <a:rPr lang="en-US" altLang="nl-NL" sz="1800" dirty="0" smtClean="0"/>
-              <a:t>Then we would have the radius of the dot = </a:t>
-            </a:r>
-          </a:p>
-          <a:p>
-            <a:pPr marL="544512" lvl="2" indent="0">
-              <a:buNone/>
-            </a:pPr>
-            <a:r>
               <a:rPr lang="en-US" altLang="nl-NL" sz="1800" dirty="0"/>
-              <a:t>	</a:t>
-            </a:r>
-            <a:r>
-              <a:rPr lang="en-US" altLang="nl-NL" sz="1800" dirty="0" smtClean="0"/>
-              <a:t>min(window width, window height) / 70 / zoom in level / 5 </a:t>
-            </a:r>
-          </a:p>
-          <a:p>
-            <a:pPr marL="544512" lvl="2" indent="0">
-              <a:buNone/>
-            </a:pPr>
+              <a:t>Zoom in level 1 means each dot = 1 person.</a:t>
+            </a:r>
+          </a:p>
+          <a:p>
+            <a:pPr lvl="2"/>
             <a:r>
               <a:rPr lang="en-US" altLang="nl-NL" sz="1800" dirty="0"/>
-              <a:t>	</a:t>
-            </a:r>
-            <a:r>
-              <a:rPr lang="en-US" altLang="nl-NL" sz="1800" dirty="0" smtClean="0"/>
-              <a:t>5 is here for some distance between other dots.</a:t>
-            </a:r>
-          </a:p>
-          <a:p>
-            <a:pPr lvl="2"/>
-            <a:r>
-              <a:rPr lang="en-US" altLang="nl-NL" sz="1800" dirty="0" smtClean="0"/>
-              <a:t>Zoom in level 1 means each dot = 1 person.</a:t>
-            </a:r>
-            <a:endParaRPr lang="en-US" altLang="nl-NL" sz="1800" dirty="0"/>
-          </a:p>
-          <a:p>
-            <a:pPr lvl="2"/>
-            <a:r>
-              <a:rPr lang="en-US" altLang="nl-NL" sz="1800" dirty="0" smtClean="0"/>
-              <a:t>For better visibility, we </a:t>
-            </a:r>
-            <a:r>
-              <a:rPr lang="en-US" altLang="nl-NL" sz="1800" dirty="0"/>
-              <a:t>give a minimum </a:t>
-            </a:r>
-            <a:r>
-              <a:rPr lang="en-US" altLang="nl-NL" sz="1800" dirty="0" smtClean="0"/>
-              <a:t>radius </a:t>
-            </a:r>
-            <a:r>
-              <a:rPr lang="en-US" altLang="nl-NL" sz="1800" dirty="0"/>
-              <a:t>of the </a:t>
-            </a:r>
-            <a:r>
-              <a:rPr lang="en-US" altLang="nl-NL" sz="1800" dirty="0" smtClean="0"/>
-              <a:t>dot, for instance 4.</a:t>
-            </a:r>
-            <a:endParaRPr lang="en-US" altLang="nl-NL" sz="2800" dirty="0" smtClean="0"/>
+              <a:t>For better visibility, we give a minimum radius of the dot, for instance 4.</a:t>
+            </a:r>
+            <a:endParaRPr lang="en-US" altLang="nl-NL" sz="2800" dirty="0"/>
           </a:p>
         </p:txBody>
       </p:sp>
@@ -14107,13 +13869,6 @@
   <p:clrMapOvr>
     <a:masterClrMapping/>
   </p:clrMapOvr>
-  <p:timing>
-    <p:tnLst>
-      <p:par>
-        <p:cTn id="1" dur="indefinite" restart="never" nodeType="tmRoot"/>
-      </p:par>
-    </p:tnLst>
-  </p:timing>
 </p:sld>
 </file>
 
@@ -14150,7 +13905,7 @@
           <a:lstStyle/>
           <a:p>
             <a:r>
-              <a:rPr lang="en-US" altLang="nl-NL" dirty="0" smtClean="0"/>
+              <a:rPr lang="en-US" altLang="nl-NL" dirty="0"/>
               <a:t>Problems </a:t>
             </a:r>
           </a:p>
@@ -14178,70 +13933,46 @@
           <a:p>
             <a:pPr lvl="1"/>
             <a:r>
-              <a:rPr lang="en-US" altLang="nl-NL" sz="2800" dirty="0" smtClean="0"/>
+              <a:rPr lang="en-US" altLang="nl-NL" sz="2800" dirty="0"/>
               <a:t>How many people = 1 dot</a:t>
             </a:r>
           </a:p>
           <a:p>
             <a:pPr lvl="2"/>
-            <a:endParaRPr lang="en-US" altLang="nl-NL" sz="1800" dirty="0" smtClean="0"/>
+            <a:endParaRPr lang="en-US" altLang="nl-NL" sz="1800" dirty="0"/>
           </a:p>
           <a:p>
             <a:pPr lvl="2"/>
             <a:r>
-              <a:rPr lang="en-US" altLang="nl-NL" sz="1800" dirty="0" smtClean="0"/>
+              <a:rPr lang="en-US" altLang="nl-NL" sz="1800" dirty="0"/>
               <a:t>For better display, say we want the distance between each dot is at least 70 pixels.</a:t>
             </a:r>
           </a:p>
           <a:p>
             <a:pPr lvl="2"/>
             <a:r>
-              <a:rPr lang="en-US" altLang="nl-NL" sz="1800" dirty="0" smtClean="0"/>
-              <a:t>Then we would have at most (window width / 70 / </a:t>
-            </a:r>
-            <a:r>
               <a:rPr lang="en-US" altLang="nl-NL" sz="1800" dirty="0"/>
-              <a:t>zoom in level</a:t>
-            </a:r>
-            <a:r>
-              <a:rPr lang="en-US" altLang="nl-NL" sz="1800" dirty="0" smtClean="0"/>
-              <a:t>) * (window height / 70 /</a:t>
-            </a:r>
+              <a:t>Then we would have at most (window width / 70 / zoom in level) * (window height / 70 / zoom in level)  = m dots.</a:t>
+            </a:r>
+          </a:p>
+          <a:p>
+            <a:pPr lvl="2"/>
             <a:r>
               <a:rPr lang="en-US" altLang="nl-NL" sz="1800" dirty="0"/>
-              <a:t> </a:t>
-            </a:r>
-            <a:r>
-              <a:rPr lang="en-US" altLang="nl-NL" sz="1800" dirty="0" smtClean="0"/>
-              <a:t>zoom </a:t>
-            </a:r>
+              <a:t>Let n = total number of people, then there would be roughly n / m people in each dot.</a:t>
+            </a:r>
+          </a:p>
+          <a:p>
+            <a:pPr lvl="2"/>
             <a:r>
               <a:rPr lang="en-US" altLang="nl-NL" sz="1800" dirty="0"/>
-              <a:t>in level</a:t>
-            </a:r>
-            <a:r>
-              <a:rPr lang="en-US" altLang="nl-NL" sz="1800" dirty="0" smtClean="0"/>
-              <a:t>)  = m dots.</a:t>
+              <a:t>We round the number, for instance, 12,390 will become 10,000; 103 will become 100 etc.</a:t>
             </a:r>
           </a:p>
           <a:p>
             <a:pPr lvl="2"/>
             <a:r>
-              <a:rPr lang="en-US" altLang="nl-NL" sz="1800" dirty="0" smtClean="0"/>
-              <a:t>Let n = total number of people, then there would be roughly n / m people in each dot.</a:t>
-            </a:r>
-          </a:p>
-          <a:p>
-            <a:pPr lvl="2"/>
-            <a:r>
-              <a:rPr lang="en-US" altLang="nl-NL" sz="1800" dirty="0" smtClean="0"/>
-              <a:t>We round the number, for instance, 12,390 will become 10,000; 103 will become 100 etc.</a:t>
-            </a:r>
-          </a:p>
-          <a:p>
-            <a:pPr lvl="2"/>
-            <a:r>
-              <a:rPr lang="en-US" altLang="nl-NL" sz="1800" dirty="0" smtClean="0"/>
+              <a:rPr lang="en-US" altLang="nl-NL" sz="1800" dirty="0"/>
               <a:t>We apply the rounded number to the aggregation algorithm.</a:t>
             </a:r>
           </a:p>
@@ -14257,13 +13988,6 @@
   <p:clrMapOvr>
     <a:masterClrMapping/>
   </p:clrMapOvr>
-  <p:timing>
-    <p:tnLst>
-      <p:par>
-        <p:cTn id="1" dur="indefinite" restart="never" nodeType="tmRoot"/>
-      </p:par>
-    </p:tnLst>
-  </p:timing>
 </p:sld>
 </file>
 
@@ -14300,7 +14024,7 @@
           <a:lstStyle/>
           <a:p>
             <a:r>
-              <a:rPr lang="en-US" altLang="nl-NL" dirty="0" smtClean="0"/>
+              <a:rPr lang="en-US" altLang="nl-NL" dirty="0"/>
               <a:t>Problems </a:t>
             </a:r>
           </a:p>
@@ -14328,7 +14052,7 @@
           <a:p>
             <a:pPr lvl="1"/>
             <a:r>
-              <a:rPr lang="en-US" altLang="nl-NL" sz="2800" dirty="0" smtClean="0"/>
+              <a:rPr lang="en-US" altLang="nl-NL" sz="2800" dirty="0"/>
               <a:t>Where to place the dot (1).</a:t>
             </a:r>
           </a:p>
@@ -14368,13 +14092,6 @@
   <p:clrMapOvr>
     <a:masterClrMapping/>
   </p:clrMapOvr>
-  <p:timing>
-    <p:tnLst>
-      <p:par>
-        <p:cTn id="1" dur="indefinite" restart="never" nodeType="tmRoot"/>
-      </p:par>
-    </p:tnLst>
-  </p:timing>
 </p:sld>
 </file>
 
@@ -14411,7 +14128,7 @@
           <a:lstStyle/>
           <a:p>
             <a:r>
-              <a:rPr lang="en-US" altLang="nl-NL" dirty="0" smtClean="0"/>
+              <a:rPr lang="en-US" altLang="nl-NL" dirty="0"/>
               <a:t>Problems </a:t>
             </a:r>
           </a:p>
@@ -14440,11 +14157,7 @@
             <a:pPr lvl="1"/>
             <a:r>
               <a:rPr lang="en-US" altLang="nl-NL" sz="2800" dirty="0"/>
-              <a:t>Color of the </a:t>
-            </a:r>
-            <a:r>
-              <a:rPr lang="en-US" altLang="nl-NL" sz="2800" dirty="0" smtClean="0"/>
-              <a:t>dot</a:t>
+              <a:t>Color of the dot</a:t>
             </a:r>
           </a:p>
         </p:txBody>
@@ -14483,13 +14196,6 @@
   <p:clrMapOvr>
     <a:masterClrMapping/>
   </p:clrMapOvr>
-  <p:timing>
-    <p:tnLst>
-      <p:par>
-        <p:cTn id="1" dur="indefinite" restart="never" nodeType="tmRoot"/>
-      </p:par>
-    </p:tnLst>
-  </p:timing>
 </p:sld>
 </file>
 

</xml_diff>

<commit_message>
Added color slide (example) to ppt. Improve the previous slide.
</commit_message>
<xml_diff>
--- a/GA_Group7_DotMap 20171021.pptx
+++ b/GA_Group7_DotMap 20171021.pptx
@@ -7,10 +7,10 @@
     <p:sldMasterId id="2147483653" r:id="rId3"/>
   </p:sldMasterIdLst>
   <p:notesMasterIdLst>
-    <p:notesMasterId r:id="rId25"/>
+    <p:notesMasterId r:id="rId26"/>
   </p:notesMasterIdLst>
   <p:handoutMasterIdLst>
-    <p:handoutMasterId r:id="rId26"/>
+    <p:handoutMasterId r:id="rId27"/>
   </p:handoutMasterIdLst>
   <p:sldIdLst>
     <p:sldId id="256" r:id="rId4"/>
@@ -23,17 +23,18 @@
     <p:sldId id="321" r:id="rId11"/>
     <p:sldId id="327" r:id="rId12"/>
     <p:sldId id="338" r:id="rId13"/>
-    <p:sldId id="330" r:id="rId14"/>
-    <p:sldId id="329" r:id="rId15"/>
-    <p:sldId id="331" r:id="rId16"/>
-    <p:sldId id="335" r:id="rId17"/>
-    <p:sldId id="332" r:id="rId18"/>
-    <p:sldId id="336" r:id="rId19"/>
-    <p:sldId id="337" r:id="rId20"/>
-    <p:sldId id="333" r:id="rId21"/>
-    <p:sldId id="318" r:id="rId22"/>
-    <p:sldId id="320" r:id="rId23"/>
-    <p:sldId id="334" r:id="rId24"/>
+    <p:sldId id="339" r:id="rId14"/>
+    <p:sldId id="330" r:id="rId15"/>
+    <p:sldId id="329" r:id="rId16"/>
+    <p:sldId id="331" r:id="rId17"/>
+    <p:sldId id="335" r:id="rId18"/>
+    <p:sldId id="332" r:id="rId19"/>
+    <p:sldId id="336" r:id="rId20"/>
+    <p:sldId id="337" r:id="rId21"/>
+    <p:sldId id="333" r:id="rId22"/>
+    <p:sldId id="318" r:id="rId23"/>
+    <p:sldId id="320" r:id="rId24"/>
+    <p:sldId id="334" r:id="rId25"/>
   </p:sldIdLst>
   <p:sldSz cx="9144000" cy="6858000" type="screen4x3"/>
   <p:notesSz cx="6797675" cy="9926638"/>
@@ -977,7 +978,7 @@
               <a:pPr>
                 <a:defRPr/>
               </a:pPr>
-              <a:t>20</a:t>
+              <a:t>21</a:t>
             </a:fld>
             <a:endParaRPr lang="en-US"/>
           </a:p>
@@ -1067,7 +1068,7 @@
               <a:pPr>
                 <a:defRPr/>
               </a:pPr>
-              <a:t>21</a:t>
+              <a:t>22</a:t>
             </a:fld>
             <a:endParaRPr lang="en-US"/>
           </a:p>
@@ -11765,86 +11766,310 @@
           </a:p>
         </p:txBody>
       </p:sp>
-      <p:sp>
-        <p:nvSpPr>
-          <p:cNvPr id="66563" name="Content Placeholder 2"/>
-          <p:cNvSpPr>
-            <a:spLocks noGrp="1"/>
-          </p:cNvSpPr>
-          <p:nvPr>
-            <p:ph idx="1"/>
-          </p:nvPr>
-        </p:nvSpPr>
-        <p:spPr>
-          <a:xfrm>
-            <a:off x="611188" y="1600201"/>
-            <a:ext cx="7994650" cy="2332855"/>
-          </a:xfrm>
-        </p:spPr>
-        <p:txBody>
-          <a:bodyPr/>
-          <a:lstStyle/>
-          <a:p>
-            <a:pPr lvl="1"/>
-            <a:r>
-              <a:rPr lang="en-US" altLang="nl-NL" sz="2800" dirty="0"/>
-              <a:t>Color of the dot</a:t>
-            </a:r>
-            <a:r>
-              <a:rPr lang="ro-RO" altLang="nl-NL" sz="2800" dirty="0"/>
-              <a:t> – Solution</a:t>
-            </a:r>
-          </a:p>
-          <a:p>
-            <a:pPr lvl="2"/>
-            <a:r>
-              <a:rPr lang="ro-RO" altLang="nl-NL" sz="2800" dirty="0"/>
-              <a:t>Use a rainbow palette</a:t>
-            </a:r>
-          </a:p>
-          <a:p>
-            <a:pPr lvl="2"/>
-            <a:r>
-              <a:rPr lang="ro-RO" altLang="nl-NL" sz="2800" dirty="0"/>
-              <a:t>Nr of categories = k</a:t>
-            </a:r>
-          </a:p>
-          <a:p>
-            <a:pPr lvl="2"/>
-            <a:r>
-              <a:rPr lang="ro-RO" altLang="nl-NL" sz="2800" dirty="0"/>
-              <a:t>For each k = 1 color =&gt; k different colors.</a:t>
-            </a:r>
-          </a:p>
-          <a:p>
-            <a:pPr lvl="2"/>
-            <a:r>
-              <a:rPr lang="ro-RO" altLang="nl-NL" sz="2800" dirty="0"/>
-              <a:t>Calculate ratio = 1/k.</a:t>
-            </a:r>
-          </a:p>
-          <a:p>
-            <a:pPr lvl="2"/>
-            <a:r>
-              <a:rPr lang="ro-RO" altLang="nl-NL" sz="2800" dirty="0"/>
-              <a:t>For category i the color = ratio * i, </a:t>
-            </a:r>
-          </a:p>
-          <a:p>
-            <a:pPr marL="1549400" lvl="5" indent="0">
-              <a:buNone/>
-            </a:pPr>
-            <a:r>
-              <a:rPr lang="ro-RO" altLang="nl-NL" sz="2800" dirty="0"/>
-              <a:t>			where 0 &lt; ratio * i &lt;= 1</a:t>
-            </a:r>
-          </a:p>
-          <a:p>
-            <a:pPr lvl="2"/>
-            <a:endParaRPr lang="en-US" altLang="nl-NL" sz="2800" dirty="0"/>
-          </a:p>
-        </p:txBody>
-      </p:sp>
+      <mc:AlternateContent xmlns:mc="http://schemas.openxmlformats.org/markup-compatibility/2006">
+        <mc:Choice xmlns:a14="http://schemas.microsoft.com/office/drawing/2010/main" Requires="a14">
+          <p:sp>
+            <p:nvSpPr>
+              <p:cNvPr id="66563" name="Content Placeholder 2"/>
+              <p:cNvSpPr>
+                <a:spLocks noGrp="1"/>
+              </p:cNvSpPr>
+              <p:nvPr>
+                <p:ph idx="1"/>
+              </p:nvPr>
+            </p:nvSpPr>
+            <p:spPr>
+              <a:xfrm>
+                <a:off x="611188" y="1600201"/>
+                <a:ext cx="7994650" cy="2332855"/>
+              </a:xfrm>
+            </p:spPr>
+            <p:txBody>
+              <a:bodyPr/>
+              <a:lstStyle/>
+              <a:p>
+                <a:pPr lvl="1"/>
+                <a:r>
+                  <a:rPr lang="en-US" altLang="nl-NL" sz="2800" dirty="0"/>
+                  <a:t>Color of the dot</a:t>
+                </a:r>
+                <a:r>
+                  <a:rPr lang="ro-RO" altLang="nl-NL" sz="2800" dirty="0"/>
+                  <a:t> – Solution</a:t>
+                </a:r>
+              </a:p>
+              <a:p>
+                <a:pPr lvl="2"/>
+                <a:r>
+                  <a:rPr lang="ro-RO" altLang="nl-NL" sz="2800" dirty="0"/>
+                  <a:t>Use a rainbow palette</a:t>
+                </a:r>
+              </a:p>
+              <a:p>
+                <a:pPr lvl="2"/>
+                <a:r>
+                  <a:rPr lang="ro-RO" altLang="nl-NL" sz="2800" dirty="0"/>
+                  <a:t>Nr of categories = </a:t>
+                </a:r>
+                <a14:m>
+                  <m:oMath xmlns:m="http://schemas.openxmlformats.org/officeDocument/2006/math">
+                    <m:r>
+                      <a:rPr lang="ro-RO" altLang="nl-NL" sz="2800" i="1" dirty="0" smtClean="0">
+                        <a:latin typeface="Cambria Math" panose="02040503050406030204" pitchFamily="18" charset="0"/>
+                      </a:rPr>
+                      <m:t>𝑘</m:t>
+                    </m:r>
+                  </m:oMath>
+                </a14:m>
+                <a:endParaRPr lang="ro-RO" altLang="nl-NL" sz="2800" dirty="0"/>
+              </a:p>
+              <a:p>
+                <a:pPr lvl="2"/>
+                <a:r>
+                  <a:rPr lang="ro-RO" altLang="nl-NL" sz="2800" dirty="0"/>
+                  <a:t>For each category </a:t>
+                </a:r>
+                <a14:m>
+                  <m:oMath xmlns:m="http://schemas.openxmlformats.org/officeDocument/2006/math">
+                    <m:r>
+                      <a:rPr lang="ro-RO" altLang="nl-NL" sz="2800" b="1" i="1" smtClean="0">
+                        <a:latin typeface="Cambria Math" panose="02040503050406030204" pitchFamily="18" charset="0"/>
+                      </a:rPr>
+                      <m:t>𝒊</m:t>
+                    </m:r>
+                  </m:oMath>
+                </a14:m>
+                <a:r>
+                  <a:rPr lang="ro-RO" altLang="nl-NL" sz="2800" dirty="0"/>
+                  <a:t> </a:t>
+                </a:r>
+                <a14:m>
+                  <m:oMath xmlns:m="http://schemas.openxmlformats.org/officeDocument/2006/math">
+                    <m:r>
+                      <a:rPr lang="ro-RO" altLang="nl-NL" sz="2800" i="1" smtClean="0">
+                        <a:latin typeface="Cambria Math" panose="02040503050406030204" pitchFamily="18" charset="0"/>
+                        <a:ea typeface="Cambria Math" panose="02040503050406030204" pitchFamily="18" charset="0"/>
+                      </a:rPr>
+                      <m:t>←</m:t>
+                    </m:r>
+                  </m:oMath>
+                </a14:m>
+                <a:r>
+                  <a:rPr lang="ro-RO" altLang="nl-NL" sz="2800" dirty="0"/>
+                  <a:t> 1 color = </a:t>
+                </a:r>
+                <a14:m>
+                  <m:oMath xmlns:m="http://schemas.openxmlformats.org/officeDocument/2006/math">
+                    <m:r>
+                      <a:rPr lang="ro-RO" altLang="nl-NL" sz="2800" i="1" dirty="0" smtClean="0">
+                        <a:latin typeface="Cambria Math" panose="02040503050406030204" pitchFamily="18" charset="0"/>
+                      </a:rPr>
+                      <m:t>𝑘</m:t>
+                    </m:r>
+                    <m:r>
+                      <a:rPr lang="ro-RO" altLang="nl-NL" sz="2800" i="1" dirty="0" smtClean="0">
+                        <a:latin typeface="Cambria Math" panose="02040503050406030204" pitchFamily="18" charset="0"/>
+                      </a:rPr>
+                      <m:t> </m:t>
+                    </m:r>
+                  </m:oMath>
+                </a14:m>
+                <a:r>
+                  <a:rPr lang="ro-RO" altLang="nl-NL" sz="2800" dirty="0"/>
+                  <a:t>different colors.</a:t>
+                </a:r>
+              </a:p>
+              <a:p>
+                <a:pPr lvl="2"/>
+                <a:r>
+                  <a:rPr lang="ro-RO" altLang="nl-NL" sz="2800" dirty="0"/>
+                  <a:t>Calculate ratio = </a:t>
+                </a:r>
+                <a14:m>
+                  <m:oMath xmlns:m="http://schemas.openxmlformats.org/officeDocument/2006/math">
+                    <m:f>
+                      <m:fPr>
+                        <m:ctrlPr>
+                          <a:rPr lang="ro-RO" altLang="nl-NL" sz="2800" i="1" dirty="0" smtClean="0">
+                            <a:latin typeface="Cambria Math" panose="02040503050406030204" pitchFamily="18" charset="0"/>
+                          </a:rPr>
+                        </m:ctrlPr>
+                      </m:fPr>
+                      <m:num>
+                        <m:r>
+                          <a:rPr lang="ro-RO" altLang="nl-NL" sz="2800" b="1" i="1" dirty="0" smtClean="0">
+                            <a:latin typeface="Cambria Math" panose="02040503050406030204" pitchFamily="18" charset="0"/>
+                          </a:rPr>
+                          <m:t>𝟏</m:t>
+                        </m:r>
+                      </m:num>
+                      <m:den>
+                        <m:r>
+                          <a:rPr lang="ro-RO" altLang="nl-NL" sz="2800" b="1" i="1" dirty="0" smtClean="0">
+                            <a:latin typeface="Cambria Math" panose="02040503050406030204" pitchFamily="18" charset="0"/>
+                          </a:rPr>
+                          <m:t>𝒌</m:t>
+                        </m:r>
+                      </m:den>
+                    </m:f>
+                  </m:oMath>
+                </a14:m>
+                <a:r>
+                  <a:rPr lang="ro-RO" altLang="nl-NL" sz="2800" dirty="0"/>
+                  <a:t>.</a:t>
+                </a:r>
+              </a:p>
+              <a:p>
+                <a:pPr lvl="2"/>
+                <a:r>
+                  <a:rPr lang="ro-RO" altLang="nl-NL" sz="2800" dirty="0"/>
+                  <a:t>For category </a:t>
+                </a:r>
+                <a14:m>
+                  <m:oMath xmlns:m="http://schemas.openxmlformats.org/officeDocument/2006/math">
+                    <m:r>
+                      <a:rPr lang="ro-RO" altLang="nl-NL" sz="2800" i="1" dirty="0" smtClean="0">
+                        <a:latin typeface="Cambria Math" panose="02040503050406030204" pitchFamily="18" charset="0"/>
+                      </a:rPr>
+                      <m:t>𝑖</m:t>
+                    </m:r>
+                  </m:oMath>
+                </a14:m>
+                <a:r>
+                  <a:rPr lang="ro-RO" altLang="nl-NL" sz="2800" dirty="0"/>
+                  <a:t> the color </a:t>
+                </a:r>
+                <a14:m>
+                  <m:oMath xmlns:m="http://schemas.openxmlformats.org/officeDocument/2006/math">
+                    <m:r>
+                      <a:rPr lang="ro-RO" altLang="nl-NL" sz="2800" b="1" i="0" dirty="0" smtClean="0">
+                        <a:latin typeface="Cambria Math" panose="02040503050406030204" pitchFamily="18" charset="0"/>
+                      </a:rPr>
+                      <m:t>=</m:t>
+                    </m:r>
+                    <m:r>
+                      <a:rPr lang="ro-RO" altLang="nl-NL" sz="2800" i="1" dirty="0" smtClean="0">
+                        <a:latin typeface="Cambria Math" panose="02040503050406030204" pitchFamily="18" charset="0"/>
+                      </a:rPr>
+                      <m:t>𝑟𝑎𝑡𝑖𝑜</m:t>
+                    </m:r>
+                    <m:r>
+                      <a:rPr lang="ro-RO" altLang="nl-NL" sz="2800" i="1" dirty="0" smtClean="0">
+                        <a:latin typeface="Cambria Math" panose="02040503050406030204" pitchFamily="18" charset="0"/>
+                      </a:rPr>
+                      <m:t> ∗ </m:t>
+                    </m:r>
+                    <m:r>
+                      <a:rPr lang="ro-RO" altLang="nl-NL" sz="2800" i="1" dirty="0" smtClean="0">
+                        <a:latin typeface="Cambria Math" panose="02040503050406030204" pitchFamily="18" charset="0"/>
+                      </a:rPr>
+                      <m:t>𝑖</m:t>
+                    </m:r>
+                  </m:oMath>
+                </a14:m>
+                <a:r>
+                  <a:rPr lang="ro-RO" altLang="nl-NL" sz="2800" dirty="0"/>
+                  <a:t>, </a:t>
+                </a:r>
+              </a:p>
+              <a:p>
+                <a:pPr marL="1549400" lvl="5" indent="0">
+                  <a:buNone/>
+                </a:pPr>
+                <a:r>
+                  <a:rPr lang="ro-RO" altLang="nl-NL" sz="2800" dirty="0"/>
+                  <a:t>			where </a:t>
+                </a:r>
+                <a14:m>
+                  <m:oMath xmlns:m="http://schemas.openxmlformats.org/officeDocument/2006/math">
+                    <m:r>
+                      <a:rPr lang="ro-RO" altLang="nl-NL" sz="2800" b="1" i="1" smtClean="0">
+                        <a:latin typeface="Cambria Math" panose="02040503050406030204" pitchFamily="18" charset="0"/>
+                      </a:rPr>
+                      <m:t>𝟎</m:t>
+                    </m:r>
+                    <m:r>
+                      <a:rPr lang="ro-RO" altLang="nl-NL" sz="2800" b="1" i="1" smtClean="0">
+                        <a:latin typeface="Cambria Math" panose="02040503050406030204" pitchFamily="18" charset="0"/>
+                      </a:rPr>
+                      <m:t>&lt;</m:t>
+                    </m:r>
+                    <m:r>
+                      <a:rPr lang="ro-RO" altLang="nl-NL" sz="2800" b="1" i="1" smtClean="0">
+                        <a:latin typeface="Cambria Math" panose="02040503050406030204" pitchFamily="18" charset="0"/>
+                      </a:rPr>
+                      <m:t>𝒓𝒂𝒕𝒊𝒐</m:t>
+                    </m:r>
+                    <m:r>
+                      <a:rPr lang="ro-RO" altLang="nl-NL" sz="2800" b="1" i="1" smtClean="0">
+                        <a:latin typeface="Cambria Math" panose="02040503050406030204" pitchFamily="18" charset="0"/>
+                      </a:rPr>
+                      <m:t> ∗</m:t>
+                    </m:r>
+                    <m:r>
+                      <a:rPr lang="ro-RO" altLang="nl-NL" sz="2800" b="1" i="1" smtClean="0">
+                        <a:latin typeface="Cambria Math" panose="02040503050406030204" pitchFamily="18" charset="0"/>
+                      </a:rPr>
+                      <m:t>𝒊</m:t>
+                    </m:r>
+                    <m:r>
+                      <a:rPr lang="ro-RO" altLang="nl-NL" sz="2800" b="1" i="1" smtClean="0">
+                        <a:latin typeface="Cambria Math" panose="02040503050406030204" pitchFamily="18" charset="0"/>
+                      </a:rPr>
+                      <m:t> ≤</m:t>
+                    </m:r>
+                    <m:r>
+                      <a:rPr lang="ro-RO" altLang="nl-NL" sz="2800" b="1" i="1" smtClean="0">
+                        <a:latin typeface="Cambria Math" panose="02040503050406030204" pitchFamily="18" charset="0"/>
+                        <a:ea typeface="Cambria Math" panose="02040503050406030204" pitchFamily="18" charset="0"/>
+                      </a:rPr>
+                      <m:t>𝟏</m:t>
+                    </m:r>
+                  </m:oMath>
+                </a14:m>
+                <a:endParaRPr lang="en-US" altLang="nl-NL" sz="2800" dirty="0"/>
+              </a:p>
+            </p:txBody>
+          </p:sp>
+        </mc:Choice>
+        <mc:Fallback>
+          <p:sp>
+            <p:nvSpPr>
+              <p:cNvPr id="66563" name="Content Placeholder 2"/>
+              <p:cNvSpPr>
+                <a:spLocks noGrp="1" noRot="1" noChangeAspect="1" noMove="1" noResize="1" noEditPoints="1" noAdjustHandles="1" noChangeArrowheads="1" noChangeShapeType="1" noTextEdit="1"/>
+              </p:cNvSpPr>
+              <p:nvPr>
+                <p:ph idx="1"/>
+              </p:nvPr>
+            </p:nvSpPr>
+            <p:spPr>
+              <a:xfrm>
+                <a:off x="611188" y="1600201"/>
+                <a:ext cx="7994650" cy="2332855"/>
+              </a:xfrm>
+              <a:blipFill>
+                <a:blip r:embed="rId2"/>
+                <a:stretch>
+                  <a:fillRect t="-4712" r="-2668" b="-87435"/>
+                </a:stretch>
+              </a:blipFill>
+            </p:spPr>
+            <p:txBody>
+              <a:bodyPr/>
+              <a:lstStyle/>
+              <a:p>
+                <a:r>
+                  <a:rPr lang="en-US">
+                    <a:noFill/>
+                  </a:rPr>
+                  <a:t> </a:t>
+                </a:r>
+              </a:p>
+            </p:txBody>
+          </p:sp>
+        </mc:Fallback>
+      </mc:AlternateContent>
       <p:pic>
         <p:nvPicPr>
           <p:cNvPr id="4" name="Picture 3">
@@ -11860,7 +12085,7 @@
           <p:nvPr/>
         </p:nvPicPr>
         <p:blipFill>
-          <a:blip r:embed="rId2" cstate="print">
+          <a:blip r:embed="rId3" cstate="print">
             <a:extLst>
               <a:ext uri="{28A0092B-C50C-407E-A947-70E740481C1C}">
                 <a14:useLocalDpi xmlns:a14="http://schemas.microsoft.com/office/drawing/2010/main" val="0"/>
@@ -11895,7 +12120,7 @@
 </file>
 
 <file path=ppt/slides/slide11.xml><?xml version="1.0" encoding="utf-8"?>
-<p:sld xmlns:a="http://schemas.openxmlformats.org/drawingml/2006/main" xmlns:r="http://schemas.openxmlformats.org/officeDocument/2006/relationships" xmlns:p="http://schemas.openxmlformats.org/presentationml/2006/main" show="0">
+<p:sld xmlns:a="http://schemas.openxmlformats.org/drawingml/2006/main" xmlns:r="http://schemas.openxmlformats.org/officeDocument/2006/relationships" xmlns:p="http://schemas.openxmlformats.org/presentationml/2006/main">
   <p:cSld>
     <p:spTree>
       <p:nvGrpSpPr>
@@ -11933,105 +12158,164 @@
           </a:p>
         </p:txBody>
       </p:sp>
-      <p:sp>
-        <p:nvSpPr>
-          <p:cNvPr id="66563" name="Content Placeholder 2"/>
-          <p:cNvSpPr>
-            <a:spLocks noGrp="1"/>
-          </p:cNvSpPr>
-          <p:nvPr>
-            <p:ph idx="1"/>
-          </p:nvPr>
-        </p:nvSpPr>
-        <p:spPr>
-          <a:xfrm>
-            <a:off x="611188" y="1600201"/>
-            <a:ext cx="7994650" cy="2332855"/>
-          </a:xfrm>
-        </p:spPr>
-        <p:txBody>
-          <a:bodyPr/>
-          <a:lstStyle/>
-          <a:p>
-            <a:pPr lvl="1"/>
-            <a:r>
-              <a:rPr lang="en-US" altLang="nl-NL" sz="2800" dirty="0"/>
-              <a:t>Color of the dot – solution 1</a:t>
-            </a:r>
-          </a:p>
-          <a:p>
-            <a:pPr lvl="2"/>
-            <a:r>
-              <a:rPr lang="en-US" altLang="nl-NL" sz="1800" dirty="0">
-                <a:solidFill>
-                  <a:srgbClr val="FF0000"/>
-                </a:solidFill>
-              </a:rPr>
-              <a:t>50% green</a:t>
-            </a:r>
-            <a:r>
-              <a:rPr lang="en-US" altLang="nl-NL" sz="1800" dirty="0"/>
-              <a:t>	</a:t>
-            </a:r>
-          </a:p>
-          <a:p>
-            <a:pPr lvl="2"/>
-            <a:r>
-              <a:rPr lang="en-US" altLang="nl-NL" sz="1800" dirty="0"/>
-              <a:t>20% blue		</a:t>
-            </a:r>
-          </a:p>
-          <a:p>
-            <a:pPr lvl="2"/>
-            <a:r>
-              <a:rPr lang="en-US" altLang="nl-NL" sz="1800" dirty="0"/>
-              <a:t>10% red		</a:t>
-            </a:r>
-          </a:p>
-          <a:p>
-            <a:pPr lvl="2"/>
-            <a:r>
-              <a:rPr lang="en-US" altLang="nl-NL" sz="1800" dirty="0"/>
-              <a:t>10% yellow	</a:t>
-            </a:r>
-          </a:p>
-          <a:p>
-            <a:pPr lvl="2"/>
-            <a:r>
-              <a:rPr lang="en-US" altLang="nl-NL" sz="1800" dirty="0"/>
-              <a:t>10% black	</a:t>
-            </a:r>
-          </a:p>
-        </p:txBody>
-      </p:sp>
       <p:pic>
         <p:nvPicPr>
-          <p:cNvPr id="3" name="Picture 2"/>
+          <p:cNvPr id="6" name="Picture 5">
+            <a:extLst>
+              <a:ext uri="{FF2B5EF4-FFF2-40B4-BE49-F238E27FC236}">
+                <a16:creationId xmlns:a16="http://schemas.microsoft.com/office/drawing/2014/main" id="{EBCFBED3-52AC-4324-8B97-07BDE215B152}"/>
+              </a:ext>
+            </a:extLst>
+          </p:cNvPr>
           <p:cNvPicPr>
             <a:picLocks noChangeAspect="1"/>
           </p:cNvPicPr>
           <p:nvPr/>
         </p:nvPicPr>
         <p:blipFill>
-          <a:blip r:embed="rId2"/>
+          <a:blip r:embed="rId2">
+            <a:extLst>
+              <a:ext uri="{28A0092B-C50C-407E-A947-70E740481C1C}">
+                <a14:useLocalDpi xmlns:a14="http://schemas.microsoft.com/office/drawing/2010/main" val="0"/>
+              </a:ext>
+            </a:extLst>
+          </a:blip>
           <a:stretch>
             <a:fillRect/>
           </a:stretch>
         </p:blipFill>
         <p:spPr>
           <a:xfrm>
-            <a:off x="1079612" y="4113076"/>
-            <a:ext cx="3312368" cy="2204559"/>
+            <a:off x="3527361" y="3305805"/>
+            <a:ext cx="1504114" cy="1707372"/>
           </a:xfrm>
           <a:prstGeom prst="rect">
             <a:avLst/>
           </a:prstGeom>
         </p:spPr>
       </p:pic>
+      <mc:AlternateContent xmlns:mc="http://schemas.openxmlformats.org/markup-compatibility/2006">
+        <mc:Choice xmlns:a14="http://schemas.microsoft.com/office/drawing/2010/main" Requires="a14">
+          <p:sp>
+            <p:nvSpPr>
+              <p:cNvPr id="9" name="Content Placeholder 2">
+                <a:extLst>
+                  <a:ext uri="{FF2B5EF4-FFF2-40B4-BE49-F238E27FC236}">
+                    <a16:creationId xmlns:a16="http://schemas.microsoft.com/office/drawing/2014/main" id="{5280423E-75A5-4B51-B75D-7AC85226A212}"/>
+                  </a:ext>
+                </a:extLst>
+              </p:cNvPr>
+              <p:cNvSpPr>
+                <a:spLocks noGrp="1"/>
+              </p:cNvSpPr>
+              <p:nvPr>
+                <p:ph idx="1"/>
+              </p:nvPr>
+            </p:nvSpPr>
+            <p:spPr>
+              <a:xfrm>
+                <a:off x="611188" y="1600201"/>
+                <a:ext cx="7994650" cy="2332855"/>
+              </a:xfrm>
+            </p:spPr>
+            <p:txBody>
+              <a:bodyPr/>
+              <a:lstStyle/>
+              <a:p>
+                <a:pPr lvl="1"/>
+                <a:r>
+                  <a:rPr lang="en-US" altLang="nl-NL" sz="2800" dirty="0"/>
+                  <a:t>Color of the dot</a:t>
+                </a:r>
+                <a:r>
+                  <a:rPr lang="ro-RO" altLang="nl-NL" sz="2800" dirty="0"/>
+                  <a:t> – Example</a:t>
+                </a:r>
+              </a:p>
+              <a:p>
+                <a:pPr lvl="2"/>
+                <a:r>
+                  <a:rPr lang="ro-RO" altLang="nl-NL" sz="2800" dirty="0"/>
+                  <a:t>For </a:t>
+                </a:r>
+                <a14:m>
+                  <m:oMath xmlns:m="http://schemas.openxmlformats.org/officeDocument/2006/math">
+                    <m:r>
+                      <a:rPr lang="ro-RO" altLang="nl-NL" sz="2800" b="1" i="1" smtClean="0">
+                        <a:latin typeface="Cambria Math" panose="02040503050406030204" pitchFamily="18" charset="0"/>
+                      </a:rPr>
+                      <m:t>𝒌</m:t>
+                    </m:r>
+                    <m:r>
+                      <a:rPr lang="ro-RO" altLang="nl-NL" sz="2800" b="1" i="1" smtClean="0">
+                        <a:latin typeface="Cambria Math" panose="02040503050406030204" pitchFamily="18" charset="0"/>
+                      </a:rPr>
+                      <m:t>=</m:t>
+                    </m:r>
+                    <m:r>
+                      <a:rPr lang="ro-RO" altLang="nl-NL" sz="2800" b="1" i="1" smtClean="0">
+                        <a:latin typeface="Cambria Math" panose="02040503050406030204" pitchFamily="18" charset="0"/>
+                      </a:rPr>
+                      <m:t>𝟓</m:t>
+                    </m:r>
+                  </m:oMath>
+                </a14:m>
+                <a:r>
+                  <a:rPr lang="ro-RO" altLang="nl-NL" sz="2800" dirty="0"/>
+                  <a:t> categories:</a:t>
+                </a:r>
+              </a:p>
+            </p:txBody>
+          </p:sp>
+        </mc:Choice>
+        <mc:Fallback>
+          <p:sp>
+            <p:nvSpPr>
+              <p:cNvPr id="9" name="Content Placeholder 2">
+                <a:extLst>
+                  <a:ext uri="{FF2B5EF4-FFF2-40B4-BE49-F238E27FC236}">
+                    <a16:creationId xmlns:a16="http://schemas.microsoft.com/office/drawing/2014/main" id="{5280423E-75A5-4B51-B75D-7AC85226A212}"/>
+                  </a:ext>
+                </a:extLst>
+              </p:cNvPr>
+              <p:cNvSpPr>
+                <a:spLocks noGrp="1" noRot="1" noChangeAspect="1" noMove="1" noResize="1" noEditPoints="1" noAdjustHandles="1" noChangeArrowheads="1" noChangeShapeType="1" noTextEdit="1"/>
+              </p:cNvSpPr>
+              <p:nvPr>
+                <p:ph idx="1"/>
+              </p:nvPr>
+            </p:nvSpPr>
+            <p:spPr>
+              <a:xfrm>
+                <a:off x="611188" y="1600201"/>
+                <a:ext cx="7994650" cy="2332855"/>
+              </a:xfrm>
+              <a:blipFill>
+                <a:blip r:embed="rId3"/>
+                <a:stretch>
+                  <a:fillRect t="-4712"/>
+                </a:stretch>
+              </a:blipFill>
+            </p:spPr>
+            <p:txBody>
+              <a:bodyPr/>
+              <a:lstStyle/>
+              <a:p>
+                <a:r>
+                  <a:rPr lang="en-US">
+                    <a:noFill/>
+                  </a:rPr>
+                  <a:t> </a:t>
+                </a:r>
+              </a:p>
+            </p:txBody>
+          </p:sp>
+        </mc:Fallback>
+      </mc:AlternateContent>
     </p:spTree>
     <p:extLst>
       <p:ext uri="{BB962C8B-B14F-4D97-AF65-F5344CB8AC3E}">
-        <p14:creationId xmlns:p14="http://schemas.microsoft.com/office/powerpoint/2010/main" val="570575025"/>
+        <p14:creationId xmlns:p14="http://schemas.microsoft.com/office/powerpoint/2010/main" val="2199490931"/>
       </p:ext>
     </p:extLst>
   </p:cSld>
@@ -12103,35 +12387,7 @@
             <a:pPr lvl="1"/>
             <a:r>
               <a:rPr lang="en-US" altLang="nl-NL" sz="2800" dirty="0"/>
-              <a:t>Color of the dot – solution 2</a:t>
-            </a:r>
-          </a:p>
-          <a:p>
-            <a:pPr lvl="2"/>
-            <a:r>
-              <a:rPr lang="en-US" altLang="nl-NL" sz="1800" dirty="0"/>
-              <a:t>50% green	/ 60% green</a:t>
-            </a:r>
-          </a:p>
-          <a:p>
-            <a:pPr lvl="2"/>
-            <a:r>
-              <a:rPr lang="en-US" altLang="nl-NL" sz="1800" dirty="0"/>
-              <a:t>20% blue		/15% blue</a:t>
-            </a:r>
-          </a:p>
-          <a:p>
-            <a:pPr lvl="2"/>
-            <a:r>
-              <a:rPr lang="en-US" altLang="nl-NL" sz="1800" dirty="0"/>
-              <a:t>10% red		/10% red</a:t>
-            </a:r>
-          </a:p>
-          <a:p>
-            <a:pPr lvl="2"/>
-            <a:r>
-              <a:rPr lang="en-US" altLang="nl-NL" sz="1800" dirty="0"/>
-              <a:t>10% yellow	/10% yellow</a:t>
+              <a:t>Color of the dot – solution 1</a:t>
             </a:r>
           </a:p>
           <a:p>
@@ -12142,7 +12398,39 @@
                   <a:srgbClr val="FF0000"/>
                 </a:solidFill>
               </a:rPr>
-              <a:t>10% black	/5%black</a:t>
+              <a:t>50% green</a:t>
+            </a:r>
+            <a:r>
+              <a:rPr lang="en-US" altLang="nl-NL" sz="1800" dirty="0"/>
+              <a:t>	</a:t>
+            </a:r>
+          </a:p>
+          <a:p>
+            <a:pPr lvl="2"/>
+            <a:r>
+              <a:rPr lang="en-US" altLang="nl-NL" sz="1800" dirty="0"/>
+              <a:t>20% blue		</a:t>
+            </a:r>
+          </a:p>
+          <a:p>
+            <a:pPr lvl="2"/>
+            <a:r>
+              <a:rPr lang="en-US" altLang="nl-NL" sz="1800" dirty="0"/>
+              <a:t>10% red		</a:t>
+            </a:r>
+          </a:p>
+          <a:p>
+            <a:pPr lvl="2"/>
+            <a:r>
+              <a:rPr lang="en-US" altLang="nl-NL" sz="1800" dirty="0"/>
+              <a:t>10% yellow	</a:t>
+            </a:r>
+          </a:p>
+          <a:p>
+            <a:pPr lvl="2"/>
+            <a:r>
+              <a:rPr lang="en-US" altLang="nl-NL" sz="1800" dirty="0"/>
+              <a:t>10% black	</a:t>
             </a:r>
           </a:p>
         </p:txBody>
@@ -12174,7 +12462,7 @@
     </p:spTree>
     <p:extLst>
       <p:ext uri="{BB962C8B-B14F-4D97-AF65-F5344CB8AC3E}">
-        <p14:creationId xmlns:p14="http://schemas.microsoft.com/office/powerpoint/2010/main" val="1325705847"/>
+        <p14:creationId xmlns:p14="http://schemas.microsoft.com/office/powerpoint/2010/main" val="570575025"/>
       </p:ext>
     </p:extLst>
   </p:cSld>
@@ -12246,7 +12534,35 @@
             <a:pPr lvl="1"/>
             <a:r>
               <a:rPr lang="en-US" altLang="nl-NL" sz="2800" dirty="0"/>
-              <a:t>Color of the dot – solution 3 (implemented)</a:t>
+              <a:t>Color of the dot – solution 2</a:t>
+            </a:r>
+          </a:p>
+          <a:p>
+            <a:pPr lvl="2"/>
+            <a:r>
+              <a:rPr lang="en-US" altLang="nl-NL" sz="1800" dirty="0"/>
+              <a:t>50% green	/ 60% green</a:t>
+            </a:r>
+          </a:p>
+          <a:p>
+            <a:pPr lvl="2"/>
+            <a:r>
+              <a:rPr lang="en-US" altLang="nl-NL" sz="1800" dirty="0"/>
+              <a:t>20% blue		/15% blue</a:t>
+            </a:r>
+          </a:p>
+          <a:p>
+            <a:pPr lvl="2"/>
+            <a:r>
+              <a:rPr lang="en-US" altLang="nl-NL" sz="1800" dirty="0"/>
+              <a:t>10% red		/10% red</a:t>
+            </a:r>
+          </a:p>
+          <a:p>
+            <a:pPr lvl="2"/>
+            <a:r>
+              <a:rPr lang="en-US" altLang="nl-NL" sz="1800" dirty="0"/>
+              <a:t>10% yellow	/10% yellow</a:t>
             </a:r>
           </a:p>
           <a:p>
@@ -12257,35 +12573,7 @@
                   <a:srgbClr val="FF0000"/>
                 </a:solidFill>
               </a:rPr>
-              <a:t>50% green	/ root 60% green</a:t>
-            </a:r>
-          </a:p>
-          <a:p>
-            <a:pPr lvl="2"/>
-            <a:r>
-              <a:rPr lang="en-US" altLang="nl-NL" sz="1800" dirty="0"/>
-              <a:t>20% blue		/ root 15% blue</a:t>
-            </a:r>
-          </a:p>
-          <a:p>
-            <a:pPr lvl="2"/>
-            <a:r>
-              <a:rPr lang="en-US" altLang="nl-NL" sz="1800" dirty="0"/>
-              <a:t>10% red		/ root 10% red</a:t>
-            </a:r>
-          </a:p>
-          <a:p>
-            <a:pPr lvl="2"/>
-            <a:r>
-              <a:rPr lang="en-US" altLang="nl-NL" sz="1800" dirty="0"/>
-              <a:t>10% yellow	/ root 10% yellow</a:t>
-            </a:r>
-          </a:p>
-          <a:p>
-            <a:pPr lvl="2"/>
-            <a:r>
-              <a:rPr lang="en-US" altLang="nl-NL" sz="1800" dirty="0"/>
-              <a:t>10% black	/ root 5%black</a:t>
+              <a:t>10% black	/5%black</a:t>
             </a:r>
           </a:p>
         </p:txBody>
@@ -12317,7 +12605,7 @@
     </p:spTree>
     <p:extLst>
       <p:ext uri="{BB962C8B-B14F-4D97-AF65-F5344CB8AC3E}">
-        <p14:creationId xmlns:p14="http://schemas.microsoft.com/office/powerpoint/2010/main" val="3318231435"/>
+        <p14:creationId xmlns:p14="http://schemas.microsoft.com/office/powerpoint/2010/main" val="1325705847"/>
       </p:ext>
     </p:extLst>
   </p:cSld>
@@ -12389,7 +12677,7 @@
             <a:pPr lvl="1"/>
             <a:r>
               <a:rPr lang="en-US" altLang="nl-NL" sz="2800" dirty="0"/>
-              <a:t>Color of the dot – solution 4</a:t>
+              <a:t>Color of the dot – solution 3 (implemented)</a:t>
             </a:r>
           </a:p>
           <a:p>
@@ -12427,11 +12715,7 @@
           <a:p>
             <a:pPr lvl="2"/>
             <a:r>
-              <a:rPr lang="en-US" altLang="nl-NL" sz="1800" dirty="0">
-                <a:solidFill>
-                  <a:srgbClr val="FF0000"/>
-                </a:solidFill>
-              </a:rPr>
+              <a:rPr lang="en-US" altLang="nl-NL" sz="1800" dirty="0"/>
               <a:t>10% black	/ root 5%black</a:t>
             </a:r>
           </a:p>
@@ -12464,7 +12748,7 @@
     </p:spTree>
     <p:extLst>
       <p:ext uri="{BB962C8B-B14F-4D97-AF65-F5344CB8AC3E}">
-        <p14:creationId xmlns:p14="http://schemas.microsoft.com/office/powerpoint/2010/main" val="3143489279"/>
+        <p14:creationId xmlns:p14="http://schemas.microsoft.com/office/powerpoint/2010/main" val="3318231435"/>
       </p:ext>
     </p:extLst>
   </p:cSld>
@@ -12475,7 +12759,7 @@
 </file>
 
 <file path=ppt/slides/slide15.xml><?xml version="1.0" encoding="utf-8"?>
-<p:sld xmlns:a="http://schemas.openxmlformats.org/drawingml/2006/main" xmlns:r="http://schemas.openxmlformats.org/officeDocument/2006/relationships" xmlns:p="http://schemas.openxmlformats.org/presentationml/2006/main">
+<p:sld xmlns:a="http://schemas.openxmlformats.org/drawingml/2006/main" xmlns:r="http://schemas.openxmlformats.org/officeDocument/2006/relationships" xmlns:p="http://schemas.openxmlformats.org/presentationml/2006/main" show="0">
   <p:cSld>
     <p:spTree>
       <p:nvGrpSpPr>
@@ -12536,44 +12820,82 @@
             <a:pPr lvl="1"/>
             <a:r>
               <a:rPr lang="en-US" altLang="nl-NL" sz="2800" dirty="0"/>
-              <a:t>Where to place the dot (2).</a:t>
+              <a:t>Color of the dot – solution 4</a:t>
             </a:r>
           </a:p>
           <a:p>
             <a:pPr lvl="2"/>
             <a:r>
-              <a:rPr lang="en-US" altLang="nl-NL" sz="2800" dirty="0">
+              <a:rPr lang="en-US" altLang="nl-NL" sz="1800" dirty="0">
                 <a:solidFill>
-                  <a:schemeClr val="accent6"/>
+                  <a:srgbClr val="FF0000"/>
                 </a:solidFill>
               </a:rPr>
-              <a:t>Choose the middle dot’s position</a:t>
-            </a:r>
-          </a:p>
-          <a:p>
-            <a:pPr lvl="3"/>
+              <a:t>50% green	/ root 60% green</a:t>
+            </a:r>
+          </a:p>
+          <a:p>
+            <a:pPr lvl="2"/>
+            <a:r>
+              <a:rPr lang="en-US" altLang="nl-NL" sz="1800" dirty="0"/>
+              <a:t>20% blue		/ root 15% blue</a:t>
+            </a:r>
+          </a:p>
+          <a:p>
+            <a:pPr lvl="2"/>
+            <a:r>
+              <a:rPr lang="en-US" altLang="nl-NL" sz="1800" dirty="0"/>
+              <a:t>10% red		/ root 10% red</a:t>
+            </a:r>
+          </a:p>
+          <a:p>
+            <a:pPr lvl="2"/>
+            <a:r>
+              <a:rPr lang="en-US" altLang="nl-NL" sz="1800" dirty="0"/>
+              <a:t>10% yellow	/ root 10% yellow</a:t>
+            </a:r>
+          </a:p>
+          <a:p>
+            <a:pPr lvl="2"/>
             <a:r>
               <a:rPr lang="en-US" altLang="nl-NL" sz="1800" dirty="0">
                 <a:solidFill>
-                  <a:schemeClr val="accent6"/>
+                  <a:srgbClr val="FF0000"/>
                 </a:solidFill>
               </a:rPr>
-              <a:t>Dots are stored in a list</a:t>
-            </a:r>
-          </a:p>
-          <a:p>
-            <a:pPr lvl="2"/>
-            <a:r>
-              <a:rPr lang="en-US" altLang="nl-NL" sz="2800" dirty="0"/>
-              <a:t>Average of all chosen dots’ positions</a:t>
-            </a:r>
-          </a:p>
-        </p:txBody>
-      </p:sp>
+              <a:t>10% black	/ root 5%black</a:t>
+            </a:r>
+          </a:p>
+        </p:txBody>
+      </p:sp>
+      <p:pic>
+        <p:nvPicPr>
+          <p:cNvPr id="3" name="Picture 2"/>
+          <p:cNvPicPr>
+            <a:picLocks noChangeAspect="1"/>
+          </p:cNvPicPr>
+          <p:nvPr/>
+        </p:nvPicPr>
+        <p:blipFill>
+          <a:blip r:embed="rId2"/>
+          <a:stretch>
+            <a:fillRect/>
+          </a:stretch>
+        </p:blipFill>
+        <p:spPr>
+          <a:xfrm>
+            <a:off x="1079612" y="4113076"/>
+            <a:ext cx="3312368" cy="2204559"/>
+          </a:xfrm>
+          <a:prstGeom prst="rect">
+            <a:avLst/>
+          </a:prstGeom>
+        </p:spPr>
+      </p:pic>
     </p:spTree>
     <p:extLst>
       <p:ext uri="{BB962C8B-B14F-4D97-AF65-F5344CB8AC3E}">
-        <p14:creationId xmlns:p14="http://schemas.microsoft.com/office/powerpoint/2010/main" val="1181847411"/>
+        <p14:creationId xmlns:p14="http://schemas.microsoft.com/office/powerpoint/2010/main" val="3143489279"/>
       </p:ext>
     </p:extLst>
   </p:cSld>
@@ -12645,47 +12967,44 @@
             <a:pPr lvl="1"/>
             <a:r>
               <a:rPr lang="en-US" altLang="nl-NL" sz="2800" dirty="0"/>
-              <a:t>Where to place the dot (3).</a:t>
+              <a:t>Where to place the dot (2).</a:t>
             </a:r>
           </a:p>
           <a:p>
             <a:pPr lvl="2"/>
             <a:r>
-              <a:rPr lang="en-US" altLang="zh-CN" sz="2800" dirty="0"/>
-              <a:t>Solve the overlapping</a:t>
-            </a:r>
-            <a:endParaRPr lang="en-US" altLang="nl-NL" sz="2800" dirty="0"/>
-          </a:p>
-        </p:txBody>
-      </p:sp>
-      <p:pic>
-        <p:nvPicPr>
-          <p:cNvPr id="3" name="Picture 2"/>
-          <p:cNvPicPr>
-            <a:picLocks noChangeAspect="1"/>
-          </p:cNvPicPr>
-          <p:nvPr/>
-        </p:nvPicPr>
-        <p:blipFill>
-          <a:blip r:embed="rId2"/>
-          <a:stretch>
-            <a:fillRect/>
-          </a:stretch>
-        </p:blipFill>
-        <p:spPr>
-          <a:xfrm>
-            <a:off x="1238013" y="3032956"/>
-            <a:ext cx="6741000" cy="2036800"/>
-          </a:xfrm>
-          <a:prstGeom prst="rect">
-            <a:avLst/>
-          </a:prstGeom>
-        </p:spPr>
-      </p:pic>
+              <a:rPr lang="en-US" altLang="nl-NL" sz="2800" dirty="0">
+                <a:solidFill>
+                  <a:schemeClr val="accent6"/>
+                </a:solidFill>
+              </a:rPr>
+              <a:t>Choose the middle dot’s position</a:t>
+            </a:r>
+          </a:p>
+          <a:p>
+            <a:pPr lvl="3"/>
+            <a:r>
+              <a:rPr lang="en-US" altLang="nl-NL" sz="1800" dirty="0">
+                <a:solidFill>
+                  <a:schemeClr val="accent6"/>
+                </a:solidFill>
+              </a:rPr>
+              <a:t>Dots are stored in a list</a:t>
+            </a:r>
+          </a:p>
+          <a:p>
+            <a:pPr lvl="2"/>
+            <a:r>
+              <a:rPr lang="en-US" altLang="nl-NL" sz="2800" dirty="0"/>
+              <a:t>Average of all chosen dots’ positions</a:t>
+            </a:r>
+          </a:p>
+        </p:txBody>
+      </p:sp>
     </p:spTree>
     <p:extLst>
       <p:ext uri="{BB962C8B-B14F-4D97-AF65-F5344CB8AC3E}">
-        <p14:creationId xmlns:p14="http://schemas.microsoft.com/office/powerpoint/2010/main" val="4172768736"/>
+        <p14:creationId xmlns:p14="http://schemas.microsoft.com/office/powerpoint/2010/main" val="1181847411"/>
       </p:ext>
     </p:extLst>
   </p:cSld>
@@ -12729,7 +13048,7 @@
           <a:p>
             <a:r>
               <a:rPr lang="en-US" altLang="nl-NL" dirty="0"/>
-              <a:t>Running time</a:t>
+              <a:t>Problems </a:t>
             </a:r>
           </a:p>
         </p:txBody>
@@ -12747,7 +13066,7 @@
         <p:spPr>
           <a:xfrm>
             <a:off x="611188" y="1600201"/>
-            <a:ext cx="7994650" cy="4025044"/>
+            <a:ext cx="7994650" cy="2332855"/>
           </a:xfrm>
         </p:spPr>
         <p:txBody>
@@ -12757,100 +13076,47 @@
             <a:pPr lvl="1"/>
             <a:r>
               <a:rPr lang="en-US" altLang="nl-NL" sz="2800" dirty="0"/>
-              <a:t>Radius of the dot  = O(1)</a:t>
-            </a:r>
-          </a:p>
-          <a:p>
-            <a:pPr lvl="1"/>
-            <a:r>
-              <a:rPr lang="en-US" altLang="nl-NL" sz="2800" dirty="0"/>
-              <a:t>How many people = 1 dot = O(1)</a:t>
-            </a:r>
-          </a:p>
-          <a:p>
-            <a:pPr lvl="1"/>
-            <a:r>
-              <a:rPr lang="en-US" altLang="nl-NL" sz="2800" dirty="0"/>
-              <a:t>Where to place the dot = O(n)</a:t>
+              <a:t>Where to place the dot (3).</a:t>
             </a:r>
           </a:p>
           <a:p>
             <a:pPr lvl="2"/>
             <a:r>
-              <a:rPr lang="en-US" altLang="nl-NL" sz="1800" dirty="0"/>
-              <a:t>Choose the middle point (O(1) </a:t>
-            </a:r>
-            <a:r>
-              <a:rPr lang="zh-CN" altLang="en-US" sz="1800" dirty="0"/>
-              <a:t>* </a:t>
-            </a:r>
-            <a:r>
-              <a:rPr lang="en-US" altLang="zh-CN" sz="1800" dirty="0"/>
-              <a:t>n</a:t>
-            </a:r>
-            <a:r>
-              <a:rPr lang="en-US" altLang="nl-NL" sz="1800" dirty="0"/>
-              <a:t>)</a:t>
-            </a:r>
-          </a:p>
-          <a:p>
-            <a:pPr lvl="2"/>
-            <a:r>
-              <a:rPr lang="en-US" altLang="nl-NL" sz="1800" dirty="0"/>
-              <a:t>Solve the overlap (O(n))</a:t>
-            </a:r>
-            <a:endParaRPr lang="en-US" altLang="nl-NL" sz="1800" dirty="0">
-              <a:solidFill>
-                <a:srgbClr val="FF0000"/>
-              </a:solidFill>
-            </a:endParaRPr>
-          </a:p>
-          <a:p>
-            <a:pPr lvl="1"/>
-            <a:r>
-              <a:rPr lang="en-US" altLang="nl-NL" sz="2800" dirty="0"/>
-              <a:t>Color of the dot = O(n)</a:t>
-            </a:r>
-          </a:p>
-          <a:p>
-            <a:pPr lvl="2"/>
-            <a:r>
-              <a:rPr lang="en-US" altLang="nl-NL" sz="1800" dirty="0"/>
-              <a:t>Solution 3 (O(n))</a:t>
-            </a:r>
-          </a:p>
-          <a:p>
-            <a:pPr lvl="1"/>
-            <a:r>
-              <a:rPr lang="en-US" altLang="nl-NL" sz="2800" dirty="0"/>
-              <a:t>Total running time = O(n^</a:t>
-            </a:r>
-            <a:r>
               <a:rPr lang="en-US" altLang="zh-CN" sz="2800" dirty="0"/>
-              <a:t>2</a:t>
-            </a:r>
-            <a:r>
-              <a:rPr lang="en-US" altLang="nl-NL" sz="2800" dirty="0"/>
-              <a:t>)</a:t>
-            </a:r>
-          </a:p>
-          <a:p>
-            <a:pPr lvl="2"/>
-            <a:r>
-              <a:rPr lang="en-US" altLang="nl-NL" sz="1800" dirty="0"/>
-              <a:t>n = total number of people</a:t>
-            </a:r>
-          </a:p>
-          <a:p>
-            <a:pPr lvl="2"/>
-            <a:endParaRPr lang="en-US" altLang="nl-NL" sz="1800" dirty="0"/>
-          </a:p>
-        </p:txBody>
-      </p:sp>
+              <a:t>Solve the overlapping</a:t>
+            </a:r>
+            <a:endParaRPr lang="en-US" altLang="nl-NL" sz="2800" dirty="0"/>
+          </a:p>
+        </p:txBody>
+      </p:sp>
+      <p:pic>
+        <p:nvPicPr>
+          <p:cNvPr id="3" name="Picture 2"/>
+          <p:cNvPicPr>
+            <a:picLocks noChangeAspect="1"/>
+          </p:cNvPicPr>
+          <p:nvPr/>
+        </p:nvPicPr>
+        <p:blipFill>
+          <a:blip r:embed="rId2"/>
+          <a:stretch>
+            <a:fillRect/>
+          </a:stretch>
+        </p:blipFill>
+        <p:spPr>
+          <a:xfrm>
+            <a:off x="1238013" y="3032956"/>
+            <a:ext cx="6741000" cy="2036800"/>
+          </a:xfrm>
+          <a:prstGeom prst="rect">
+            <a:avLst/>
+          </a:prstGeom>
+        </p:spPr>
+      </p:pic>
     </p:spTree>
     <p:extLst>
       <p:ext uri="{BB962C8B-B14F-4D97-AF65-F5344CB8AC3E}">
-        <p14:creationId xmlns:p14="http://schemas.microsoft.com/office/powerpoint/2010/main" val="1868917812"/>
+        <p14:creationId xmlns:p14="http://schemas.microsoft.com/office/powerpoint/2010/main" val="4172768736"/>
       </p:ext>
     </p:extLst>
   </p:cSld>
@@ -12894,15 +13160,128 @@
           <a:p>
             <a:r>
               <a:rPr lang="en-US" altLang="nl-NL" dirty="0"/>
-              <a:t>Demo</a:t>
-            </a:r>
+              <a:t>Running time</a:t>
+            </a:r>
+          </a:p>
+        </p:txBody>
+      </p:sp>
+      <p:sp>
+        <p:nvSpPr>
+          <p:cNvPr id="66563" name="Content Placeholder 2"/>
+          <p:cNvSpPr>
+            <a:spLocks noGrp="1"/>
+          </p:cNvSpPr>
+          <p:nvPr>
+            <p:ph idx="1"/>
+          </p:nvPr>
+        </p:nvSpPr>
+        <p:spPr>
+          <a:xfrm>
+            <a:off x="611188" y="1600201"/>
+            <a:ext cx="7994650" cy="4025044"/>
+          </a:xfrm>
+        </p:spPr>
+        <p:txBody>
+          <a:bodyPr/>
+          <a:lstStyle/>
+          <a:p>
+            <a:pPr lvl="1"/>
+            <a:r>
+              <a:rPr lang="en-US" altLang="nl-NL" sz="2800" dirty="0"/>
+              <a:t>Radius of the dot  = O(1)</a:t>
+            </a:r>
+          </a:p>
+          <a:p>
+            <a:pPr lvl="1"/>
+            <a:r>
+              <a:rPr lang="en-US" altLang="nl-NL" sz="2800" dirty="0"/>
+              <a:t>How many people = 1 dot = O(1)</a:t>
+            </a:r>
+          </a:p>
+          <a:p>
+            <a:pPr lvl="1"/>
+            <a:r>
+              <a:rPr lang="en-US" altLang="nl-NL" sz="2800" dirty="0"/>
+              <a:t>Where to place the dot = O(n)</a:t>
+            </a:r>
+          </a:p>
+          <a:p>
+            <a:pPr lvl="2"/>
+            <a:r>
+              <a:rPr lang="en-US" altLang="nl-NL" sz="1800" dirty="0"/>
+              <a:t>Choose the middle point (O(1) </a:t>
+            </a:r>
+            <a:r>
+              <a:rPr lang="zh-CN" altLang="en-US" sz="1800" dirty="0"/>
+              <a:t>* </a:t>
+            </a:r>
+            <a:r>
+              <a:rPr lang="en-US" altLang="zh-CN" sz="1800" dirty="0"/>
+              <a:t>n</a:t>
+            </a:r>
+            <a:r>
+              <a:rPr lang="en-US" altLang="nl-NL" sz="1800" dirty="0"/>
+              <a:t>)</a:t>
+            </a:r>
+          </a:p>
+          <a:p>
+            <a:pPr lvl="2"/>
+            <a:r>
+              <a:rPr lang="en-US" altLang="nl-NL" sz="1800" dirty="0"/>
+              <a:t>Solve the overlap (O(n))</a:t>
+            </a:r>
+            <a:endParaRPr lang="en-US" altLang="nl-NL" sz="1800" dirty="0">
+              <a:solidFill>
+                <a:srgbClr val="FF0000"/>
+              </a:solidFill>
+            </a:endParaRPr>
+          </a:p>
+          <a:p>
+            <a:pPr lvl="1"/>
+            <a:r>
+              <a:rPr lang="en-US" altLang="nl-NL" sz="2800" dirty="0"/>
+              <a:t>Color of the dot = O(n)</a:t>
+            </a:r>
+          </a:p>
+          <a:p>
+            <a:pPr lvl="2"/>
+            <a:r>
+              <a:rPr lang="en-US" altLang="nl-NL" sz="1800" dirty="0"/>
+              <a:t>Solution 3 (O(n))</a:t>
+            </a:r>
+          </a:p>
+          <a:p>
+            <a:pPr lvl="1"/>
+            <a:r>
+              <a:rPr lang="en-US" altLang="nl-NL" sz="2800" dirty="0"/>
+              <a:t>Total running time = O(n^</a:t>
+            </a:r>
+            <a:r>
+              <a:rPr lang="en-US" altLang="zh-CN" sz="2800" dirty="0"/>
+              <a:t>2</a:t>
+            </a:r>
+            <a:r>
+              <a:rPr lang="en-US" altLang="nl-NL" sz="2800" dirty="0"/>
+              <a:t>)</a:t>
+            </a:r>
+          </a:p>
+          <a:p>
+            <a:pPr lvl="2"/>
+            <a:r>
+              <a:rPr lang="en-US" altLang="nl-NL" sz="1800" dirty="0"/>
+              <a:t>n = total number of people</a:t>
+            </a:r>
+          </a:p>
+          <a:p>
+            <a:pPr lvl="2"/>
+            <a:endParaRPr lang="en-US" altLang="nl-NL" sz="1800" dirty="0"/>
           </a:p>
         </p:txBody>
       </p:sp>
     </p:spTree>
     <p:extLst>
       <p:ext uri="{BB962C8B-B14F-4D97-AF65-F5344CB8AC3E}">
-        <p14:creationId xmlns:p14="http://schemas.microsoft.com/office/powerpoint/2010/main" val="491528343"/>
+        <p14:creationId xmlns:p14="http://schemas.microsoft.com/office/powerpoint/2010/main" val="1868917812"/>
       </p:ext>
     </p:extLst>
   </p:cSld>
@@ -12946,54 +13325,7 @@
           <a:p>
             <a:r>
               <a:rPr lang="en-US" altLang="nl-NL" dirty="0"/>
-              <a:t>Constraints</a:t>
-            </a:r>
-          </a:p>
-        </p:txBody>
-      </p:sp>
-      <p:sp>
-        <p:nvSpPr>
-          <p:cNvPr id="66563" name="Content Placeholder 2"/>
-          <p:cNvSpPr>
-            <a:spLocks noGrp="1"/>
-          </p:cNvSpPr>
-          <p:nvPr>
-            <p:ph idx="1"/>
-          </p:nvPr>
-        </p:nvSpPr>
-        <p:spPr>
-          <a:xfrm>
-            <a:off x="611188" y="1600200"/>
-            <a:ext cx="7994650" cy="4349079"/>
-          </a:xfrm>
-        </p:spPr>
-        <p:txBody>
-          <a:bodyPr/>
-          <a:lstStyle/>
-          <a:p>
-            <a:r>
-              <a:rPr lang="en-US" altLang="nl-NL" sz="2000" dirty="0"/>
-              <a:t>Data generation is slow O(N), where N = total number of people.</a:t>
-            </a:r>
-          </a:p>
-          <a:p>
-            <a:pPr lvl="1"/>
-            <a:r>
-              <a:rPr lang="en-US" altLang="nl-NL" sz="1800" dirty="0"/>
-              <a:t>One time only, as long as the data.txt is not deleted.</a:t>
-            </a:r>
-          </a:p>
-          <a:p>
-            <a:r>
-              <a:rPr lang="en-US" altLang="nl-NL" sz="2000" dirty="0"/>
-              <a:t>Aggregation algorithm’s worst case Running time is O(N^3), where N = total number of people.</a:t>
-            </a:r>
-          </a:p>
-          <a:p>
-            <a:pPr lvl="1"/>
-            <a:r>
-              <a:rPr lang="en-US" altLang="nl-NL" sz="1800" dirty="0"/>
-              <a:t>Each time when the proposition (number of people to 1 dot) changes.</a:t>
+              <a:t>Demo</a:t>
             </a:r>
           </a:p>
         </p:txBody>
@@ -13001,7 +13333,7 @@
     </p:spTree>
     <p:extLst>
       <p:ext uri="{BB962C8B-B14F-4D97-AF65-F5344CB8AC3E}">
-        <p14:creationId xmlns:p14="http://schemas.microsoft.com/office/powerpoint/2010/main" val="216843196"/>
+        <p14:creationId xmlns:p14="http://schemas.microsoft.com/office/powerpoint/2010/main" val="491528343"/>
       </p:ext>
     </p:extLst>
   </p:cSld>
@@ -13215,6 +13547,105 @@
         </p:nvSpPr>
         <p:spPr>
           <a:xfrm>
+            <a:off x="611188" y="1600200"/>
+            <a:ext cx="7994650" cy="4349079"/>
+          </a:xfrm>
+        </p:spPr>
+        <p:txBody>
+          <a:bodyPr/>
+          <a:lstStyle/>
+          <a:p>
+            <a:r>
+              <a:rPr lang="en-US" altLang="nl-NL" sz="2000" dirty="0"/>
+              <a:t>Data generation is slow O(N), where N = total number of people.</a:t>
+            </a:r>
+          </a:p>
+          <a:p>
+            <a:pPr lvl="1"/>
+            <a:r>
+              <a:rPr lang="en-US" altLang="nl-NL" sz="1800" dirty="0"/>
+              <a:t>One time only, as long as the data.txt is not deleted.</a:t>
+            </a:r>
+          </a:p>
+          <a:p>
+            <a:r>
+              <a:rPr lang="en-US" altLang="nl-NL" sz="2000" dirty="0"/>
+              <a:t>Aggregation algorithm’s worst case Running time is O(N^3), where N = total number of people.</a:t>
+            </a:r>
+          </a:p>
+          <a:p>
+            <a:pPr lvl="1"/>
+            <a:r>
+              <a:rPr lang="en-US" altLang="nl-NL" sz="1800" dirty="0"/>
+              <a:t>Each time when the proposition (number of people to 1 dot) changes.</a:t>
+            </a:r>
+          </a:p>
+        </p:txBody>
+      </p:sp>
+    </p:spTree>
+    <p:extLst>
+      <p:ext uri="{BB962C8B-B14F-4D97-AF65-F5344CB8AC3E}">
+        <p14:creationId xmlns:p14="http://schemas.microsoft.com/office/powerpoint/2010/main" val="216843196"/>
+      </p:ext>
+    </p:extLst>
+  </p:cSld>
+  <p:clrMapOvr>
+    <a:masterClrMapping/>
+  </p:clrMapOvr>
+</p:sld>
+</file>
+
+<file path=ppt/slides/slide21.xml><?xml version="1.0" encoding="utf-8"?>
+<p:sld xmlns:a="http://schemas.openxmlformats.org/drawingml/2006/main" xmlns:r="http://schemas.openxmlformats.org/officeDocument/2006/relationships" xmlns:p="http://schemas.openxmlformats.org/presentationml/2006/main">
+  <p:cSld>
+    <p:spTree>
+      <p:nvGrpSpPr>
+        <p:cNvPr id="1" name=""/>
+        <p:cNvGrpSpPr/>
+        <p:nvPr/>
+      </p:nvGrpSpPr>
+      <p:grpSpPr>
+        <a:xfrm>
+          <a:off x="0" y="0"/>
+          <a:ext cx="0" cy="0"/>
+          <a:chOff x="0" y="0"/>
+          <a:chExt cx="0" cy="0"/>
+        </a:xfrm>
+      </p:grpSpPr>
+      <p:sp>
+        <p:nvSpPr>
+          <p:cNvPr id="66562" name="Title 1"/>
+          <p:cNvSpPr>
+            <a:spLocks noGrp="1"/>
+          </p:cNvSpPr>
+          <p:nvPr>
+            <p:ph type="title"/>
+          </p:nvPr>
+        </p:nvSpPr>
+        <p:spPr/>
+        <p:txBody>
+          <a:bodyPr/>
+          <a:lstStyle/>
+          <a:p>
+            <a:r>
+              <a:rPr lang="en-US" altLang="nl-NL" dirty="0"/>
+              <a:t>Constraints</a:t>
+            </a:r>
+          </a:p>
+        </p:txBody>
+      </p:sp>
+      <p:sp>
+        <p:nvSpPr>
+          <p:cNvPr id="66563" name="Content Placeholder 2"/>
+          <p:cNvSpPr>
+            <a:spLocks noGrp="1"/>
+          </p:cNvSpPr>
+          <p:nvPr>
+            <p:ph idx="1"/>
+          </p:nvPr>
+        </p:nvSpPr>
+        <p:spPr>
+          <a:xfrm>
             <a:off x="611188" y="1376772"/>
             <a:ext cx="7994650" cy="5481228"/>
           </a:xfrm>
@@ -13340,7 +13771,7 @@
 </p:sld>
 </file>
 
-<file path=ppt/slides/slide21.xml><?xml version="1.0" encoding="utf-8"?>
+<file path=ppt/slides/slide22.xml><?xml version="1.0" encoding="utf-8"?>
 <p:sld xmlns:a="http://schemas.openxmlformats.org/drawingml/2006/main" xmlns:r="http://schemas.openxmlformats.org/officeDocument/2006/relationships" xmlns:p="http://schemas.openxmlformats.org/presentationml/2006/main">
   <p:cSld>
     <p:spTree>

</xml_diff>